<commit_message>
Update 2018-12-12 normalized degree of coherence.pptx
</commit_message>
<xml_diff>
--- a/notes/2018-12-12 normalized degree of coherence.pptx
+++ b/notes/2018-12-12 normalized degree of coherence.pptx
@@ -5,13 +5,15 @@
     <p:sldMasterId id="2147483660" r:id="rId1"/>
   </p:sldMasterIdLst>
   <p:notesMasterIdLst>
-    <p:notesMasterId r:id="rId6"/>
+    <p:notesMasterId r:id="rId8"/>
   </p:notesMasterIdLst>
   <p:sldIdLst>
     <p:sldId id="256" r:id="rId2"/>
     <p:sldId id="259" r:id="rId3"/>
     <p:sldId id="257" r:id="rId4"/>
-    <p:sldId id="258" r:id="rId5"/>
+    <p:sldId id="260" r:id="rId5"/>
+    <p:sldId id="258" r:id="rId6"/>
+    <p:sldId id="261" r:id="rId7"/>
   </p:sldIdLst>
   <p:sldSz cx="9144000" cy="6858000" type="screen4x3"/>
   <p:notesSz cx="6858000" cy="9144000"/>
@@ -121,7 +123,7 @@
 <file path=ppt/revisionInfo.xml><?xml version="1.0" encoding="utf-8"?>
 <p1510:revInfo xmlns:a="http://schemas.openxmlformats.org/drawingml/2006/main" xmlns:r="http://schemas.openxmlformats.org/officeDocument/2006/relationships" xmlns:p1510="http://schemas.microsoft.com/office/powerpoint/2015/10/main">
   <p1510:revLst>
-    <p1510:client id="{E1D48240-C196-459D-9B1D-8385056EE5D3}" v="21" dt="2018-12-12T16:58:05.038"/>
+    <p1510:client id="{EE1B8AA7-E964-4881-B002-433D62210CA5}" v="4" dt="2019-03-07T23:07:30.984"/>
   </p1510:revLst>
 </p1510:revInfo>
 </file>
@@ -1016,6 +1018,125 @@
             <pc:docMk/>
             <pc:sldMk cId="520399722" sldId="259"/>
             <ac:picMk id="5" creationId="{E38F10F9-46A3-4CCE-9F49-D76689DB757C}"/>
+          </ac:picMkLst>
+        </pc:picChg>
+      </pc:sldChg>
+    </pc:docChg>
+  </pc:docChgLst>
+  <pc:docChgLst>
+    <pc:chgData name="Thomas Wodzinski" userId="e453dee9ea284be0" providerId="LiveId" clId="{68FAB8E1-7895-47E5-969C-7F93939D1982}"/>
+    <pc:docChg chg="modSld">
+      <pc:chgData name="Thomas Wodzinski" userId="e453dee9ea284be0" providerId="LiveId" clId="{68FAB8E1-7895-47E5-969C-7F93939D1982}" dt="2019-01-11T16:29:34.555" v="0" actId="1035"/>
+      <pc:docMkLst>
+        <pc:docMk/>
+      </pc:docMkLst>
+      <pc:sldChg chg="modSp">
+        <pc:chgData name="Thomas Wodzinski" userId="e453dee9ea284be0" providerId="LiveId" clId="{68FAB8E1-7895-47E5-969C-7F93939D1982}" dt="2019-01-11T16:29:34.555" v="0" actId="1035"/>
+        <pc:sldMkLst>
+          <pc:docMk/>
+          <pc:sldMk cId="3171243530" sldId="258"/>
+        </pc:sldMkLst>
+        <pc:picChg chg="mod">
+          <ac:chgData name="Thomas Wodzinski" userId="e453dee9ea284be0" providerId="LiveId" clId="{68FAB8E1-7895-47E5-969C-7F93939D1982}" dt="2019-01-11T16:29:34.555" v="0" actId="1035"/>
+          <ac:picMkLst>
+            <pc:docMk/>
+            <pc:sldMk cId="3171243530" sldId="258"/>
+            <ac:picMk id="5" creationId="{0346749E-82D6-4C2C-93B4-CA7656D9FEC5}"/>
+          </ac:picMkLst>
+        </pc:picChg>
+      </pc:sldChg>
+    </pc:docChg>
+  </pc:docChgLst>
+  <pc:docChgLst>
+    <pc:chgData name="Thomas Wodzinski" userId="e453dee9ea284be0" providerId="LiveId" clId="{EE1B8AA7-E964-4881-B002-433D62210CA5}"/>
+    <pc:docChg chg="custSel addSld modSld">
+      <pc:chgData name="Thomas Wodzinski" userId="e453dee9ea284be0" providerId="LiveId" clId="{EE1B8AA7-E964-4881-B002-433D62210CA5}" dt="2019-03-07T23:09:53.308" v="48" actId="20577"/>
+      <pc:docMkLst>
+        <pc:docMk/>
+      </pc:docMkLst>
+      <pc:sldChg chg="addSp delSp modSp add">
+        <pc:chgData name="Thomas Wodzinski" userId="e453dee9ea284be0" providerId="LiveId" clId="{EE1B8AA7-E964-4881-B002-433D62210CA5}" dt="2019-03-07T23:09:53.308" v="48" actId="20577"/>
+        <pc:sldMkLst>
+          <pc:docMk/>
+          <pc:sldMk cId="3234310808" sldId="260"/>
+        </pc:sldMkLst>
+        <pc:spChg chg="mod">
+          <ac:chgData name="Thomas Wodzinski" userId="e453dee9ea284be0" providerId="LiveId" clId="{EE1B8AA7-E964-4881-B002-433D62210CA5}" dt="2019-03-07T23:09:53.308" v="48" actId="20577"/>
+          <ac:spMkLst>
+            <pc:docMk/>
+            <pc:sldMk cId="3234310808" sldId="260"/>
+            <ac:spMk id="2" creationId="{A3A56E3E-C25E-434A-B620-14E20769BFF2}"/>
+          </ac:spMkLst>
+        </pc:spChg>
+        <pc:picChg chg="del">
+          <ac:chgData name="Thomas Wodzinski" userId="e453dee9ea284be0" providerId="LiveId" clId="{EE1B8AA7-E964-4881-B002-433D62210CA5}" dt="2019-03-07T22:59:48.090" v="1" actId="478"/>
+          <ac:picMkLst>
+            <pc:docMk/>
+            <pc:sldMk cId="3234310808" sldId="260"/>
+            <ac:picMk id="5" creationId="{A0844CDA-BA72-4AD1-8BA6-3953458963E6}"/>
+          </ac:picMkLst>
+        </pc:picChg>
+        <pc:picChg chg="add mod ord">
+          <ac:chgData name="Thomas Wodzinski" userId="e453dee9ea284be0" providerId="LiveId" clId="{EE1B8AA7-E964-4881-B002-433D62210CA5}" dt="2019-03-07T23:00:29.702" v="8" actId="14100"/>
+          <ac:picMkLst>
+            <pc:docMk/>
+            <pc:sldMk cId="3234310808" sldId="260"/>
+            <ac:picMk id="8" creationId="{4ABB3391-74F5-40E4-9148-1DA4060413BA}"/>
+          </ac:picMkLst>
+        </pc:picChg>
+        <pc:inkChg chg="del">
+          <ac:chgData name="Thomas Wodzinski" userId="e453dee9ea284be0" providerId="LiveId" clId="{EE1B8AA7-E964-4881-B002-433D62210CA5}" dt="2019-03-07T23:00:36.263" v="9" actId="478"/>
+          <ac:inkMkLst>
+            <pc:docMk/>
+            <pc:sldMk cId="3234310808" sldId="260"/>
+            <ac:inkMk id="3" creationId="{63869C3B-D722-4274-AE16-6E2A26FEDD4C}"/>
+          </ac:inkMkLst>
+        </pc:inkChg>
+        <pc:inkChg chg="del">
+          <ac:chgData name="Thomas Wodzinski" userId="e453dee9ea284be0" providerId="LiveId" clId="{EE1B8AA7-E964-4881-B002-433D62210CA5}" dt="2019-03-07T23:00:38.355" v="10" actId="478"/>
+          <ac:inkMkLst>
+            <pc:docMk/>
+            <pc:sldMk cId="3234310808" sldId="260"/>
+            <ac:inkMk id="6" creationId="{02C2E441-7054-45F0-B642-1CF0522A3DAB}"/>
+          </ac:inkMkLst>
+        </pc:inkChg>
+        <pc:inkChg chg="del">
+          <ac:chgData name="Thomas Wodzinski" userId="e453dee9ea284be0" providerId="LiveId" clId="{EE1B8AA7-E964-4881-B002-433D62210CA5}" dt="2019-03-07T23:00:40.764" v="11" actId="478"/>
+          <ac:inkMkLst>
+            <pc:docMk/>
+            <pc:sldMk cId="3234310808" sldId="260"/>
+            <ac:inkMk id="7" creationId="{7ECAE9C0-D82A-47E6-ACBF-3C7208E84535}"/>
+          </ac:inkMkLst>
+        </pc:inkChg>
+      </pc:sldChg>
+      <pc:sldChg chg="addSp delSp modSp add">
+        <pc:chgData name="Thomas Wodzinski" userId="e453dee9ea284be0" providerId="LiveId" clId="{EE1B8AA7-E964-4881-B002-433D62210CA5}" dt="2019-03-07T23:09:42.400" v="34" actId="27636"/>
+        <pc:sldMkLst>
+          <pc:docMk/>
+          <pc:sldMk cId="2167586369" sldId="261"/>
+        </pc:sldMkLst>
+        <pc:spChg chg="mod">
+          <ac:chgData name="Thomas Wodzinski" userId="e453dee9ea284be0" providerId="LiveId" clId="{EE1B8AA7-E964-4881-B002-433D62210CA5}" dt="2019-03-07T23:09:42.400" v="34" actId="27636"/>
+          <ac:spMkLst>
+            <pc:docMk/>
+            <pc:sldMk cId="2167586369" sldId="261"/>
+            <ac:spMk id="2" creationId="{AAEE8B13-2E97-426B-B7E7-4B402CFCF955}"/>
+          </ac:spMkLst>
+        </pc:spChg>
+        <pc:picChg chg="add mod ord">
+          <ac:chgData name="Thomas Wodzinski" userId="e453dee9ea284be0" providerId="LiveId" clId="{EE1B8AA7-E964-4881-B002-433D62210CA5}" dt="2019-03-07T23:09:13.598" v="24" actId="167"/>
+          <ac:picMkLst>
+            <pc:docMk/>
+            <pc:sldMk cId="2167586369" sldId="261"/>
+            <ac:picMk id="3" creationId="{99F89362-4001-406A-BD8A-3C5097374021}"/>
+          </ac:picMkLst>
+        </pc:picChg>
+        <pc:picChg chg="del">
+          <ac:chgData name="Thomas Wodzinski" userId="e453dee9ea284be0" providerId="LiveId" clId="{EE1B8AA7-E964-4881-B002-433D62210CA5}" dt="2019-03-07T23:09:16.641" v="25" actId="478"/>
+          <ac:picMkLst>
+            <pc:docMk/>
+            <pc:sldMk cId="2167586369" sldId="261"/>
+            <ac:picMk id="5" creationId="{0346749E-82D6-4C2C-93B4-CA7656D9FEC5}"/>
           </ac:picMkLst>
         </pc:picChg>
       </pc:sldChg>
@@ -1480,7 +1601,7 @@
     </inkml:brush>
   </inkml:definitions>
   <inkml:trace contextRef="#ctx0" brushRef="#br0">73 25 2560,'0'0'114,"-1"0"0,1 0 0,0 0 0,0 0-1,-1 0 1,1 0 0,0 0 0,-1 0 0,1 0 0,0 0 0,0-1 0,-1 1 0,1 0-1,0 0 1,0 0 0,-1 0 0,1 0 0,0-1 0,0 1 0,0 0 0,-1 0 0,1 0 0,0-1-1,0 1 1,0 0 0,0 0 0,-1 0 0,1-1 0,0 1 0,0 0 0,0 0 0,0-1-1,0 1 1,0 0 0,0-1 0,0 1 0,0 0 0,0 0 0,0-1-114,0 1 153,0 0 0,0-1 0,0 1 1,0 0-1,0 0 0,0-1 0,0 1 0,0 0 0,-1 0 1,1 0-1,0-1 0,0 1 0,0 0 0,0 0 0,0-1 1,0 1-1,0 0 0,-1 0 0,1 0 0,0 0 1,0-1-1,0 1 0,-1 0 0,1 0 0,0 0 0,0 0 1,0 0-1,-1-1 0,1 1 0,0 0 0,0 0 0,0 0 1,-1 0-1,1 0 0,0 0 0,0 0 0,-1 0 0,1 0 1,0 0-154,5 1 79,0 0 0,0 0 1,-1 1-1,1 0 0,0 0 0,0 0 1,-1 0-1,0 1 0,1-1 1,-1 1-1,0 1 0,0-1 1,3 3-80,4 5-31,0 0-1,0 1 1,-1 0 0,0 1 31,18 33 1,-20-32 19,0-1 0,0 0-1,1-1 1,10 10-20,-14-20-338,-5-10-921,-5-13-3032,1 14 1849</inkml:trace>
-  <inkml:trace contextRef="#ctx0" brushRef="#br0" timeOffset="750.446">39 175 2304,'-6'-13'4076,"3"8"-563,-6 12-3550,-3 1-23,4-3 109,8-5-25,0 0-1,0 0 1,0 0 0,0 0 0,0 0 0,0 0 0,0 0-1,0 0 1,1 0 0,-1 0 0,0 0 0,0 0-1,0 0 1,0 0 0,0 0 0,0 0 0,0 0 0,0 0-1,0 0 1,0 0 0,0 0 0,0 0 0,0 0 0,1 0-1,-1 0 1,0 0 0,0 0 0,0 0 0,0 0 0,0 0-1,0 1 1,0-1 0,0 0 0,0 0 0,0 0-1,0 0 1,0 0 0,0 0 0,0 0 0,0 0 0,0 0-1,0 0 1,0 0 0,0 0 0,0 0 0,0 0 0,0 1-1,0-1 1,0 0 0,0 0 0,0 0 0,0 0 0,0 0-1,0 0 1,0 0 0,0 0 0,0 0 0,0 0-1,0 0 1,0 0-24,1 0 299,-1 0 106,10-11 2374,144-94-1104,-113 63-1819,-48 33-2041,-5-1-4257,11 9 4466,1 1-1341</inkml:trace>
+  <inkml:trace contextRef="#ctx0" brushRef="#br0" timeOffset="750.444">39 175 2304,'-6'-13'4076,"3"8"-563,-6 12-3550,-3 1-23,4-3 109,8-5-25,0 0-1,0 0 1,0 0 0,0 0 0,0 0 0,0 0 0,0 0-1,0 0 1,1 0 0,-1 0 0,0 0 0,0 0-1,0 0 1,0 0 0,0 0 0,0 0 0,0 0 0,0 0-1,0 0 1,0 0 0,0 0 0,0 0 0,0 0 0,1 0-1,-1 0 1,0 0 0,0 0 0,0 0 0,0 0 0,0 0-1,0 1 1,0-1 0,0 0 0,0 0 0,0 0-1,0 0 1,0 0 0,0 0 0,0 0 0,0 0 0,0 0-1,0 0 1,0 0 0,0 0 0,0 0 0,0 0 0,0 1-1,0-1 1,0 0 0,0 0 0,0 0 0,0 0 0,0 0-1,0 0 1,0 0 0,0 0 0,0 0 0,0 0-1,0 0 1,0 0-24,1 0 299,-1 0 106,10-11 2374,144-94-1104,-113 63-1819,-48 33-2041,-5-1-4257,11 9 4466,1 1-1341</inkml:trace>
 </inkml:ink>
 </file>
 
@@ -1662,7 +1783,7 @@
     </inkml:brush>
   </inkml:definitions>
   <inkml:trace contextRef="#ctx0" brushRef="#br0">47 30 2304,'0'-2'119,"1"1"0,0-1-1,-1 1 1,1 0 0,0-1 0,0 1 0,0 0-1,0 0 1,0 0 0,0 0 0,0-1 0,0 2-1,0-1 1,1 0 0,-1 0 0,0 0 0,1 0-1,-1 1 1,1-1 0,-1 1 0,0-1 0,1 1-1,0 0-118,1-2 9,0 1 0,1 0-1,-1 0 1,1 0 0,-1 1-1,1-1 1,-1 1 0,1 0 0,2 0-9,-5 1-9,1-1 1,-1 0 0,1 1 0,-1-1 0,0 1 0,1 0-1,-1-1 1,0 1 0,1 0 0,-1 0 0,0 0 0,0 0-1,0 0 1,0 0 0,0 0 0,0 0 0,0 1 0,0-1-1,0 0 1,0 0 0,-1 1 0,1-1 0,0 1 0,-1-1 8,1 2-2,-1 0 1,1 1-1,-1-1 1,0 0-1,0 0 1,0 0-1,0 0 1,-1 1-1,0-1 1,1 0-1,-2 2 2,-1 5 21,-1 0 0,0-1 1,-1 1-1,0-1 0,0 0 0,-1-1 1,0 1-22,-45 43 459,5-6 809,46-46-1244,0 0 0,0 0 0,0 0-1,0 0 1,0 0 0,0 0 0,0 0-1,0 0 1,0 0 0,-1 0 0,1 1-1,0-1 1,0 0 0,0 0 0,0 0-1,0 0 1,0 0 0,0 0 0,0 0-1,0 1 1,0-1 0,0 0 0,0 0-1,0 0 1,0 0 0,0 0 0,0 0-1,0 0 1,0 1 0,0-1 0,0 0-1,1 0 1,-1 0 0,0 0 0,0 0-1,0 0 1,0 0 0,0 0 0,0 1-1,0-1 1,0 0 0,0 0 0,0 0-1,0 0 1,1 0 0,-1 0 0,0 0-1,0 0 1,0 0 0,0 0 0,0 0-1,0 0 1,0 0 0,1 0 0,-1 0-1,0 0 1,0 0 0,0 0 0,0 0-1,0 0 1,0 0 0,0 0 0,1 0-1,-1 0 1,0 0 0,0 0-24,16-1 619,17-7 69,-17 4-334,1 1-1,0 0 1,0 1-1,9 1-353,21-3-1209,-2-6-4724,-35 7 3608</inkml:trace>
-  <inkml:trace contextRef="#ctx0" brushRef="#br0" timeOffset="435.998">307 143 4224,'4'31'5420,"9"6"-4020,-12-33-1382,0-1-1,1 0 1,0 0 0,-1 0-1,1 0 1,0 0 0,1 0-1,-1 0 1,0-1 0,1 1-1,0-1 1,-1 0-1,1 1 1,0-1 0,0-1-1,0 1 1,0 0 0,1-1-1,-1 1 1,1-1-18,-2-1 30,-1 1 0,1-1 0,-1 0 0,1 0-1,-1 0 1,1 0 0,-1 0 0,1-1 0,-1 1 0,1 0 0,-1-1 0,1 1-1,-1-1 1,1 1 0,-1-1 0,0 0 0,1 0 0,-1 0 0,0 1 0,0-1-1,2-1-29,-1-1 34,0 0 0,1 0 0,-1 1-1,0-2 1,-1 1 0,1 0 0,0 0-1,-1 0 1,1-4-34,1-1 14,-1-1 0,0 1 0,-1-1 0,0 1 0,0-1 0,-1 0 0,0-8-14,0 13 28,-1 0 1,1 0-1,-1 0 0,0 0 0,0 0 0,0 0 0,0 0 1,-1 1-1,0-1 0,0 0 0,0 1 0,0-1 0,0 1 1,-1 0-1,1 0 0,-2-1-28,2 3 22,-1-1-1,1 0 1,-1 1 0,0 0 0,0-1-1,0 1 1,0 0 0,0 1 0,0-1-1,0 0 1,0 1 0,0 0-1,0 0 1,0 0 0,-1 0 0,1 0-1,0 0 1,0 1 0,0 0 0,-3 0-22,4 0-4,-2-1-188,-1 1 1,1 0 0,0 0 0,0 0 0,0 0 0,0 0-1,0 1 1,0 0 0,1 0 0,-1 0 0,0 0-1,1 1 1,0-1 0,-1 1 0,1 0 0,0 0 0,0 0-1,0 1 192,3 1-2421,9 3-256</inkml:trace>
+  <inkml:trace contextRef="#ctx0" brushRef="#br0" timeOffset="435.996">307 143 4224,'4'31'5420,"9"6"-4020,-12-33-1382,0-1-1,1 0 1,0 0 0,-1 0-1,1 0 1,0 0 0,1 0-1,-1 0 1,0-1 0,1 1-1,0-1 1,-1 0-1,1 1 1,0-1 0,0-1-1,0 1 1,0 0 0,1-1-1,-1 1 1,1-1-18,-2-1 30,-1 1 0,1-1 0,-1 0 0,1 0-1,-1 0 1,1 0 0,-1 0 0,1-1 0,-1 1 0,1 0 0,-1-1 0,1 1-1,-1-1 1,1 1 0,-1-1 0,0 0 0,1 0 0,-1 0 0,0 1 0,0-1-1,2-1-29,-1-1 34,0 0 0,1 0 0,-1 1-1,0-2 1,-1 1 0,1 0 0,0 0-1,-1 0 1,1-4-34,1-1 14,-1-1 0,0 1 0,-1-1 0,0 1 0,0-1 0,-1 0 0,0-8-14,0 13 28,-1 0 1,1 0-1,-1 0 0,0 0 0,0 0 0,0 0 0,0 0 1,-1 1-1,0-1 0,0 0 0,0 1 0,0-1 0,0 1 1,-1 0-1,1 0 0,-2-1-28,2 3 22,-1-1-1,1 0 1,-1 1 0,0 0 0,0-1-1,0 1 1,0 0 0,0 1 0,0-1-1,0 0 1,0 1 0,0 0-1,0 0 1,0 0 0,-1 0 0,1 0-1,0 0 1,0 1 0,0 0 0,-3 0-22,4 0-4,-2-1-188,-1 1 1,1 0 0,0 0 0,0 0 0,0 0 0,0 0-1,0 1 1,0 0 0,1 0 0,-1 0 0,0 0-1,1 1 1,0-1 0,-1 1 0,1 0 0,0 0 0,0 0-1,0 1 192,3 1-2421,9 3-256</inkml:trace>
   <inkml:trace contextRef="#ctx0" brushRef="#br0" timeOffset="834.002">500 95 4096,'29'-7'8549,"-27"7"-8500,1-1 1,-1 0-1,1 0 0,0 0 1,-1 0-1,0 0 1,1 0-1,-1-1 0,0 1 1,1-1-1,-1 1 0,0-1 1,0 0-1,0 0 1,-1 0-1,1 0 0,1-3-49,-1 3-63,-1 0-1,1 0 1,-1 0-1,1 0 1,0 0-1,0 1 1,0-1-1,0 1 1,0-1-1,0 1 1,1 0-1,-1-1 1,0 1-1,1 0 1,-1 1-1,1-1 1,1 0 63,-3 25-219,-18 82 1796,10-73-1381,1 0 0,2 1 1,1 14-197,5-38-2141,6-13-1478,-1-3 595</inkml:trace>
   <inkml:trace contextRef="#ctx0" brushRef="#br0" timeOffset="1283.05">689 22 4096,'0'0'176,"1"0"1,-1-1-1,1 1 1,-1 0-1,1-1 0,-1 1 1,1 0-1,-1-1 1,1 1-1,-1 0 0,1 0 1,-1 0-1,1 0 1,-1-1-1,1 1 1,-1 0-1,1 0 0,0 0 1,-1 0-1,1 0 1,-1 0-1,1 0 0,-1 1 1,1-1-1,-1 0 1,1 0-1,0 0 1,-1 0-1,1 1 0,-1-1 1,1 0-1,-1 1-176,1 0 124,-1 0 0,1 1 0,0-1 1,-1 1-1,1-1 0,-1 1 0,0-1 0,0 1 0,1-1 0,-1 1 0,0-1 0,0 1 0,-1 0-124,1 4 73,-1 0 0,0 0 0,-1 0 0,0-1 0,0 1 0,-2 5-73,2-8 27,0 0 1,1 0-1,-1 0 1,1 1-1,0-1 1,0 0-1,0 1 1,0-1-1,1 1 1,-1 0-1,1-1 1,0 1-1,0-1 1,0 1-1,1-1 1,-1 1-1,1-1 1,0 1-1,0 0-27,1-2 49,0 0 1,0 0-1,0 0 0,0-1 0,0 1 0,0-1 1,1 0-1,-1 1 0,0-1 0,1 0 0,-1 0 1,1 0-1,-1-1 0,1 1 0,0-1-49,3 2 68,-1-1 0,1-1 1,0 1-1,-1-1 0,1 0 0,4-1-68,23-4 51,8-3-565,-14 6-2708,-26 2 1136,-1 0-809,0 0 148</inkml:trace>
   <inkml:trace contextRef="#ctx0" brushRef="#br0" timeOffset="1598.051">831 42 4480,'-8'3'1760,"6"2"-1376,-3 10 1088,2-8 480,1 9 64,-3 4 64,2 3-704,-1 0-353,1 4-607,3 0-192,0 1-32,-4-6-160,4-2-96,0-5-256,0-2-128,0-2-2015,0-8-897,4 5-512</inkml:trace>
@@ -1758,6 +1879,255 @@
 </inkml:ink>
 </file>
 
+<file path=ppt/ink/ink32.xml><?xml version="1.0" encoding="utf-8"?>
+<inkml:ink xmlns:inkml="http://www.w3.org/2003/InkML">
+  <inkml:definitions>
+    <inkml:context xml:id="ctx0">
+      <inkml:inkSource xml:id="inkSrc0">
+        <inkml:traceFormat>
+          <inkml:channel name="X" type="integer" min="-2.14748E9" max="2.14748E9" units="cm"/>
+          <inkml:channel name="Y" type="integer" min="-2.14748E9" max="2.14748E9" units="cm"/>
+          <inkml:channel name="F" type="integer" max="32767" units="dev"/>
+        </inkml:traceFormat>
+        <inkml:channelProperties>
+          <inkml:channelProperty channel="X" name="resolution" value="1000" units="1/cm"/>
+          <inkml:channelProperty channel="Y" name="resolution" value="1000" units="1/cm"/>
+          <inkml:channelProperty channel="F" name="resolution" value="0" units="1/dev"/>
+        </inkml:channelProperties>
+      </inkml:inkSource>
+      <inkml:timestamp xml:id="ts0" timeString="2018-12-12T16:54:16.373"/>
+    </inkml:context>
+    <inkml:brush xml:id="br0">
+      <inkml:brushProperty name="width" value="0.05" units="cm"/>
+      <inkml:brushProperty name="height" value="0.05" units="cm"/>
+      <inkml:brushProperty name="color" value="#004F8B"/>
+    </inkml:brush>
+  </inkml:definitions>
+  <inkml:trace contextRef="#ctx0" brushRef="#br0">64 1 2048,'1'2'6918,"3"4"-3458,17 29-2932,-13-23-536,0 0-1,1 0 1,1-1 0,0 0-1,3 1 9,27 32 245,-37-40 823,-6-8-1214,-17-19-5389,13 18 3071</inkml:trace>
+  <inkml:trace contextRef="#ctx0" brushRef="#br0" timeOffset="448.626">0 113 2816,'2'0'8115,"3"-1"-4043,24-16-4051,-28 16 272,37-20-249,-23 12-68,0 0 1,0 0-1,8-8 24,-21 15 22,-3 1-304,1 0 1,-1 0 0,0 0-1,1 0 1,-1 0 0,0 1-1,1-1 1,-1 0 0,0 1-1,0-1 1,0 0 0,0 1-1,0-1 1,0 1 0,0 0-1,0-1 282,-3-2-3258</inkml:trace>
+</inkml:ink>
+</file>
+
+<file path=ppt/ink/ink33.xml><?xml version="1.0" encoding="utf-8"?>
+<inkml:ink xmlns:inkml="http://www.w3.org/2003/InkML">
+  <inkml:definitions>
+    <inkml:context xml:id="ctx0">
+      <inkml:inkSource xml:id="inkSrc0">
+        <inkml:traceFormat>
+          <inkml:channel name="X" type="integer" min="-2.14748E9" max="2.14748E9" units="cm"/>
+          <inkml:channel name="Y" type="integer" min="-2.14748E9" max="2.14748E9" units="cm"/>
+          <inkml:channel name="F" type="integer" max="32767" units="dev"/>
+        </inkml:traceFormat>
+        <inkml:channelProperties>
+          <inkml:channelProperty channel="X" name="resolution" value="1000" units="1/cm"/>
+          <inkml:channelProperty channel="Y" name="resolution" value="1000" units="1/cm"/>
+          <inkml:channelProperty channel="F" name="resolution" value="0" units="1/dev"/>
+        </inkml:channelProperties>
+      </inkml:inkSource>
+      <inkml:timestamp xml:id="ts0" timeString="2018-12-12T16:54:25.199"/>
+    </inkml:context>
+    <inkml:brush xml:id="br0">
+      <inkml:brushProperty name="width" value="0.05" units="cm"/>
+      <inkml:brushProperty name="height" value="0.05" units="cm"/>
+      <inkml:brushProperty name="color" value="#004F8B"/>
+    </inkml:brush>
+  </inkml:definitions>
+  <inkml:trace contextRef="#ctx0" brushRef="#br0">4 108 5888,'-3'4'3820,"8"-12"-297,15-17-1912,-16 22-1619,0-1 0,-1 0 0,1 0 0,-1-1 0,1 1 0,-1-1 0,-1 0 0,1 1 0,-1-1-1,0 0 9,16-25-175,-17 33 152,0 1 0,0 0-1,0-1 1,-1 1 0,1 0-1,-1 0 1,0 0 0,0 0 23,-7 243 3327,7-246-4766,0-1-908,0 0-2985,2-4 2179,3-1-223</inkml:trace>
+</inkml:ink>
+</file>
+
+<file path=ppt/ink/ink34.xml><?xml version="1.0" encoding="utf-8"?>
+<inkml:ink xmlns:inkml="http://www.w3.org/2003/InkML">
+  <inkml:definitions>
+    <inkml:context xml:id="ctx0">
+      <inkml:inkSource xml:id="inkSrc0">
+        <inkml:traceFormat>
+          <inkml:channel name="X" type="integer" min="-2.14748E9" max="2.14748E9" units="cm"/>
+          <inkml:channel name="Y" type="integer" min="-2.14748E9" max="2.14748E9" units="cm"/>
+          <inkml:channel name="F" type="integer" max="32767" units="dev"/>
+        </inkml:traceFormat>
+        <inkml:channelProperties>
+          <inkml:channelProperty channel="X" name="resolution" value="1000" units="1/cm"/>
+          <inkml:channelProperty channel="Y" name="resolution" value="1000" units="1/cm"/>
+          <inkml:channelProperty channel="F" name="resolution" value="0" units="1/dev"/>
+        </inkml:channelProperties>
+      </inkml:inkSource>
+      <inkml:timestamp xml:id="ts0" timeString="2018-12-12T16:54:20.463"/>
+    </inkml:context>
+    <inkml:brush xml:id="br0">
+      <inkml:brushProperty name="width" value="0.05" units="cm"/>
+      <inkml:brushProperty name="height" value="0.05" units="cm"/>
+      <inkml:brushProperty name="color" value="#004F8B"/>
+    </inkml:brush>
+  </inkml:definitions>
+  <inkml:trace contextRef="#ctx0" brushRef="#br0">79 40 3456,'-10'-16'2567,"7"14"3020,2 76-4376,-3-1 0,-7 35-1211,8-93-155,3-15-1615,4-31-7793,-4 16 7915</inkml:trace>
+  <inkml:trace contextRef="#ctx0" brushRef="#br0" timeOffset="333.532">26 52 4864,'0'0'91,"0"0"0,0 0 0,0 0 0,0 1 0,0-1 0,-1 0 0,1 0 0,0 1 0,0-1 0,0 0 0,0 0 0,0 0 0,0 1 0,0-1 0,1 0 1,-1 0-1,0 0 0,0 1 0,0-1 0,0 0 0,0 0 0,0 0 0,0 1 0,0-1 0,0 0 0,1 0 0,-1 0 0,0 1 0,0-1 0,0 0 0,0 0 0,1 0 0,-1 0 0,0 0 0,0 0 0,0 1 0,1-1 0,-1 0 0,0 0 1,0 0-1,0 0 0,1 0 0,-1 0 0,0 0 0,0 0 0,0 0 0,1 0 0,-1 0 0,0 0 0,0 0 0,1 0-91,20-1 1177,21-8-1211,-41 9-32,9-4 66,-1 1 0,1 0 0,0 0 0,6 0 0,6 5-3422,-19 1 831,-3-1 4</inkml:trace>
+  <inkml:trace contextRef="#ctx0" brushRef="#br0" timeOffset="664.401">1 175 3328,'2'6'1216,"-2"-6"-928,5 8 672,-3-5 256,3-3-224,1 3-32,4-1-192,0 2-96,2-1-352,1-3-128,0 0-64,0 0-64,-3 0-64,-3 0-64,4-3 32,0-1-1440,-4 2-640,3-1-480</inkml:trace>
+  <inkml:trace contextRef="#ctx0" brushRef="#br0" timeOffset="1147.306">198 29 4224,'0'0'120,"0"0"1,0 0-1,0 0 1,0 0-1,-1 0 1,1 0-1,0 0 1,0-1-1,0 1 1,0 0 0,0 0-1,0 0 1,0 0-1,0 0 1,-1-1-1,1 1 1,0 0-1,0 0 1,0 0-1,0 0 1,0-1-1,0 1 1,0 0-1,0 0 1,0 0-1,0 0 1,0-1-1,0 1 1,0 0-1,0 0 1,0 0-1,0 0 1,0-1-1,1 1 1,-1 0-1,0 0 1,0 0-1,0 0 1,0 0-1,0-1 1,0 1-1,0 0 1,0 0-1,1 0 1,-1 0-1,0 0 1,0 0 0,0 0-1,0 0 1,0-1-1,1 1 1,-1 0-1,0 0 1,0 0-1,0 0 1,0 0-1,1 0 1,-1 0-1,0 0 1,0 0-1,0 0 1,0 0-1,1 0-120,6 3 3290,-4 1-4402,0 4 1149,0-1 0,-1 1 1,0-1-1,-1 1 0,0 0 0,0 0 0,0 0 0,-1 0 0,-1 0 0,1 0 1,-1-1-1,0 1 0,-2 3-37,-1 31-3,0 56 121,8-97-136,1 0 0,-1-1 1,1 1-1,-1-1 0,0 0 0,1 0 1,1-1 17,-2 1-20,4 0 34,-1-1 0,0 0 1,1 0-1,-1-1 0,6-1-14,5-5-3789,-17 7 776,0 1-496,3 0 933</inkml:trace>
+  <inkml:trace contextRef="#ctx0" brushRef="#br0" timeOffset="2115.67">428 23 3456,'12'-4'1509,"-7"7"725,-8 18 1241,-1-8-3712,-1 12 440,-2-1 1,-1 0-1,0 0 0,-2 0 1,-1-1-1,-1-1 0,0 0 1,-7 6-204,37-56-8363,-16 19 6262</inkml:trace>
+  <inkml:trace contextRef="#ctx0" brushRef="#br0" timeOffset="2446.348">438 21 3968,'2'0'254,"0"1"1,0-1-1,0 0 0,0 1 1,0 0-1,-1-1 0,1 1 1,0 0-1,0 0 0,-1 0 1,1 0-1,-1 0 1,1 1-1,-1-1 0,1 0 1,-1 1-1,0-1 0,0 1 1,1-1-1,-1 1 0,0 0 1,0 0-255,20 46 698,-14-31-379,-4-10-597,31 78 445,-25-48-5826,-8-31 2960</inkml:trace>
+  <inkml:trace contextRef="#ctx0" brushRef="#br0" timeOffset="2782.401">379 164 4736,'0'0'1824,"3"-4"-1408,1 4 672,2 4 224,-1-4-288,0 0-32,6-4-384,2 1-128,1 1-256,4-1-160,-3 0-32,3 1-128,-2-5 0,-1 2-1856,0-1-768,3 0-192</inkml:trace>
+  <inkml:trace contextRef="#ctx0" brushRef="#br0" timeOffset="3250.198">733 6 5888,'-1'-1'242,"0"1"0,0-1 0,0 0 1,0 1-1,0-1 0,-1 1 0,1 0 1,0-1-1,0 1 0,-1 0 0,1 0 1,0-1-1,0 1 0,-1 0 0,1 0 0,0 0 1,0 1-1,-1-1 0,1 0 0,0 0 1,0 1-1,-1-1 0,1 1 0,0-1 0,0 1 1,0-1-1,0 1 0,0 0 0,0 0 1,0-1-1,0 1-242,-35 29 1978,31-25-1737,-2 2-134,0 0 0,0 1 1,1-1-1,0 1 0,1 0 1,-3 6-108,6-12-41,1 1 0,0-1 1,0 0-1,0 0 0,0 1 1,0-1-1,1 0 0,-1 1 1,1-1-1,-1 1 1,1-1-1,0 0 0,0 1 1,0-1-1,0 1 0,0-1 1,1 1-1,-1-1 0,1 1 1,0-1-1,-1 0 0,1 1 1,0-1-1,0 0 0,1 0 1,-1 0-1,2 2 41,0-1-333,0-1-1,0 1 1,1-1 0,0 0-1,-1 0 1,1-1-1,0 1 1,0-1 0,0 0-1,0 0 1,2 1 333,-2-1-34,1 0 1,-1 0 0,0 0 0,1 1 0,-1 0-1,0 0 1,0 0 0,0 1 0,0-1-1,1 3 34,-4-5 74,-1 1-1,1-1 0,-1 1 1,1-1-1,-1 1 1,0-1-1,1 1 0,-1-1 1,0 1-1,0-1 0,1 1 1,-1 0-1,0-1 1,0 1-1,0 0 0,0-1 1,0 1-1,0-1 0,0 1 1,0 0-1,0-1 1,0 1-1,0 0 0,0-1 1,0 1-1,0 0 0,0-1 1,-1 1-74,-14 16 1178,-24 5-416,38-22-901,-39 12-513,23-10-8738,17-2 6430</inkml:trace>
+  <inkml:trace contextRef="#ctx0" brushRef="#br0" timeOffset="3579.544">809 21 4352,'-1'1'277,"0"0"0,0-1 1,0 1-1,0 0 0,0 0 0,0 0 1,1 0-1,-1 1 0,0-1 0,0 0 1,1 0-1,-1 0 0,1 1 0,-1-1 1,1 0-1,0 0 0,-1 1 0,1-1 1,0 1-278,-5 35 1758,3-17-1462,-31 120-93,32-130-4549,1-7 548,0-2 1569</inkml:trace>
+  <inkml:trace contextRef="#ctx0" brushRef="#br0" timeOffset="3916.22">903 35 4224,'3'9'1164,"-2"0"1,0 0-1,0 1 1,0-1-1,-1 1 0,-2 7-1164,2 18 1099,1-21-1033,-1 0 0,-1 0-1,0-1 1,-1 1 0,0 0 0,-1-1-1,-1 1 1,0-1 0,-3 4-66,7-17-89,0 0 0,0 1-1,-1-1 1,1 0 0,0 1 0,-1-1 0,1 0 0,0 0-1,-1 1 1,1-1 0,-1 0 0,1 0 0,0 0 0,-1 0-1,1 0 1,-1 1 0,1-1 0,0 0 0,-1 0 0,1 0-1,-1 0 1,1 0 0,-1 0 0,1 0 0,0-1 0,-1 1-1,1 0 1,-1 0 0,1 0 0,0 0 0,-1 0 0,1-1-1,-1 1 1,1 0 0,0 0 0,-1-1 0,1 1 0,0 0-1,-1 0 1,1-1 0,0 1 0,0 0 0,-1-1 0,1 1-1,0-1 1,0 1 0,0 0 0,-1-1 0,1 1 0,0-1 89,-18-24-5764,15 20 4456,-4-3 417</inkml:trace>
+  <inkml:trace contextRef="#ctx0" brushRef="#br0" timeOffset="4271.082">761 175 1536,'-7'-1'-1306,"0"2"7322,7 1 545,9-2-4184,57-14-810,-26 4-3319,1 4-3455,-23 6 1911</inkml:trace>
+</inkml:ink>
+</file>
+
+<file path=ppt/ink/ink35.xml><?xml version="1.0" encoding="utf-8"?>
+<inkml:ink xmlns:inkml="http://www.w3.org/2003/InkML">
+  <inkml:definitions>
+    <inkml:context xml:id="ctx0">
+      <inkml:inkSource xml:id="inkSrc0">
+        <inkml:traceFormat>
+          <inkml:channel name="X" type="integer" min="-2.14748E9" max="2.14748E9" units="cm"/>
+          <inkml:channel name="Y" type="integer" min="-2.14748E9" max="2.14748E9" units="cm"/>
+          <inkml:channel name="F" type="integer" max="32767" units="dev"/>
+        </inkml:traceFormat>
+        <inkml:channelProperties>
+          <inkml:channelProperty channel="X" name="resolution" value="1000" units="1/cm"/>
+          <inkml:channelProperty channel="Y" name="resolution" value="1000" units="1/cm"/>
+          <inkml:channelProperty channel="F" name="resolution" value="0" units="1/dev"/>
+        </inkml:channelProperties>
+      </inkml:inkSource>
+      <inkml:timestamp xml:id="ts0" timeString="2018-12-12T16:54:47.583"/>
+    </inkml:context>
+    <inkml:brush xml:id="br0">
+      <inkml:brushProperty name="width" value="0.05" units="cm"/>
+      <inkml:brushProperty name="height" value="0.05" units="cm"/>
+      <inkml:brushProperty name="color" value="#004F8B"/>
+    </inkml:brush>
+  </inkml:definitions>
+  <inkml:trace contextRef="#ctx0" brushRef="#br0">72 1 3968,'-4'0'5391,"-10"6"-3966,9 3-1173,0 0 0,1 0 1,0 0-1,0 0 0,1 1 0,0-1 1,1 1-1,0 0 0,0 0 0,1 5-252,-4 12 587,0-1-202,1 0 0,2 1 0,0-1 0,2 7-385,0-24-181,0 0 0,1 0 0,0-1 1,1 1-1,0 0 0,0-1 0,1 0 0,0 1 0,0-1 0,1 0 1,0 0-1,1-1 0,-1 1 0,5 3 181,0-2-2923,3-3-559</inkml:trace>
+  <inkml:trace contextRef="#ctx0" brushRef="#br0" timeOffset="57293.871">313 46 4736,'1'0'237,"-1"-1"0,0 1 0,0-1 0,0 1 1,0-1-1,0 1 0,-1-1 0,1 1 0,0-1 0,0 1 1,0-1-1,0 1 0,0-1 0,-1 1 0,1-1 0,0 1 0,0 0 1,-1-1-1,1 1 0,0 0 0,-1-1 0,1 1 0,0-1 1,-1 1-1,1 0 0,-1 0 0,1-1 0,0 1 0,-1 0 1,1 0-1,-1 0 0,1-1 0,-1 1 0,1 0 0,-1 0 0,1 0 1,-1 0-238,-22 5 2088,-21 20-2173,39-22 137,-5 4 19,0 0 0,0 1-1,1 0 1,-7 8-71,15-15-8,-1 0 0,1 0 1,0 0-1,0 0 0,0 1 0,0-1 0,0 0 0,0 1 1,0-1-1,1 1 0,-1-1 0,0 1 0,1-1 0,-1 1 1,1-1-1,0 1 0,-1 0 0,1-1 0,0 1 0,0 0 1,0-1-1,0 1 0,0 0 0,0-1 0,1 1 0,-1 0 1,1-1-1,-1 1 0,1-1 0,-1 1 0,1-1 1,0 1-1,0-1 0,0 1 0,0-1 0,0 0 0,0 0 1,1 1 7,87 81-4166,-88-83 4175,0 1 0,-1-1 0,1 1 0,-1 0 0,1-1 1,-1 1-1,0-1 0,1 1 0,-1 0 0,0 0 0,1-1 0,-1 1 0,0 0 0,0 0 0,1-1 0,-1 1 0,0 0 0,0 0 0,0-1 0,0 1 0,0 0 0,0 0 0,0 0 0,0-1 0,-1 1 0,1 0 0,0 0 0,0-1 0,-1 1 0,1 0-9,-1 1 90,-1-1-1,1 1 0,0 0 0,-1-1 0,0 0 0,1 1 0,-1-1 0,0 0 0,1 0 0,-1 1 1,-2-1-90,-5 3 293,0 0 1,-1 0 0,1-1 0,-7 0-294,-38 3-147,31-6-4513,20 0 3894,3 0-2743,0 0 666</inkml:trace>
+  <inkml:trace contextRef="#ctx0" brushRef="#br0" timeOffset="57633.465">311 175 4736,'-5'14'1760,"3"-8"-1376,2 14 320,0-14 96,0 5-96,0 1-32,2-4-96,1 1-32,-3 2-288,0 3-32,0-2 96,-3-4-128,1 1-32,-1-3-160,1-4-64,0 1-1824,2-3-704,0 0-192</inkml:trace>
+  <inkml:trace contextRef="#ctx0" brushRef="#br0" timeOffset="57960.992">367 49 7680,'13'-8'2880,"-8"5"-2240,-3 0-96,-2 3-224,0 0-544,0 0-96,6 0-2464,-6 3-1088,5 2 1472,0 1 800</inkml:trace>
+  <inkml:trace contextRef="#ctx0" brushRef="#br0" timeOffset="58315.689">411 143 3840,'-1'0'1608,"0"3"3516,2 10-4358,-3 8 873,0 0 1,-1 0-1,-1-1 0,-1 1 0,-2 1-1639,2-3 305,5-19-315,0 0 0,0 0-1,0 0 1,0 0 0,-1 1 0,1-1-1,0 0 1,0 0 0,0 1-1,0-1 1,0 0 0,0 0-1,0 0 1,-1 1 0,1-1-1,0 0 1,0 0 0,0 1-1,0-1 1,0 0 0,0 0 0,0 1-1,0-1 1,0 0 0,1 0-1,-1 1 1,0-1 0,0 0-1,0 0 1,0 1 0,0-1-1,0 0 1,0 0 0,0 0-1,1 1 1,-1-1 0,0 0 0,0 0-1,0 0 1,1 0 0,-1 1-1,0-1 1,0 0 0,1 0 10,9-8-1075,11-18-579,-20 25 1658,-1 0-8,1 0-1,-1 0 1,1 0 0,-1 1-1,1-1 1,-1 0 0,1 0-1,0 0 1,-1 0 0,1 1-1,0-1 1,0 0 0,-1 1-1,1-1 1,0 1 0,0-1 0,0 1-1,0-1 1,0 1 0,0-1-1,0 1 1,0 0 0,0 0-1,0-1 1,0 1 0,0 0-1,0 0 1,0 0 0,0 0 0,0 0-1,0 1 1,0-1 0,1 0 4,-1 2 134,1-1 1,-1 0 0,0 1-1,0 0 1,0-1-1,-1 1 1,1-1 0,0 1-1,-1 0 1,1 0 0,-1-1-1,1 1 1,-1 0 0,0 0-1,1 0 1,-1 0-1,0-1 1,-1 1 0,1 1-135,0 7 122,0 16-170,8-14-6453,-3-8 2427</inkml:trace>
+  <inkml:trace contextRef="#ctx0" brushRef="#br0" timeOffset="58946.225">608 272 5120,'14'-25'6887,"-2"-7"-3662,-11 29-3163,0 0 1,0 0-1,-1 0 1,1 0-1,-1 0 1,0 0-1,0-1 1,0 1-1,0 0 1,0 0-1,-1 0 1,1 0-1,-1 0 1,0 0-1,0 0 1,0 0-1,0 0 1,-1-2-63,1 5 27,1-1 1,0 1-1,-1-1 1,1 1-1,-1 0 0,1-1 1,-1 1-1,1-1 1,0 1-1,-1 0 1,1-1-1,-1 1 0,0 0 1,1 0-1,-1-1 1,1 1-1,-1 0 0,1 0 1,-1 0-1,0 0 1,1 0-1,-1 0 1,1 0-1,-1 0 0,0 0 1,1 0-1,-1 0 1,1 0-1,-1 0-27,-18 13 1023,-8 23 657,21-26-1478,-1 1-114,1-1 0,0 1 1,1 1-1,0-1 0,1 1 0,-2 7-88,6-18-18,0-1-1,0 0 1,0 0-1,0 1 1,0-1-1,0 0 1,0 0-1,0 1 1,0-1-1,0 0 1,0 1-1,0-1 1,0 0-1,0 1 1,0-1 0,0 0-1,0 0 1,0 1-1,0-1 1,0 0-1,0 0 1,1 1-1,-1-1 1,0 0-1,0 0 1,0 1-1,1-1 1,-1 0-1,0 0 1,0 0 0,0 1-1,1-1 1,-1 0-1,0 0 19,12-3-1040,15-15-778,-21 14 1715,-5 3 103,0 0 0,1 0 0,-1 0 1,1 1-1,-1-1 0,1 0 0,-1 1 1,1-1-1,-1 1 0,1-1 0,0 1 0,-1 0 1,1-1-1,0 1 0,-1 0 0,1 0 1,0 0-1,-1 1 0,1-1 0,0 0 0,-1 1 1,2-1-1,-2 1 6,0 0 0,1 0 0,-1 1-1,0-1 1,0 0 0,0 0 0,0 1 0,0-1 0,0 0 0,0 1 0,0-1 0,-1 1 0,1-1 0,-1 1 0,1-1 0,-1 1 0,1 0 0,-1 0-6,2 10 280,-1 0 1,-1 0-1,0 0 1,-1-1-1,-1 8-280,1-9 91,0 0 0,-1 1-1,-1-1 1,1-1 0,-2 1-1,1 0 1,-2-1 0,1 0-1,-1 1 1,-2 1-91,6-9 21,-1 1 1,0-1-1,0 1 1,-1-1-1,1 0 1,0 0-1,-1 0 1,1 0-1,-1 0 1,1 0-1,-1-1 1,0 0-1,0 1 1,0-1-1,0 0 1,0 0-1,0 0 1,0-1-1,0 1 1,0-1-1,0 0 1,-1 0-1,1 0 1,0 0-1,0 0 1,0-1-1,0 1 1,0-1-1,0 0 1,0 0-1,0 0 1,0 0-1,0-1 1,0 1-1,0-1-21,3 2-2,-4-2-294,1 0 0,-1 0 0,0 0 1,1 0-1,0-1 0,-1 1 0,-2-4 296,5 5-323,1 0 0,-1 0 0,0 0 0,1 0 0,-1 0 0,0 0 0,1-1 0,0 1 0,-1 0 0,1 0 0,0-1 0,-1 1 0,1 0 0,0 0-1,0-1 1,0 1 0,0 0 0,0-1 323,2-9-3834</inkml:trace>
+  <inkml:trace contextRef="#ctx0" brushRef="#br0" timeOffset="59494.289">660 237 4864,'0'1'275,"1"0"-1,-1-1 1,0 1 0,1 0 0,-1-1-1,0 1 1,1-1 0,-1 1 0,1-1-1,-1 1 1,0-1 0,1 1 0,0-1-1,-1 1 1,1-1 0,-1 0 0,1 1-1,-1-1 1,1 0 0,0 1 0,-1-1-1,1 0 1,0 0 0,-1 0 0,1 0-1,0 1 1,-1-1 0,1 0 0,0 0-1,0 0-274,26-8 3528,-21 4-3343,0 1 0,1-1 1,-1 0-1,-1-1 0,1 0 0,0 1 0,-1-2-185,-4 5 21,1 0-1,-1-1 1,0 1 0,0-1-1,0 0 1,0 1 0,0-1-1,0 0 1,0 1 0,-1-1-1,1 0 1,-1 0-1,1 0 1,-1 0 0,1 0-1,-1 0 1,0 1 0,0-1-1,0 0 1,0 0 0,-1 0-1,1 0 1,0 0 0,-1 0-1,0-1-20,1 2-3,-1 1-1,1-1 0,0 1 1,-1-1-1,1 1 1,-1-1-1,1 1 1,-1 0-1,1-1 0,-1 1 1,1 0-1,-1-1 1,0 1-1,1 0 0,-1-1 1,1 1-1,-1 0 1,0 0-1,1 0 1,-1 0-1,0 0 0,1 0 1,-1 0-1,0 0 1,1 0-1,-1 0 4,-1 0-20,-1 1-1,1 0 0,0 0 1,0-1-1,0 1 1,1 0-1,-1 1 0,0-1 1,0 0-1,0 0 1,1 1-1,-2 1 21,-3 3-24,0 1 0,1-1 0,0 1 0,1 0 0,0 0 0,0 1 0,0-1 0,0 4 24,2-7 82,0 1 0,0-1 0,1 0 0,0 1 0,0-1 0,0 1 0,1-1 0,0 1 0,-1-1 0,1 1 0,1 0 0,-1-1 0,1 1 0,0-1 0,0 1 0,0-1-82,0-2 14,0 0-1,1-1 0,-1 1 1,1-1-1,-1 0 1,1 1-1,-1-1 1,1 0-1,-1 0 1,1 0-1,0 0 0,0 0 1,0-1-1,0 1 1,-1 0-1,1-1 1,0 1-1,0-1 1,0 0-1,0 0 1,0 0-1,0 0 0,0 0 1,0 0-1,0 0 1,0-1-1,0 1 1,0-1-1,0 1 1,0-1-1,0 0-13,7-1-442,1-1 0,-1 0 1,0-1-1,0 0 0,7-5 442,21-17-4821,-8 5-4923,-24 17 7899</inkml:trace>
+  <inkml:trace contextRef="#ctx0" brushRef="#br0" timeOffset="59830.332">901 187 8320,'7'126'14596,"-7"-119"-13118,0-7-1506,11-61-1247,-11 58 1161,1-1-1,0 1 1,0 0-1,1-1 0,-1 1 1,1 0-1,-1 0 1,1 0-1,0 0 0,0 1 1,0-1-1,1 0 1,-1 1-1,1 0 1,-1-1-1,2 1 115,0 0-955,0 1 0,0 0 1,0 1-1,0-1 0,1 1 0,-1 0 0,0 0 0,0 0 1,0 0-1,2 1 955,8 0-5726,-4-1 2110</inkml:trace>
+</inkml:ink>
+</file>
+
+<file path=ppt/ink/ink36.xml><?xml version="1.0" encoding="utf-8"?>
+<inkml:ink xmlns:inkml="http://www.w3.org/2003/InkML">
+  <inkml:definitions>
+    <inkml:context xml:id="ctx0">
+      <inkml:inkSource xml:id="inkSrc0">
+        <inkml:traceFormat>
+          <inkml:channel name="X" type="integer" min="-2.14748E9" max="2.14748E9" units="cm"/>
+          <inkml:channel name="Y" type="integer" min="-2.14748E9" max="2.14748E9" units="cm"/>
+          <inkml:channel name="F" type="integer" max="32767" units="dev"/>
+        </inkml:traceFormat>
+        <inkml:channelProperties>
+          <inkml:channelProperty channel="X" name="resolution" value="1000" units="1/cm"/>
+          <inkml:channelProperty channel="Y" name="resolution" value="1000" units="1/cm"/>
+          <inkml:channelProperty channel="F" name="resolution" value="0" units="1/dev"/>
+        </inkml:channelProperties>
+      </inkml:inkSource>
+      <inkml:timestamp xml:id="ts0" timeString="2018-12-12T16:55:52.182"/>
+    </inkml:context>
+    <inkml:brush xml:id="br0">
+      <inkml:brushProperty name="width" value="0.05" units="cm"/>
+      <inkml:brushProperty name="height" value="0.05" units="cm"/>
+      <inkml:brushProperty name="color" value="#004F8B"/>
+    </inkml:brush>
+  </inkml:definitions>
+  <inkml:trace contextRef="#ctx0" brushRef="#br0">64 123 1920,'0'0'68,"0"0"0,0 0-1,0 0 1,0 0 0,-1 0 0,1 0 0,0 0-1,0 0 1,0 0 0,0 0 0,0 0 0,-1 0-1,1 0 1,0 0 0,0 0 0,0 0 0,0 0 0,0 0-1,-1 0 1,1 0 0,0-1 0,0 1 0,0 0-1,0 0 1,0 0 0,0 0 0,0 0 0,0 0-1,0-1 1,-1 1 0,1 0 0,0 0 0,0 0-1,0 0 1,0 0 0,0-1 0,0 1 0,0 0 0,0 0-1,0 0 1,0 0 0,0 0 0,0-1 0,0 1-1,0 0 1,0 0 0,0 0 0,0 0 0,0 0-1,1-1-67,5-10 1589,-5 10-1492,0 0 1,1-1 0,-1 1-1,0 0 1,0 0-1,1 0 1,-1 0-1,1 0 1,-1 0 0,1 0-1,0 0 1,-1 0-1,1 1 1,0-1-1,0 1-97,1 0 18,0 0-1,0 0 0,-1 0 1,1 1-1,0-1 0,0 1 1,0 0-1,0 0 0,-1 0 1,1 0-1,0 0 0,-1 1 1,1-1-1,-1 1 0,1 0 1,-1-1-1,0 1 0,0 0 1,0 0-1,0 1 0,0-1 1,0 0-1,0 1 0,-1-1 1,0 1-1,1 0 0,-1-1 1,0 1-1,0 0 0,0 0 1,-1-1-1,1 1 0,-1 0 1,1 0-1,-1 0 0,0 0 1,0 0-1,0 0 0,-1 0 1,1 0-1,-1 0 0,1 0 1,-1-1-1,-1 3-17,-2 7 11,-1-1-1,0 0 1,-1 0 0,0 0 0,-1-1-1,0 0 1,-1 0 0,-5 4-11,-6 6-192,-1-2-1,0 0 1,-10 5 192,25-20 138,15-8-174,0 3 47,-1 1 0,1 0 0,-1 0 0,1 1 0,8 1-11,5 0 35,-17-1-29,0 0-1,0 0 0,0 0 1,0-1-1,0 0 0,0 0 1,0-1-1,-1 1 0,1-1 1,1-1-6,-6 2-171,6-4-4714,-1 2 2629</inkml:trace>
+  <inkml:trace contextRef="#ctx0" brushRef="#br0" timeOffset="472.009">238 241 3072,'-5'27'5387,"-2"15"-4365,7-41-1010,0 0 0,0 0 0,0 0 0,0 1 0,0-1 0,0 0 0,0 0 0,1 0 0,-1 0 0,0 0 0,1 0 0,-1 0 0,1 0 0,-1 0 0,1 0 0,-1 0 0,1 0 0,0 0 0,0 0 0,-1 0 0,1-1 0,0 1 0,0 0 0,0-1 0,0 1 0,0 0 0,0-1 0,0 1 0,1-1-12,0 1 28,0-1 0,0 0 1,0 1-1,0-1 0,0 0 0,1 0 1,-1-1-1,0 1 0,0 0 0,0-1 0,0 1 1,0-1-1,0 0 0,0 0 0,0 0 0,0 0 1,0 0-1,-1 0 0,1 0 0,0-1 1,-1 1-1,1 0 0,-1-1 0,1 1 0,-1-1 1,0 0-1,1 0 0,-1 1 0,0-1 1,0 0-1,0-1-28,2-3 215,0 0 0,0 0 0,0 0 0,-1-1 0,0 1 0,0-1 0,0 1 1,-1-1-1,0 0-215,-1-1 186,0 1 1,-1 0-1,0 0 0,0-1 1,0 1-1,-3-6-186,3 11-4,1 0-1,0 0 0,-1 0 1,0 0-1,1 1 0,-1-1 1,0 0-1,0 1 0,0-1 0,0 0 1,0 1-1,-1-1 0,1 1 1,0-1-1,-1 1 0,1 0 1,-1 0-1,1 0 0,-1 0 0,0 0 1,1 0-1,-1 0 0,0 0 1,0 0-1,0 1 0,0-1 1,-1 1 4,1 0-41,1 0 0,-1 1 1,0-1-1,0 1 0,0-1 1,1 1-1,-1 0 1,0 0-1,1-1 0,-1 1 1,1 1-1,-1-1 0,1 0 1,-1 0-1,1 0 0,0 1 1,0-1-1,0 1 1,0-1-1,0 1 0,0-1 1,0 1-1,0 0 41,-1 0-547,1 1 1,0-1-1,0 1 1,0-1-1,0 1 1,0 0-1,1 0 1,-1 0-1,1-1 0,0 1 1,0 0-1,0 0 1,0 0-1,0 1 547,5 8-2933</inkml:trace>
+  <inkml:trace contextRef="#ctx0" brushRef="#br0" timeOffset="1023.438">397 221 3328,'2'-2'6655,"5"-4"-5998,2-16-255,-7 15-474,0-1 0,1 1 0,0 0 0,1 0 0,-1 1 0,1-1 0,3-3 72,-2 36-378,-20 187 1866,15-213-1543,0 0 1,0 0-1,0 0 1,0 0-1,0 0 1,1 0 0,-1-1-1,0 1 1,0 0-1,0 0 1,0 0-1,0 0 1,0 0 0,0 0-1,0 0 1,0 0-1,0 0 1,1-1-1,-1 1 1,0 0 0,0 0-1,0 0 1,0 0-1,0 0 1,0 0-1,0 0 1,1 0 0,-1 0-1,0 0 1,0 0-1,0 0 1,0 0-1,0 0 1,0 0 0,1 0-1,-1 0 1,0 0-1,0 0 1,0 0-1,0 0 1,0 0 0,0 0-1,0 0 1,1 0-1,-1 1 1,0-1-1,0 0 1,0 0-1,0 0 1,0 0 0,0 0-1,0 0 1,0 0-1,0 0 1,1 0-1,-1 1 1,0-1 0,0 0-1,0 0 1,0 0-1,0 0 1,0 0-1,0 0 55,5-5-2650</inkml:trace>
+  <inkml:trace contextRef="#ctx0" brushRef="#br0" timeOffset="1686.635">533 189 2944,'3'-4'638,"1"0"1,1 0-1,-1 1 0,0 0 0,1 0 1,0 0-1,0 0 0,1 0-638,-4 2 184,-1 0-155,0 0-1,0 0 0,0 1 0,1-1 1,-1 0-1,0 1 0,0-1 0,1 1 1,-1-1-1,0 1 0,1-1 0,-1 1 0,0 0 1,1 0-1,-1 0 0,0 0 0,1 0 1,-1 0-1,0 0 0,1 0 0,-1 1 1,1-1-1,-1 0 0,0 1 0,0-1 0,1 1-28,-1 0 27,0 0-1,0 1 1,0-1-1,0 0 1,-1 1-1,1-1 0,0 1 1,-1-1-1,1 1 1,-1-1-1,1 1 1,-1 0-1,0-1 0,0 1 1,1-1-1,-1 1 1,-1 0-1,1 0-26,0 8 40,-1-1 0,-1 1-1,0-1 1,0 0 0,-1 0 0,0 0-1,-1 1-39,1-1 11,-2-1 1,1 0-1,-1-1 0,-1 1 0,1-1 0,-1 0 0,0 0 0,-1-1 0,0 1 0,0-1 1,0-1-1,-8 5-11,3 0 65,12-10-65,0 1 0,0-1 0,0 0 0,0 0 0,0 0 0,0 0 0,0 1 0,0-1 0,0 0 0,0 0 0,0 0 0,0 0 0,0 0 1,0 1-1,0-1 0,0 0 0,0 0 0,0 0 0,0 0 0,0 0 0,0 1 0,0-1 0,1 0 0,-1 0 0,0 0 0,0 0 0,0 0 0,0 0 0,0 0 1,0 0-1,0 1 0,1-1 0,-1 0 0,0 0 0,0 0 0,0 0 0,0 0 0,0 0 0,1 0 0,-1 0 0,0 0 0,0 0 0,0 0 0,0 0 0,1 0 0,29 0-26,-16-1 70,92-10 1236,-105 11-1083,-1 0-90,0 0-224,0 0-529,0 0-452,2-4-3707,3-1 2026</inkml:trace>
+  <inkml:trace contextRef="#ctx0" brushRef="#br0" timeOffset="2209.203">708 9 2816,'2'-1'346,"0"0"1,0 0-1,0 0 0,0 0 1,0 0-1,0 1 0,0-1 1,0 1-1,0-1 0,0 1 1,0 0-1,0 0 0,0 0 1,0 0-1,1 0 0,-1 0 1,0 1-1,0-1 1,0 1-1,0-1 0,1 1-346,0 1 182,1 0-1,-1 0 0,0 0 1,0 1-1,0-1 0,0 1 1,0-1-1,0 1 0,-1 0 1,1 0-1,0 2-181,3 4 158,0 1 0,-1-1 0,0 1 0,-1 1 1,0-1-1,0 0 0,-1 1 0,-1 0-158,1 6 382,0-1 1,-2 1-1,0 0 0,-1 0 1,-1 0-1,0 0 0,-2 0 1,0-1-1,0 1 0,-2-1 0,0 0 1,0 0-1,-2 0 0,0-1 1,-1 0-1,-2 2-382,1-5-160,-5 8-1297,9-9-9838,5-8 7301</inkml:trace>
+</inkml:ink>
+</file>
+
+<file path=ppt/ink/ink37.xml><?xml version="1.0" encoding="utf-8"?>
+<inkml:ink xmlns:inkml="http://www.w3.org/2003/InkML">
+  <inkml:definitions>
+    <inkml:context xml:id="ctx0">
+      <inkml:inkSource xml:id="inkSrc0">
+        <inkml:traceFormat>
+          <inkml:channel name="X" type="integer" min="-2.14748E9" max="2.14748E9" units="cm"/>
+          <inkml:channel name="Y" type="integer" min="-2.14748E9" max="2.14748E9" units="cm"/>
+          <inkml:channel name="F" type="integer" max="32767" units="dev"/>
+        </inkml:traceFormat>
+        <inkml:channelProperties>
+          <inkml:channelProperty channel="X" name="resolution" value="1000" units="1/cm"/>
+          <inkml:channelProperty channel="Y" name="resolution" value="1000" units="1/cm"/>
+          <inkml:channelProperty channel="F" name="resolution" value="0" units="1/dev"/>
+        </inkml:channelProperties>
+      </inkml:inkSource>
+      <inkml:timestamp xml:id="ts0" timeString="2018-12-12T16:56:13.223"/>
+    </inkml:context>
+    <inkml:brush xml:id="br0">
+      <inkml:brushProperty name="width" value="0.05" units="cm"/>
+      <inkml:brushProperty name="height" value="0.05" units="cm"/>
+      <inkml:brushProperty name="color" value="#004F8B"/>
+    </inkml:brush>
+  </inkml:definitions>
+  <inkml:trace contextRef="#ctx0" brushRef="#br0">181 0 4992,'0'5'1824,"-5"3"-1408,5 4 576,0-5 256,0 4-576,0 1-192,0 3-224,0 5-96,0-4-96,0-4-64,0-1 32,0-8-1088,0 1-416,0 0-1312</inkml:trace>
+  <inkml:trace contextRef="#ctx0" brushRef="#br0" timeOffset="1897.214">0 303 2560,'1'-1'543,"-1"-1"0,0 0 1,0 0-1,1 0 0,-1 0 0,1 0 0,0 0 1,0 0-1,-1 1 0,1-1 0,1-1-543,9-9-279,-6 7 317,1 0 0,0 0 1,1 0-1,-1 1 0,1 0 0,0 1 1,2-2-39,-8 5-5,0-1 0,1 1 0,-1-1 0,0 1-1,0 0 1,1-1 0,-1 1 0,0 0 0,0 0 0,1 0 0,-1 0 0,0 0 0,0 0 0,1 1 0,-1-1 0,0 0 0,0 0 0,1 1 0,-1-1 0,0 1 0,0-1 0,0 1 0,0 0 0,0-1 0,0 1 0,0 0 0,0 0 0,0 0 0,0 0 0,0 0 0,0 0 0,-1 0 0,1 0 0,0 0 0,-1 0 0,1 0 0,-1 0 0,1 0 0,-1 1 0,0-1 0,1 0 0,-1 0 0,0 1-1,0-1 1,0 0 0,0 0 0,0 1 0,0 0 5,1 7 2,-1 1 0,0 0-1,0-1 1,-1 1-1,-1 0 1,1-1-1,-2 1 1,1-1 0,-3 4-2,4-7 13,-1-1 1,0 0 0,0 0 0,-1 0 0,0 0 0,0-1 0,0 1 0,0-1 0,-1 0 0,1 1 0,-1-2 0,0 1-1,0 0 1,-1-1 0,1 0 0,-1 0 0,-1 1-14,3-2-13,0-1 1,1 1-1,-1 0 0,1 0 0,0 0 0,-1 0 1,1 1-1,0-1 0,-1 2 13,3-3 9,-1-1-1,1 1 1,-1-1-1,1 0 1,0 1-1,-1-1 1,1 1-1,-1 0 1,1-1-1,0 1 1,0-1-1,-1 1 1,1-1-1,0 1 1,0 0 0,0-1-1,0 1 1,-1 0-1,1-1 1,0 1-1,0 0 1,0-1-1,0 1 1,1 0-1,-1-1 1,0 1-1,0-1 1,0 1-1,0 0 1,1-1-1,-1 1 1,0-1 0,1 1-1,-1 0 1,0-1-1,1 1 1,-1-1-1,1 1 1,-1-1-1,1 0 1,-1 1-1,1-1 1,-1 1-1,1-1 1,-1 0-1,1 1-8,4 1 555,-3-1-487,1 0 1,0 0-1,0 0 0,0 0 1,0 0-1,0 0 1,0-1-1,0 0 0,0 1 1,0-1-1,0 0 1,0-1-1,0 1 0,0 0 1,0-1-1,0 0 1,1 0-69,95-22-2214,-88 12-2420,-4 7 2458</inkml:trace>
+  <inkml:trace contextRef="#ctx0" brushRef="#br0" timeOffset="3345.718">255 218 2304,'0'-2'365,"1"0"0,-1 0 0,1 0-1,-1 0 1,1 0 0,0 0 0,0 0 0,0 0 0,0 0 0,0 1 0,0-1-1,1 0 1,-1 1 0,0-1 0,1 1 0,0 0 0,-1-1 0,1 1 0,0 0-1,-1 0 1,1 0 0,0 0 0,0 0 0,1 0-365,-3 1 1,1 0 0,-1 1 1,1-1-1,-1 0 0,1 0 0,-1 1 0,1-1 1,-1 0-1,1 1 0,-1-1 0,1 0 0,-1 1 1,1-1-1,-1 1 0,0-1 0,1 1 0,-1-1 0,0 1 1,1-1-1,-1 1 0,0-1 0,0 1 0,1 0 1,-1-1-1,0 1 0,0-1 0,0 1 0,0 0 1,0-1-1,0 1 0,0-1 0,0 1 0,0 0 1,0-1-1,0 1 0,0-1 0,-1 1 0,1 0 1,0 0-2,-8 30 25,7-24-22,-11 31 9,9-33-10,1 1-1,0-1 1,0 1 0,1 0-1,0 0 1,0 0-1,0 0 1,1 0 0,-1 0-1,1 0 1,1 0 0,0 4-2,-1-9 14,1 1 1,-1-1 0,1 0 0,0 0 0,-1 0-1,1 1 1,0-1 0,0 0 0,0 0 0,0 0-1,0 0 1,0 0 0,0-1 0,0 1 0,0 0-1,0 0 1,0-1 0,0 1 0,1-1 0,-1 1-1,0-1 1,0 1 0,1-1 0,-1 0 0,2 1-15,41 0 757,-39-2-765,0 1 1,0 0-1,0 0 1,0 1 0,0-1-1,3 2 8,2 6-2722,-12-1-4182,1-7 5272</inkml:trace>
+  <inkml:trace contextRef="#ctx0" brushRef="#br0" timeOffset="3662.732">379 195 4736,'-2'27'6047,"-4"7"-3602,-3 28-633,-1 143-186,12-195-3476,-2-10 1665,0 0-1,1 1 1,-1-1 0,0 0-1,0 0 1,1 0 0,-1 0-1,0 0 1,0 0-1,1 0 1,-1 0 0,0 0-1,0 0 1,0 0 0,1 0-1,-1 0 1,0 0-1,0 0 1,1 0 0,-1 0-1,0 0 1,0-1 0,1 1-1,-1 0 1,0 0-1,0 0 1,0 0 0,1 0-1,-1-1 1,0 1 0,0 0-1,0 0 1,0 0-1,1-1 1,-1 1 0,0 0-1,0 0 1,0 0 0,0-1-1,0 1 1,0 0 185,7-11-4304</inkml:trace>
+</inkml:ink>
+</file>
+
+<file path=ppt/ink/ink38.xml><?xml version="1.0" encoding="utf-8"?>
+<inkml:ink xmlns:inkml="http://www.w3.org/2003/InkML">
+  <inkml:definitions>
+    <inkml:context xml:id="ctx0">
+      <inkml:inkSource xml:id="inkSrc0">
+        <inkml:traceFormat>
+          <inkml:channel name="X" type="integer" min="-2.14748E9" max="2.14748E9" units="cm"/>
+          <inkml:channel name="Y" type="integer" min="-2.14748E9" max="2.14748E9" units="cm"/>
+          <inkml:channel name="F" type="integer" max="32767" units="dev"/>
+        </inkml:traceFormat>
+        <inkml:channelProperties>
+          <inkml:channelProperty channel="X" name="resolution" value="1000" units="1/cm"/>
+          <inkml:channelProperty channel="Y" name="resolution" value="1000" units="1/cm"/>
+          <inkml:channelProperty channel="F" name="resolution" value="0" units="1/dev"/>
+        </inkml:channelProperties>
+      </inkml:inkSource>
+      <inkml:timestamp xml:id="ts0" timeString="2018-12-12T16:56:32.533"/>
+    </inkml:context>
+    <inkml:brush xml:id="br0">
+      <inkml:brushProperty name="width" value="0.05" units="cm"/>
+      <inkml:brushProperty name="height" value="0.05" units="cm"/>
+      <inkml:brushProperty name="color" value="#004F8B"/>
+    </inkml:brush>
+  </inkml:definitions>
+  <inkml:trace contextRef="#ctx0" brushRef="#br0">0 1 2048,'5'4'768,"-5"-4"-576,10 3 0,-10-3-32,7 0-192,0 0 32,3 0-416,-3 0-224,3-3-160,-3 3 0</inkml:trace>
+</inkml:ink>
+</file>
+
+<file path=ppt/ink/ink39.xml><?xml version="1.0" encoding="utf-8"?>
+<inkml:ink xmlns:inkml="http://www.w3.org/2003/InkML">
+  <inkml:definitions>
+    <inkml:context xml:id="ctx0">
+      <inkml:inkSource xml:id="inkSrc0">
+        <inkml:traceFormat>
+          <inkml:channel name="X" type="integer" min="-2.14748E9" max="2.14748E9" units="cm"/>
+          <inkml:channel name="Y" type="integer" min="-2.14748E9" max="2.14748E9" units="cm"/>
+          <inkml:channel name="F" type="integer" max="32767" units="dev"/>
+        </inkml:traceFormat>
+        <inkml:channelProperties>
+          <inkml:channelProperty channel="X" name="resolution" value="1000" units="1/cm"/>
+          <inkml:channelProperty channel="Y" name="resolution" value="1000" units="1/cm"/>
+          <inkml:channelProperty channel="F" name="resolution" value="0" units="1/dev"/>
+        </inkml:channelProperties>
+      </inkml:inkSource>
+      <inkml:timestamp xml:id="ts0" timeString="2018-12-12T16:56:32.999"/>
+    </inkml:context>
+    <inkml:brush xml:id="br0">
+      <inkml:brushProperty name="width" value="0.05" units="cm"/>
+      <inkml:brushProperty name="height" value="0.05" units="cm"/>
+      <inkml:brushProperty name="color" value="#004F8B"/>
+    </inkml:brush>
+  </inkml:definitions>
+  <inkml:trace contextRef="#ctx0" brushRef="#br0">1 1 1152,'14'0'512,"-14"0"-384,20 0-192,-20 0-32,0 0-256,0 0-96,7 0 96,0 0 128</inkml:trace>
+</inkml:ink>
+</file>
+
 <file path=ppt/ink/ink4.xml><?xml version="1.0" encoding="utf-8"?>
 <inkml:ink xmlns:inkml="http://www.w3.org/2003/InkML">
   <inkml:definitions>
@@ -1784,6 +2154,288 @@
   </inkml:definitions>
   <inkml:trace contextRef="#ctx0" brushRef="#br0">64 1 2048,'1'2'6918,"3"4"-3458,17 29-2932,-13-23-536,0 0-1,1 0 1,1-1 0,0 0-1,3 1 9,27 32 245,-37-40 823,-6-8-1214,-17-19-5389,13 18 3071</inkml:trace>
   <inkml:trace contextRef="#ctx0" brushRef="#br0" timeOffset="448.626">0 113 2816,'2'0'8115,"3"-1"-4043,24-16-4051,-28 16 272,37-20-249,-23 12-68,0 0 1,0 0-1,8-8 24,-21 15 22,-3 1-304,1 0 1,-1 0 0,0 0-1,1 0 1,-1 0 0,0 1-1,1-1 1,-1 0 0,0 1-1,0-1 1,0 0 0,0 1-1,0-1 1,0 1 0,0 0-1,0-1 282,-3-2-3258</inkml:trace>
+</inkml:ink>
+</file>
+
+<file path=ppt/ink/ink40.xml><?xml version="1.0" encoding="utf-8"?>
+<inkml:ink xmlns:inkml="http://www.w3.org/2003/InkML">
+  <inkml:definitions>
+    <inkml:context xml:id="ctx0">
+      <inkml:inkSource xml:id="inkSrc0">
+        <inkml:traceFormat>
+          <inkml:channel name="X" type="integer" min="-2.14748E9" max="2.14748E9" units="cm"/>
+          <inkml:channel name="Y" type="integer" min="-2.14748E9" max="2.14748E9" units="cm"/>
+          <inkml:channel name="F" type="integer" max="32767" units="dev"/>
+        </inkml:traceFormat>
+        <inkml:channelProperties>
+          <inkml:channelProperty channel="X" name="resolution" value="1000" units="1/cm"/>
+          <inkml:channelProperty channel="Y" name="resolution" value="1000" units="1/cm"/>
+          <inkml:channelProperty channel="F" name="resolution" value="0" units="1/dev"/>
+        </inkml:channelProperties>
+      </inkml:inkSource>
+      <inkml:timestamp xml:id="ts0" timeString="2018-12-12T16:56:33.336"/>
+    </inkml:context>
+    <inkml:brush xml:id="br0">
+      <inkml:brushProperty name="width" value="0.05" units="cm"/>
+      <inkml:brushProperty name="height" value="0.05" units="cm"/>
+      <inkml:brushProperty name="color" value="#004F8B"/>
+    </inkml:brush>
+  </inkml:definitions>
+  <inkml:trace contextRef="#ctx0" brushRef="#br0">1 0 3712,'10'0'1408,"-10"0"-1120,10 0-128,-10 0-96,7 0-128,0 0-64,-4 0-1408,1 0-544</inkml:trace>
+</inkml:ink>
+</file>
+
+<file path=ppt/ink/ink41.xml><?xml version="1.0" encoding="utf-8"?>
+<inkml:ink xmlns:inkml="http://www.w3.org/2003/InkML">
+  <inkml:definitions>
+    <inkml:context xml:id="ctx0">
+      <inkml:inkSource xml:id="inkSrc0">
+        <inkml:traceFormat>
+          <inkml:channel name="X" type="integer" min="-2.14748E9" max="2.14748E9" units="cm"/>
+          <inkml:channel name="Y" type="integer" min="-2.14748E9" max="2.14748E9" units="cm"/>
+          <inkml:channel name="F" type="integer" max="32767" units="dev"/>
+        </inkml:traceFormat>
+        <inkml:channelProperties>
+          <inkml:channelProperty channel="X" name="resolution" value="1000" units="1/cm"/>
+          <inkml:channelProperty channel="Y" name="resolution" value="1000" units="1/cm"/>
+          <inkml:channelProperty channel="F" name="resolution" value="0" units="1/dev"/>
+        </inkml:channelProperties>
+      </inkml:inkSource>
+      <inkml:timestamp xml:id="ts0" timeString="2018-12-12T16:56:33.652"/>
+    </inkml:context>
+    <inkml:brush xml:id="br0">
+      <inkml:brushProperty name="width" value="0.05" units="cm"/>
+      <inkml:brushProperty name="height" value="0.05" units="cm"/>
+      <inkml:brushProperty name="color" value="#004F8B"/>
+    </inkml:brush>
+  </inkml:definitions>
+  <inkml:trace contextRef="#ctx0" brushRef="#br0">0 1 1408,'12'0'608,"-12"0"-480,17 0 32,-14 0 0,4 0-192,0 0-32,0 0-608,3 0-224</inkml:trace>
+</inkml:ink>
+</file>
+
+<file path=ppt/ink/ink42.xml><?xml version="1.0" encoding="utf-8"?>
+<inkml:ink xmlns:inkml="http://www.w3.org/2003/InkML">
+  <inkml:definitions>
+    <inkml:context xml:id="ctx0">
+      <inkml:inkSource xml:id="inkSrc0">
+        <inkml:traceFormat>
+          <inkml:channel name="X" type="integer" min="-2.14748E9" max="2.14748E9" units="cm"/>
+          <inkml:channel name="Y" type="integer" min="-2.14748E9" max="2.14748E9" units="cm"/>
+          <inkml:channel name="F" type="integer" max="32767" units="dev"/>
+        </inkml:traceFormat>
+        <inkml:channelProperties>
+          <inkml:channelProperty channel="X" name="resolution" value="1000" units="1/cm"/>
+          <inkml:channelProperty channel="Y" name="resolution" value="1000" units="1/cm"/>
+          <inkml:channelProperty channel="F" name="resolution" value="0" units="1/dev"/>
+        </inkml:channelProperties>
+      </inkml:inkSource>
+      <inkml:timestamp xml:id="ts0" timeString="2018-12-12T16:56:33.983"/>
+    </inkml:context>
+    <inkml:brush xml:id="br0">
+      <inkml:brushProperty name="width" value="0.05" units="cm"/>
+      <inkml:brushProperty name="height" value="0.05" units="cm"/>
+      <inkml:brushProperty name="color" value="#004F8B"/>
+    </inkml:brush>
+  </inkml:definitions>
+  <inkml:trace contextRef="#ctx0" brushRef="#br0">1 9 2816,'13'0'1120,"-13"0"-864,17-4 64,-17 4-32,11 0-256,-5 0 0,6 0-96,-7 0-64,2 0-1184,1 0-480</inkml:trace>
+  <inkml:trace contextRef="#ctx0" brushRef="#br0" timeOffset="1">376 9 3968,'10'0'1472,"-3"0"-1120,3-4 96,-3 4 32,0-5-288,3 5-32,-3 0-160,0 0-96,-1 0-512,1 0-224,5 0-512,1 0-128,-3 0 384,1 0 160</inkml:trace>
+</inkml:ink>
+</file>
+
+<file path=ppt/ink/ink43.xml><?xml version="1.0" encoding="utf-8"?>
+<inkml:ink xmlns:inkml="http://www.w3.org/2003/InkML">
+  <inkml:definitions>
+    <inkml:context xml:id="ctx0">
+      <inkml:inkSource xml:id="inkSrc0">
+        <inkml:traceFormat>
+          <inkml:channel name="X" type="integer" min="-2.14748E9" max="2.14748E9" units="cm"/>
+          <inkml:channel name="Y" type="integer" min="-2.14748E9" max="2.14748E9" units="cm"/>
+          <inkml:channel name="F" type="integer" max="32767" units="dev"/>
+        </inkml:traceFormat>
+        <inkml:channelProperties>
+          <inkml:channelProperty channel="X" name="resolution" value="1000" units="1/cm"/>
+          <inkml:channelProperty channel="Y" name="resolution" value="1000" units="1/cm"/>
+          <inkml:channelProperty channel="F" name="resolution" value="0" units="1/dev"/>
+        </inkml:channelProperties>
+      </inkml:inkSource>
+      <inkml:timestamp xml:id="ts0" timeString="2018-12-12T16:56:34.316"/>
+    </inkml:context>
+    <inkml:brush xml:id="br0">
+      <inkml:brushProperty name="width" value="0.05" units="cm"/>
+      <inkml:brushProperty name="height" value="0.05" units="cm"/>
+      <inkml:brushProperty name="color" value="#004F8B"/>
+    </inkml:brush>
+  </inkml:definitions>
+  <inkml:trace contextRef="#ctx0" brushRef="#br0">1 0 5632,'13'0'2112,"-6"0"-1664,3 0 320,-3 0 0,3 0-256,-3 0 32,0 0-384,1 0-96,2 0-64,0 0 0,-3 0 0,0 0-160,0 0 32,-1 0-1216,1 0-512,0 0-704</inkml:trace>
+</inkml:ink>
+</file>
+
+<file path=ppt/ink/ink44.xml><?xml version="1.0" encoding="utf-8"?>
+<inkml:ink xmlns:inkml="http://www.w3.org/2003/InkML">
+  <inkml:definitions>
+    <inkml:context xml:id="ctx0">
+      <inkml:inkSource xml:id="inkSrc0">
+        <inkml:traceFormat>
+          <inkml:channel name="X" type="integer" min="-2.14748E9" max="2.14748E9" units="cm"/>
+          <inkml:channel name="Y" type="integer" min="-2.14748E9" max="2.14748E9" units="cm"/>
+          <inkml:channel name="F" type="integer" max="32767" units="dev"/>
+        </inkml:traceFormat>
+        <inkml:channelProperties>
+          <inkml:channelProperty channel="X" name="resolution" value="1000" units="1/cm"/>
+          <inkml:channelProperty channel="Y" name="resolution" value="1000" units="1/cm"/>
+          <inkml:channelProperty channel="F" name="resolution" value="0" units="1/dev"/>
+        </inkml:channelProperties>
+      </inkml:inkSource>
+      <inkml:timestamp xml:id="ts0" timeString="2018-12-12T16:56:34.649"/>
+    </inkml:context>
+    <inkml:brush xml:id="br0">
+      <inkml:brushProperty name="width" value="0.05" units="cm"/>
+      <inkml:brushProperty name="height" value="0.05" units="cm"/>
+      <inkml:brushProperty name="color" value="#004F8B"/>
+    </inkml:brush>
+  </inkml:definitions>
+  <inkml:trace contextRef="#ctx0" brushRef="#br0">1 5 3712,'17'0'1472,"-11"-5"-1120,5 5 32,-4 0-96,-1 0-256,1 0 0,0 0-96,1 0 0,-1 0-864,-1 0-416,1 0-96,0 0 64</inkml:trace>
+</inkml:ink>
+</file>
+
+<file path=ppt/ink/ink45.xml><?xml version="1.0" encoding="utf-8"?>
+<inkml:ink xmlns:inkml="http://www.w3.org/2003/InkML">
+  <inkml:definitions>
+    <inkml:context xml:id="ctx0">
+      <inkml:inkSource xml:id="inkSrc0">
+        <inkml:traceFormat>
+          <inkml:channel name="X" type="integer" min="-2.14748E9" max="2.14748E9" units="cm"/>
+          <inkml:channel name="Y" type="integer" min="-2.14748E9" max="2.14748E9" units="cm"/>
+          <inkml:channel name="F" type="integer" max="32767" units="dev"/>
+        </inkml:traceFormat>
+        <inkml:channelProperties>
+          <inkml:channelProperty channel="X" name="resolution" value="1000" units="1/cm"/>
+          <inkml:channelProperty channel="Y" name="resolution" value="1000" units="1/cm"/>
+          <inkml:channelProperty channel="F" name="resolution" value="0" units="1/dev"/>
+        </inkml:channelProperties>
+      </inkml:inkSource>
+      <inkml:timestamp xml:id="ts0" timeString="2018-12-12T16:56:34.970"/>
+    </inkml:context>
+    <inkml:brush xml:id="br0">
+      <inkml:brushProperty name="width" value="0.05" units="cm"/>
+      <inkml:brushProperty name="height" value="0.05" units="cm"/>
+      <inkml:brushProperty name="color" value="#004F8B"/>
+    </inkml:brush>
+  </inkml:definitions>
+  <inkml:trace contextRef="#ctx0" brushRef="#br0">1 3 3456,'10'0'1312,"-3"-2"-1024,7 2 192,-6 0 96,-3 0-256,7 0-96,-7 0-224,7 0-64,-2 0-416,-3 0-64,3 0-1152,-3 0-416</inkml:trace>
+  <inkml:trace contextRef="#ctx0" brushRef="#br0" timeOffset="1">383 12 3072,'7'4'1216,"-4"-4"-928,4 0-96,-7 0-32,4 0-288,-1 0 32,-3 0-736,0 0-256,7-4 32,0 4 96</inkml:trace>
+</inkml:ink>
+</file>
+
+<file path=ppt/ink/ink46.xml><?xml version="1.0" encoding="utf-8"?>
+<inkml:ink xmlns:inkml="http://www.w3.org/2003/InkML">
+  <inkml:definitions>
+    <inkml:context xml:id="ctx0">
+      <inkml:inkSource xml:id="inkSrc0">
+        <inkml:traceFormat>
+          <inkml:channel name="X" type="integer" min="-2.14748E9" max="2.14748E9" units="cm"/>
+          <inkml:channel name="Y" type="integer" min="-2.14748E9" max="2.14748E9" units="cm"/>
+          <inkml:channel name="F" type="integer" max="32767" units="dev"/>
+        </inkml:traceFormat>
+        <inkml:channelProperties>
+          <inkml:channelProperty channel="X" name="resolution" value="1000" units="1/cm"/>
+          <inkml:channelProperty channel="Y" name="resolution" value="1000" units="1/cm"/>
+          <inkml:channelProperty channel="F" name="resolution" value="0" units="1/dev"/>
+        </inkml:channelProperties>
+      </inkml:inkSource>
+      <inkml:timestamp xml:id="ts0" timeString="2018-12-12T16:56:35.299"/>
+    </inkml:context>
+    <inkml:brush xml:id="br0">
+      <inkml:brushProperty name="width" value="0.05" units="cm"/>
+      <inkml:brushProperty name="height" value="0.05" units="cm"/>
+      <inkml:brushProperty name="color" value="#004F8B"/>
+    </inkml:brush>
+  </inkml:definitions>
+  <inkml:trace contextRef="#ctx0" brushRef="#br0">0 5 4736,'7'0'1760,"-7"0"-1376,10 0-192,-7-5-96,2 5-1376,-5 0-480,0 0 160,2 0 128</inkml:trace>
+</inkml:ink>
+</file>
+
+<file path=ppt/ink/ink47.xml><?xml version="1.0" encoding="utf-8"?>
+<inkml:ink xmlns:inkml="http://www.w3.org/2003/InkML">
+  <inkml:definitions>
+    <inkml:context xml:id="ctx0">
+      <inkml:inkSource xml:id="inkSrc0">
+        <inkml:traceFormat>
+          <inkml:channel name="X" type="integer" min="-2.14748E9" max="2.14748E9" units="cm"/>
+          <inkml:channel name="Y" type="integer" min="-2.14748E9" max="2.14748E9" units="cm"/>
+          <inkml:channel name="F" type="integer" max="32767" units="dev"/>
+        </inkml:traceFormat>
+        <inkml:channelProperties>
+          <inkml:channelProperty channel="X" name="resolution" value="1000" units="1/cm"/>
+          <inkml:channelProperty channel="Y" name="resolution" value="1000" units="1/cm"/>
+          <inkml:channelProperty channel="F" name="resolution" value="0" units="1/dev"/>
+        </inkml:channelProperties>
+      </inkml:inkSource>
+      <inkml:timestamp xml:id="ts0" timeString="2018-12-12T16:56:36.003"/>
+    </inkml:context>
+    <inkml:brush xml:id="br0">
+      <inkml:brushProperty name="width" value="0.05" units="cm"/>
+      <inkml:brushProperty name="height" value="0.05" units="cm"/>
+      <inkml:brushProperty name="color" value="#004F8B"/>
+    </inkml:brush>
+  </inkml:definitions>
+  <inkml:trace contextRef="#ctx0" brushRef="#br0">1 1 4736,'3'0'1824,"-3"0"-1408,4 0 96,-4 0 0,0 0-384,0 0-160,3 0-192,1 0-96,2 0-1824,1 0-800</inkml:trace>
+</inkml:ink>
+</file>
+
+<file path=ppt/ink/ink48.xml><?xml version="1.0" encoding="utf-8"?>
+<inkml:ink xmlns:inkml="http://www.w3.org/2003/InkML">
+  <inkml:definitions>
+    <inkml:context xml:id="ctx0">
+      <inkml:inkSource xml:id="inkSrc0">
+        <inkml:traceFormat>
+          <inkml:channel name="X" type="integer" min="-2.14748E9" max="2.14748E9" units="cm"/>
+          <inkml:channel name="Y" type="integer" min="-2.14748E9" max="2.14748E9" units="cm"/>
+          <inkml:channel name="F" type="integer" max="32767" units="dev"/>
+        </inkml:traceFormat>
+        <inkml:channelProperties>
+          <inkml:channelProperty channel="X" name="resolution" value="1000" units="1/cm"/>
+          <inkml:channelProperty channel="Y" name="resolution" value="1000" units="1/cm"/>
+          <inkml:channelProperty channel="F" name="resolution" value="0" units="1/dev"/>
+        </inkml:channelProperties>
+      </inkml:inkSource>
+      <inkml:timestamp xml:id="ts0" timeString="2018-12-12T16:56:36.886"/>
+    </inkml:context>
+    <inkml:brush xml:id="br0">
+      <inkml:brushProperty name="width" value="0.05" units="cm"/>
+      <inkml:brushProperty name="height" value="0.05" units="cm"/>
+      <inkml:brushProperty name="color" value="#004F8B"/>
+    </inkml:brush>
+  </inkml:definitions>
+  <inkml:trace contextRef="#ctx0" brushRef="#br0">1 9 2688,'4'0'1056,"-4"0"-832,7-4 288,-7 4 160,3-4-448,0 4-128,4 0-128,0 0-96,0 0-1312,0 0-640</inkml:trace>
+</inkml:ink>
+</file>
+
+<file path=ppt/ink/ink49.xml><?xml version="1.0" encoding="utf-8"?>
+<inkml:ink xmlns:inkml="http://www.w3.org/2003/InkML">
+  <inkml:definitions>
+    <inkml:context xml:id="ctx0">
+      <inkml:inkSource xml:id="inkSrc0">
+        <inkml:traceFormat>
+          <inkml:channel name="X" type="integer" min="-2.14748E9" max="2.14748E9" units="cm"/>
+          <inkml:channel name="Y" type="integer" min="-2.14748E9" max="2.14748E9" units="cm"/>
+          <inkml:channel name="F" type="integer" max="32767" units="dev"/>
+        </inkml:traceFormat>
+        <inkml:channelProperties>
+          <inkml:channelProperty channel="X" name="resolution" value="1000" units="1/cm"/>
+          <inkml:channelProperty channel="Y" name="resolution" value="1000" units="1/cm"/>
+          <inkml:channelProperty channel="F" name="resolution" value="0" units="1/dev"/>
+        </inkml:channelProperties>
+      </inkml:inkSource>
+      <inkml:timestamp xml:id="ts0" timeString="2018-12-12T16:56:37.218"/>
+    </inkml:context>
+    <inkml:brush xml:id="br0">
+      <inkml:brushProperty name="width" value="0.05" units="cm"/>
+      <inkml:brushProperty name="height" value="0.05" units="cm"/>
+      <inkml:brushProperty name="color" value="#004F8B"/>
+    </inkml:brush>
+  </inkml:definitions>
+  <inkml:trace contextRef="#ctx0" brushRef="#br0">0 0 4864,'39'0'3415,"52"0"-3710,-91 0 151</inkml:trace>
 </inkml:ink>
 </file>
 
@@ -1815,6 +2467,312 @@
 </inkml:ink>
 </file>
 
+<file path=ppt/ink/ink50.xml><?xml version="1.0" encoding="utf-8"?>
+<inkml:ink xmlns:inkml="http://www.w3.org/2003/InkML">
+  <inkml:definitions>
+    <inkml:context xml:id="ctx0">
+      <inkml:inkSource xml:id="inkSrc0">
+        <inkml:traceFormat>
+          <inkml:channel name="X" type="integer" min="-2.14748E9" max="2.14748E9" units="cm"/>
+          <inkml:channel name="Y" type="integer" min="-2.14748E9" max="2.14748E9" units="cm"/>
+          <inkml:channel name="F" type="integer" max="32767" units="dev"/>
+        </inkml:traceFormat>
+        <inkml:channelProperties>
+          <inkml:channelProperty channel="X" name="resolution" value="1000" units="1/cm"/>
+          <inkml:channelProperty channel="Y" name="resolution" value="1000" units="1/cm"/>
+          <inkml:channelProperty channel="F" name="resolution" value="0" units="1/dev"/>
+        </inkml:channelProperties>
+      </inkml:inkSource>
+      <inkml:timestamp xml:id="ts0" timeString="2018-12-12T16:56:59.820"/>
+    </inkml:context>
+    <inkml:brush xml:id="br0">
+      <inkml:brushProperty name="width" value="0.05" units="cm"/>
+      <inkml:brushProperty name="height" value="0.05" units="cm"/>
+      <inkml:brushProperty name="color" value="#004F8B"/>
+    </inkml:brush>
+  </inkml:definitions>
+  <inkml:trace contextRef="#ctx0" brushRef="#br0">59 16 3456,'0'0'45,"0"0"0,0 0 0,0 0 0,0 1 0,0-1 0,0 0 0,0 0 0,0 0 0,0 0 0,0 0 0,0 0 0,0 0 0,0 0-1,0 0 1,0 0 0,0 0 0,0 0 0,0 0 0,0 0 0,0 0 0,0 0 0,0 0 0,0 0 0,0 0 0,0 0 0,0 1 0,0-1 0,0 0 0,0 0 0,0 0 0,0 0 0,0 0 0,0 0-45,4-8 2457,-4 7-1972,0 1 1,5-8 4319,-39 73-2725,4-10-2096,30-54 15,-1-1 1,1 1-1,-1 0 0,1 0 1,0-1-1,0 1 0,-1 0 0,1 0 1,0 0-1,0-1 0,0 1 1,0 0-1,0 0 0,0 0 1,0-1-1,0 1 0,0 0 1,1 0-1,-1 0 0,0-1 1,0 1-1,1 0 0,-1 0 1,0-1-1,1 1 0,-1 0 1,1-1-1,-1 1 1,2 0-3,-1 0 1,1 0-1,-1 0 0,1 0 1,-1 0-1,1 0 0,0 0 1,0-1-1,-1 1 0,1-1 0,0 0 1,0 1-1,0-1 3,13 1-23,1 0 0,-1-1 0,11-2 23,-3 1-10,-6 2-329,-12-1 8,-1 1-1,1-1 1,0 0-1,-1 0 1,1-1 0,0 1-1,-1-1 1,1 0-1,-1 0 1,1-1 0,2 0 331,-6 1-2635,-1 1-837,0 0 507</inkml:trace>
+  <inkml:trace contextRef="#ctx0" brushRef="#br0" timeOffset="339.272">162 48 3712,'0'19'4894,"0"27"-3447,-1-7-337,-1 1 0,-1-1 0,-6 16-1110,-10 15-1981,18-66 615,2-4-3033,5-3 1130</inkml:trace>
+  <inkml:trace contextRef="#ctx0" brushRef="#br0" timeOffset="953.126">266 118 3712,'-1'-1'130,"1"1"1,0-1-1,-1 1 1,1-1-1,-1 1 1,1-1-1,0 1 1,0-1-1,-1 0 0,1 1 1,0-1-1,0 1 1,0-1-1,-1 0 1,1 1-1,0-1 1,0 0-1,0 1 1,0-1-1,0 0 0,0 1 1,1-1-1,-1 0 1,0 1-1,0-1 1,0 0-1,1 1 1,-1-1-131,16-19 1257,-12 17-1194,1-1 0,-1 1 0,1 0 0,0 0 0,0 1-1,0-1 1,0 1 0,1 0-63,-2 1 9,-1 1 0,1-1 0,0 1 0,0 0-1,0 0 1,0 0 0,0 0 0,0 1 0,0 0 0,0 0 0,-1 0 0,1 0 0,0 0-1,0 1 1,-1 0 0,1-1 0,-1 1 0,1 1-9,-2-1 10,0-1 0,-1 0 0,1 1-1,-1 0 1,0-1 0,1 1 0,-1 0 0,0 0 0,0-1 0,0 1 0,0 0 0,0 0-1,-1 0 1,1 0 0,0 0 0,-1 0 0,0 1 0,1-1 0,-1 0 0,0 0 0,0 0-1,0 0 1,-1 0 0,1 0 0,0 0 0,-1 1 0,1-1 0,-1 0 0,0 0 0,0 0-1,0-1 1,0 1 0,0 0 0,0 1-10,-9 12 106,-1 0 0,0-1 0,-1 0 0,0 0 0,-1-2 0,-1 1-1,-3 0-105,-30 31 171,46-43-133,0 0-30,1-1 0,-1 0 1,1 1-1,-1-1 0,1 1 1,-1-1-1,1 1 0,0 0 1,-1-1-1,1 1 0,0-1 1,-1 1-1,1 0 0,0-1 1,0 1-1,0 0 0,0-1 1,0 1-1,0 0 0,0-1 1,0 1-1,0 0 0,0-1-8,0 1-3,0-1 1,1 1-1,-1-1 0,1 1 0,-1-1 0,1 1 0,-1-1 0,1 0 0,-1 1 0,1-1 0,0 0 0,-1 1 0,1-1 0,0 0 1,-1 0-1,1 0 0,-1 1 0,1-1 0,0 0 0,-1 0 0,1 0 0,0 0 0,-1 0 0,1 0 0,0 0 0,-1-1 0,1 1 1,0 0-1,-1 0 0,1-1 3,23-3 55,1-2-71,0 2 0,1 0 0,12 1 16,11 1 2683,-48 2-2235,-1 0-277,0 0-182,0 0-240,10-23-8815,-3 15 6266</inkml:trace>
+  <inkml:trace contextRef="#ctx0" brushRef="#br0" timeOffset="1420.126">558 41 2560,'-2'10'6875,"2"14"-5435,0-22-1459,0 1 0,0-1 1,1 0-1,-1 1 0,0-1 1,1 1-1,0-1 0,0 0 1,0 1-1,0-1 0,0 0 1,0 0-1,0 0 0,1 0 0,-1 0 1,1 0-1,-1 0 0,1 0 1,0 0-1,1 0 19,0-1 21,-1 0 1,1-1-1,-1 1 0,1-1 1,0 0-1,-1 0 0,1 0 1,0 0-1,-1 0 1,1-1-1,-1 1 0,1-1 1,0 1-1,-1-1 0,1 0 1,-1 0-1,0 0 0,1 0 1,-1-1-1,0 1 0,1-1 1,-1 1-1,0-1 0,0 0 1,-1 0-1,1 0 1,1-2-22,-1 3 121,0-1 0,0 0 1,-1 0-1,1 1 1,0-1-1,-1-1 0,0 1 1,0 0-1,1 0 1,-1 0-1,0-1 0,-1 1 1,1 0-1,0-1 1,-1 1-1,1-1 0,-1 1 1,0-1-1,0 1 1,0-1-1,0 1 0,0-1 1,-1 1-1,1-1 1,-1 1-1,1 0 0,-1-1 1,0 1-1,0 0 1,-1-2-122,2 3 25,-1 0 0,0 0 0,0 0 1,0 0-1,0 1 0,0-1 0,0 0 1,0 0-1,0 1 0,0-1 0,0 1 1,0-1-1,0 1 0,0-1 0,-1 1 1,1 0-1,0-1 0,0 1 0,-1 0 1,1 0-1,0 0 0,0 0 0,0 0 1,-1 0-26,-2 1 94,1 0 0,-1 0 1,1 0-1,0 0 0,-1 0 1,1 1-1,0-1 0,0 1 1,-1 1-95,-28 23-1204,12-3-4349,15-14 1612,4 5 672</inkml:trace>
+  <inkml:trace contextRef="#ctx0" brushRef="#br0" timeOffset="1755.869">822 16 4224,'-2'1'391,"0"0"0,0 0-1,-1 0 1,1 0 0,0 0 0,0 0 0,0 0-1,0 1 1,0-1 0,1 1 0,-1-1 0,0 1-1,1 0 1,-2 1-391,-23 29 2336,24-30-2309,-47 64 1294,-83 103 164,124-161-1574,7-8 15,0 1 0,0-1 1,1 1-1,-1 0 1,0-1-1,1 1 1,-1-1-1,1 1 1,-1 0-1,1 0 1,-1-1-1,1 1 1,0 0-1,-1 0 1,1-1-1,0 1 1,-1 0-1,1 0 1,0 0-1,0 0 0,0-1 1,0 1 73,1-1-438,0 0-1,0 0 1,0 0 0,0 0 0,0 0 0,0 0-1,1-1 1,-1 1 0,0-1 0,0 1-1,0 0 1,0-1 0,-1 0 0,1 1 0,0-1-1,0 0 439,3-1-1969,9-2-511</inkml:trace>
+  <inkml:trace contextRef="#ctx0" brushRef="#br0" timeOffset="2085.931">788 318 5888,'4'-3'1001,"1"-1"0,-1 0-1,0 0 1,-1 0 0,1 0 0,-1 0 0,1-1 0,-2 0 0,3-4-1001,-2 4 756,13-27 1697,-16 30-2355,1 1 0,-1-1 0,0 1-1,1-1 1,-1 1 0,0 0-1,0-1 1,0 1 0,0-1 0,0 1-1,-1-1 1,1 1 0,0-1 0,-1 1-1,1 0 1,-1-1 0,1 1-1,-1 0 1,0-1 0,1 1 0,-1 0-1,0-1-97,-1 2 25,1 0 0,0 0 1,0 0-1,-1 0 0,1 0 0,0 0 0,-1 0 0,1 0 0,0 0 0,-1 0 0,1 1 0,0-1 0,0 1 0,-1-1 0,1 1 0,0-1 0,0 1 0,0 0 0,0 0 0,-1 0-25,-26 16-213,7 9-1712,20-24 1205,0 0 1,0 0-1,0 0 1,0 1-1,0-1 1,0 0-1,0 0 1,1 1-1,-1-1 1,1 0-1,-1 1 1,1 1 719,3 4-3872</inkml:trace>
+</inkml:ink>
+</file>
+
+<file path=ppt/ink/ink51.xml><?xml version="1.0" encoding="utf-8"?>
+<inkml:ink xmlns:inkml="http://www.w3.org/2003/InkML">
+  <inkml:definitions>
+    <inkml:context xml:id="ctx0">
+      <inkml:inkSource xml:id="inkSrc0">
+        <inkml:traceFormat>
+          <inkml:channel name="X" type="integer" min="-2.14748E9" max="2.14748E9" units="cm"/>
+          <inkml:channel name="Y" type="integer" min="-2.14748E9" max="2.14748E9" units="cm"/>
+          <inkml:channel name="F" type="integer" max="32767" units="dev"/>
+        </inkml:traceFormat>
+        <inkml:channelProperties>
+          <inkml:channelProperty channel="X" name="resolution" value="1000" units="1/cm"/>
+          <inkml:channelProperty channel="Y" name="resolution" value="1000" units="1/cm"/>
+          <inkml:channelProperty channel="F" name="resolution" value="0" units="1/dev"/>
+        </inkml:channelProperties>
+      </inkml:inkSource>
+      <inkml:timestamp xml:id="ts0" timeString="2018-12-12T16:57:23.594"/>
+    </inkml:context>
+    <inkml:brush xml:id="br0">
+      <inkml:brushProperty name="width" value="0.05" units="cm"/>
+      <inkml:brushProperty name="height" value="0.05" units="cm"/>
+      <inkml:brushProperty name="color" value="#004F8B"/>
+    </inkml:brush>
+  </inkml:definitions>
+  <inkml:trace contextRef="#ctx0" brushRef="#br0">73 25 2560,'0'0'114,"-1"0"0,1 0 0,0 0 0,0 0-1,-1 0 1,1 0 0,0 0 0,-1 0 0,1 0 0,0 0 0,0-1 0,-1 1 0,1 0-1,0 0 1,0 0 0,-1 0 0,1 0 0,0-1 0,0 1 0,0 0 0,-1 0 0,1 0 0,0-1-1,0 1 1,0 0 0,0 0 0,-1 0 0,1-1 0,0 1 0,0 0 0,0 0 0,0-1-1,0 1 1,0 0 0,0-1 0,0 1 0,0 0 0,0 0 0,0-1-114,0 1 153,0 0 0,0-1 0,0 1 1,0 0-1,0 0 0,0-1 0,0 1 0,0 0 0,-1 0 1,1 0-1,0-1 0,0 1 0,0 0 0,0 0 0,0-1 1,0 1-1,0 0 0,-1 0 0,1 0 0,0 0 1,0-1-1,0 1 0,-1 0 0,1 0 0,0 0 0,0 0 1,0 0-1,-1-1 0,1 1 0,0 0 0,0 0 0,0 0 1,-1 0-1,1 0 0,0 0 0,0 0 0,-1 0 0,1 0 1,0 0-154,5 1 79,0 0 0,0 0 1,-1 1-1,1 0 0,0 0 0,0 0 1,-1 0-1,0 1 0,1-1 1,-1 1-1,0 1 0,0-1 1,3 3-80,4 5-31,0 0-1,0 1 1,-1 0 0,0 1 31,18 33 1,-20-32 19,0-1 0,0 0-1,1-1 1,10 10-20,-14-20-338,-5-10-921,-5-13-3032,1 14 1849</inkml:trace>
+  <inkml:trace contextRef="#ctx0" brushRef="#br0" timeOffset="750.444">39 175 2304,'-6'-13'4076,"3"8"-563,-6 12-3550,-3 1-23,4-3 109,8-5-25,0 0-1,0 0 1,0 0 0,0 0 0,0 0 0,0 0 0,0 0-1,0 0 1,1 0 0,-1 0 0,0 0 0,0 0-1,0 0 1,0 0 0,0 0 0,0 0 0,0 0 0,0 0-1,0 0 1,0 0 0,0 0 0,0 0 0,0 0 0,1 0-1,-1 0 1,0 0 0,0 0 0,0 0 0,0 0 0,0 0-1,0 1 1,0-1 0,0 0 0,0 0 0,0 0-1,0 0 1,0 0 0,0 0 0,0 0 0,0 0 0,0 0-1,0 0 1,0 0 0,0 0 0,0 0 0,0 0 0,0 1-1,0-1 1,0 0 0,0 0 0,0 0 0,0 0 0,0 0-1,0 0 1,0 0 0,0 0 0,0 0 0,0 0-1,0 0 1,0 0-24,1 0 299,-1 0 106,10-11 2374,144-94-1104,-113 63-1819,-48 33-2041,-5-1-4257,11 9 4466,1 1-1341</inkml:trace>
+</inkml:ink>
+</file>
+
+<file path=ppt/ink/ink52.xml><?xml version="1.0" encoding="utf-8"?>
+<inkml:ink xmlns:inkml="http://www.w3.org/2003/InkML">
+  <inkml:definitions>
+    <inkml:context xml:id="ctx0">
+      <inkml:inkSource xml:id="inkSrc0">
+        <inkml:traceFormat>
+          <inkml:channel name="X" type="integer" min="-2.14748E9" max="2.14748E9" units="cm"/>
+          <inkml:channel name="Y" type="integer" min="-2.14748E9" max="2.14748E9" units="cm"/>
+          <inkml:channel name="F" type="integer" max="32767" units="dev"/>
+        </inkml:traceFormat>
+        <inkml:channelProperties>
+          <inkml:channelProperty channel="X" name="resolution" value="1000" units="1/cm"/>
+          <inkml:channelProperty channel="Y" name="resolution" value="1000" units="1/cm"/>
+          <inkml:channelProperty channel="F" name="resolution" value="0" units="1/dev"/>
+        </inkml:channelProperties>
+      </inkml:inkSource>
+      <inkml:timestamp xml:id="ts0" timeString="2018-12-12T16:57:36.398"/>
+    </inkml:context>
+    <inkml:brush xml:id="br0">
+      <inkml:brushProperty name="width" value="0.05" units="cm"/>
+      <inkml:brushProperty name="height" value="0.05" units="cm"/>
+      <inkml:brushProperty name="color" value="#004F8B"/>
+    </inkml:brush>
+  </inkml:definitions>
+  <inkml:trace contextRef="#ctx0" brushRef="#br0">1 140 4736,'2'0'580,"1"-1"0,0 1 0,-1-1 0,1 0 0,-1 0 0,1 0 0,-1 0 0,1 0 0,-1-1 0,0 1 0,0-1 0,1 0-580,5-3 293,-7 4-37,-1 1 96,0 0-11,0 0-15,0 0-193,0 0-85,22-11 672,-17 6-695,-1-1 0,1 1 0,-1-1 0,0 0 0,-1 0 0,1 0 0,-1-1 0,0 1 0,-1-2-25,18-31-118,-11 30 46,-4 13 9,-3 13-37,-1-17 89,0 42 150,-1 0-1,-3 20-138,1-20 544,1-1 1,4 30-545,1-53-334,1-28-3326,2-6-1408,0 2 1362</inkml:trace>
+</inkml:ink>
+</file>
+
+<file path=ppt/ink/ink53.xml><?xml version="1.0" encoding="utf-8"?>
+<inkml:ink xmlns:inkml="http://www.w3.org/2003/InkML">
+  <inkml:definitions>
+    <inkml:context xml:id="ctx0">
+      <inkml:inkSource xml:id="inkSrc0">
+        <inkml:traceFormat>
+          <inkml:channel name="X" type="integer" min="-2.14748E9" max="2.14748E9" units="cm"/>
+          <inkml:channel name="Y" type="integer" min="-2.14748E9" max="2.14748E9" units="cm"/>
+          <inkml:channel name="F" type="integer" max="32767" units="dev"/>
+        </inkml:traceFormat>
+        <inkml:channelProperties>
+          <inkml:channelProperty channel="X" name="resolution" value="1000" units="1/cm"/>
+          <inkml:channelProperty channel="Y" name="resolution" value="1000" units="1/cm"/>
+          <inkml:channelProperty channel="F" name="resolution" value="0" units="1/dev"/>
+        </inkml:channelProperties>
+      </inkml:inkSource>
+      <inkml:timestamp xml:id="ts0" timeString="2018-12-12T16:57:32.598"/>
+    </inkml:context>
+    <inkml:brush xml:id="br0">
+      <inkml:brushProperty name="width" value="0.05" units="cm"/>
+      <inkml:brushProperty name="height" value="0.05" units="cm"/>
+      <inkml:brushProperty name="color" value="#004F8B"/>
+    </inkml:brush>
+  </inkml:definitions>
+  <inkml:trace contextRef="#ctx0" brushRef="#br0">34 46 2688,'-4'-23'1056,"4"15"-832,0 1 512,0 7 160,4-8-224,-4 8-32</inkml:trace>
+  <inkml:trace contextRef="#ctx0" brushRef="#br0" timeOffset="338.074">40 8 7776,'4'15'672,"-1"4"-320,2 8-160,-3 5-64,1-1 0,2-1 0,-3 2 0,3-1 0,-2-1 0,-1 1 0,-2 1-64,5-13-64,-2 1 32,-3-9 32,4 0-96,-4-11-1408</inkml:trace>
+  <inkml:trace contextRef="#ctx0" brushRef="#br0" timeOffset="718.078">0 78 3968,'14'-5'4814,"40"-10"-3047,-38 14-1938,-1-1 1,1 2-1,0 0 0,-1 1 1,1 1-1,0 0 0,-1 1 1,10 3 170,-13 2-4400,-12-4 1696</inkml:trace>
+  <inkml:trace contextRef="#ctx0" brushRef="#br0" timeOffset="719.078">0 198 3456,'0'7'1312,"6"-7"-1024,5 4 992,-5-8 352,8 4-160,3 0-64,3 0-736,5-4-256,-1 4-256,0-3-128,1 3 64,-5-4-416,1 4-192,-4 0-1568</inkml:trace>
+  <inkml:trace contextRef="#ctx0" brushRef="#br0" timeOffset="1074.743">272 85 3712,'0'-2'227,"1"0"1,-1 1-1,1-1 1,0 0 0,-1 0-1,1 1 1,0-1-1,0 1 1,0-1-1,0 1 1,1-1-1,-1 1 1,0 0-1,0 0 1,1-1-1,-1 1 1,1 0 0,-1 0-1,1 0 1,0 1-1,-1-1-227,0 1 101,-1-1-1,1 1 1,-1 0-1,0 0 1,1 0-1,-1 0 1,1 0-1,-1 0 1,1 0-1,-1 0 1,1 0-1,-1 0 1,0 0-1,1 1 0,-1-1 1,1 0-1,-1 0 1,1 0-1,-1 1 1,0-1-1,1 0 1,-1 0-1,0 1 1,1-1-1,-1 0 1,0 0-1,1 1 1,-1-1-1,0 1-100,1 0 58,0 0-1,-1 1 0,1-1 1,-1 1-1,0-1 1,1 1-1,-1-1 0,0 1 1,0-1-1,0 1 0,0-1 1,0 1-1,0-1 1,-1 1-58,-14 68 268,9-51-295,2-1 0,0 1 0,1 2 27,3-16-1,-1 1 1,1 0-1,0-1 1,1 1-1,-1-1 1,1 1-1,0-1 1,1 1-1,-1-1 1,1 1-1,0-1 1,2 3 0,-3-6 7,0 1 1,0 0-1,1-1 1,-1 1-1,1 0 1,-1-1-1,1 0 1,0 1-1,0-1 1,0 0-1,0 0 1,0 0-1,1 0 0,-1-1 1,1 1-1,-1 0 1,1-1-1,-1 0 1,1 0-1,0 1 1,0-2-1,0 1 1,-1 0-1,1 0 1,0-1-1,0 0 1,0 0-1,0 0 0,0 0 1,1 0-8,7 0-27,-1-1 0,0 0 0,0-1 0,1 0 0,-1-1 0,0 0 1,7-3 26,-10 2-1278,0 1 0,0 0 0,0-1 0,-1-1 0,0 1 0,6-6 1278,-2-1-2773</inkml:trace>
+  <inkml:trace contextRef="#ctx0" brushRef="#br0" timeOffset="1421.782">625 81 2816,'0'-1'41,"0"1"1,1 0-1,-1 0 1,0 0-1,0 0 1,0 0-1,0 0 0,0 0 1,1 0-1,-1 0 1,0 0-1,0 0 1,0 0-1,0 0 1,1 0-1,-1 0 1,0 0-1,0 0 0,0 0 1,0 0-1,0 0 1,1 0-1,-1 0 1,0 0-1,0 0 1,0 0-1,0 0 0,0 1 1,1-1-1,-1 0 1,0 0-1,0 0 1,0 0-1,0 0 1,0 0-1,0 0 0,0 1 1,0-1-1,0 0 1,1 0-1,-1 0 1,0 0-1,0 0 1,0 1-1,0-1 0,0 0 1,0 0-1,0 0 1,0 0-1,0 1 1,0-1-1,0 0 1,0 0-1,0 0 0,0 0 1,0 0-1,0 1-41,-5 16 1811,-12 24-41,13-33-1772,-41 83 814,27-58-615,1 2 0,2 1 0,-4 16-197,16-34-1447,9-22-1856,12-30-502,-11 13 2872</inkml:trace>
+  <inkml:trace contextRef="#ctx0" brushRef="#br0" timeOffset="1752.156">584 128 2432,'0'0'78,"0"-1"0,0 1 0,0 0 0,0 0-1,0 0 1,1-1 0,-1 1 0,0 0 0,0 0 0,0 0 0,0 0 0,1 0 0,-1-1 0,0 1-1,0 0 1,0 0 0,0 0 0,1 0 0,-1 0 0,0 0 0,0 0 0,1 0 0,-1 0 0,0 0-1,0 0 1,0 0 0,1 0 0,-1 0 0,0 0 0,0 0 0,0 0 0,1 0 0,-1 0 0,0 0-1,0 0 1,1 0 0,-1 0 0,0 1 0,0-1 0,0 0 0,0 0 0,1 0 0,-1 0 0,0 0 0,0 1-78,11 12 1754,8 27-487,-16-33-792,71 130 715,-51-105-2513,-20-24-170</inkml:trace>
+  <inkml:trace contextRef="#ctx0" brushRef="#br0" timeOffset="2090.338">464 302 4608,'4'-4'1760,"-1"4"-1376,4-4 448,0 4 128,-1-3-544,5-2-160,2 1-160,4 1-96,0-1 32,5-5-832,-5 2-256,3 0-1280</inkml:trace>
+  <inkml:trace contextRef="#ctx0" brushRef="#br0" timeOffset="2423.657">980 105 5888,'0'-1'124,"0"1"0,0-1 0,0 0 0,0 1 0,0-1 1,0 0-1,0 1 0,-1-1 0,1 1 0,0-1 0,0 0 0,-1 1 0,1-1 1,0 1-1,0-1 0,-1 1 0,1-1 0,-1 1 0,1-1 0,-1 1 1,1-1-1,0 1 0,-1 0 0,1-1 0,-1 1 0,0 0 0,1-1 0,-1 1 1,1 0-1,-1 0 0,1-1 0,-1 1 0,0 0-124,-27 2 1927,-22 19-825,32-13-946,-37 23-49,52-29-123,1 0 1,-1 0-1,1 0 0,0 0 0,-1 0 0,1 0 1,0 1-1,0-1 0,1 1 0,-1 0 0,1-1 1,-1 1-1,1 0 0,0 0 0,0 0 0,0 0 1,-1 2 15,2-3-25,0-1 1,1 1 0,-1 0-1,0 0 1,0-1 0,1 1-1,-1 0 1,1 0-1,0-1 1,-1 1 0,1-1-1,0 1 1,0 0 0,0-1-1,0 0 1,0 1 0,0-1-1,0 0 1,1 1 0,-1-1-1,1 0 1,-1 0 0,0 0-1,2 0 25,44 24-1583,-24-14 844,-16-7 665,0 0 0,-1 1 0,1 0 1,-1 0-1,0 1 0,-1-1 0,5 6 74,-9-10 60,-1 0 0,1 0 0,0 0-1,-1 0 1,1 0 0,-1 0 0,1 0 0,-1 0 0,0 0 0,1 0 0,-1 1-1,0-1 1,0 0 0,0 0 0,0 0 0,0 0 0,0 0 0,0 0-1,0 1 1,0-1 0,-1 0 0,1 1-60,-1-1 94,0 1-1,0-1 0,-1 0 1,1 1-1,0-1 1,-1 0-1,1 0 1,-1 0-1,1 0 1,-1 0-1,0 0 1,1-1-1,-1 1 1,0 0-1,1-1 1,-1 1-1,0-1 0,0 0 1,0 1-94,-26 5-30,1-1 1,-25 1 29,42-5-1206,0-1 0,0-1-1,0 0 1,0 0 0,0-1 0,-1 0 1206,0-1-3077</inkml:trace>
+  <inkml:trace contextRef="#ctx0" brushRef="#br0" timeOffset="2755.656">1041 66 5120,'-2'114'8317,"0"-32"-9010,1-3-3929,1-72 1908</inkml:trace>
+  <inkml:trace contextRef="#ctx0" brushRef="#br0" timeOffset="3102.687">1132 143 3968,'-2'21'1060,"1"-1"1,0 0-1,2 0 1,1 6-1061,1 33 862,2 27-257,-3-63-2646,-1-7-4107,-1-25 5204</inkml:trace>
+  <inkml:trace contextRef="#ctx0" brushRef="#br0" timeOffset="3439.334">980 271 4864,'7'4'1824,"-7"-8"-1408,7 4 1024,-4 0 320,4 0-576,0 0-192,3 0-672,0-5-224,5 5-64,-2 0-192,4-2 32,0-3-1696,0 5-704,5 0-416</inkml:trace>
+</inkml:ink>
+</file>
+
+<file path=ppt/ink/ink54.xml><?xml version="1.0" encoding="utf-8"?>
+<inkml:ink xmlns:inkml="http://www.w3.org/2003/InkML">
+  <inkml:definitions>
+    <inkml:context xml:id="ctx0">
+      <inkml:inkSource xml:id="inkSrc0">
+        <inkml:traceFormat>
+          <inkml:channel name="X" type="integer" min="-2.14748E9" max="2.14748E9" units="cm"/>
+          <inkml:channel name="Y" type="integer" min="-2.14748E9" max="2.14748E9" units="cm"/>
+          <inkml:channel name="F" type="integer" max="32767" units="dev"/>
+        </inkml:traceFormat>
+        <inkml:channelProperties>
+          <inkml:channelProperty channel="X" name="resolution" value="1000" units="1/cm"/>
+          <inkml:channelProperty channel="Y" name="resolution" value="1000" units="1/cm"/>
+          <inkml:channelProperty channel="F" name="resolution" value="0" units="1/dev"/>
+        </inkml:channelProperties>
+      </inkml:inkSource>
+      <inkml:timestamp xml:id="ts0" timeString="2018-12-12T16:57:49.400"/>
+    </inkml:context>
+    <inkml:brush xml:id="br0">
+      <inkml:brushProperty name="width" value="0.05" units="cm"/>
+      <inkml:brushProperty name="height" value="0.05" units="cm"/>
+      <inkml:brushProperty name="color" value="#004F8B"/>
+    </inkml:brush>
+  </inkml:definitions>
+  <inkml:trace contextRef="#ctx0" brushRef="#br0">0 101 5376,'7'-1'855,"0"0"0,-1 0 1,1-1-1,-1 1 0,1-1 0,-1-1 0,1 1 1,-1-1-1,0-1-855,53-31 1988,-58 35-1986,0-1-1,-1 1 1,1 0 0,0-1-1,-1 1 1,1 0 0,0-1-1,-1 1 1,1-1 0,-1 1 0,1-1-1,-1 1 1,1-1 0,-1 0-1,1 1 1,-1-1 0,1 0-1,-1 1 1,0-1 0,1 0-1,-1 1 1,0-1 0,0 0 0,0 0-1,1 1 1,-1-1 0,0 0-1,0 0 1,0 0 0,0 1-1,0-1 1,0 0 0,-1 0-1,1 1 1,0-1 0,0 0 0,0 0-1,-1 1 1,1-1 0,0 0-1,-1 1 1,1-1 0,-1 0-1,1 1 1,-1-1 0,1 1 0,-1-1-1,1 1 1,-1-1 0,0 1-2,-1-2-22,0 0 1,0 1 0,0 0-1,-1-1 1,1 1 0,-1 0 0,1 0-1,-1 0 1,0 0 0,1 1-1,-1-1 1,1 1 0,-3 0 21,1 0-20,0 0 1,1 1-1,-1 0 0,0 0 1,0 0-1,0 1 0,1-1 1,-1 1-1,0 0 0,1-1 1,0 2-1,-1-1 0,1 0 1,0 1-1,0-1 0,0 1 1,1 0-1,-1 0 1,1 0-1,-1 1 0,1-1 1,0 0-1,0 2 20,0-2 4,1 0 0,0-1 1,-1 1-1,1 0 0,0 0 0,1-1 0,-1 1 1,0 0-1,1 0 0,0 0 0,0 0 1,0 0-1,0 0 0,0 0 0,0 0 0,1 0 1,-1 0-1,1 0 0,0 0 0,0-1 1,0 1-1,0 0 0,1 0 0,-1-1 0,1 1 1,-1-1-1,1 1 0,0-1 0,0 0 1,2 2-5,-1-2 6,1 1 1,-1-1 0,1 1 0,0-1 0,0 0-1,0 0 1,0-1 0,0 1 0,0-1 0,1 0-1,-1 0 1,0-1 0,1 1 0,-1-1-1,1 0 1,-1 0 0,0 0 0,2-1-7,10-2-1735,0 0 0,0-1 0,0-1 0,5-2 1735,-11 3-1849,12-3-1564</inkml:trace>
+  <inkml:trace contextRef="#ctx0" brushRef="#br0" timeOffset="561.188">323 23 4352,'-4'5'776,"1"0"0,-1 0 1,1 1-1,-1-1 0,1 0 1,1 1-1,-1 0 0,1 0 1,0 0-1,1 0 0,-1 0 1,1 3-777,2 27 577,-1-35-582,0 0 1,0 0 0,0 0-1,0 0 1,0 0-1,0 0 1,0 0-1,0 0 1,1-1-1,-1 1 1,0 0-1,1 0 1,-1 0-1,0 0 1,1 0-1,-1-1 1,1 1 0,0 0-1,-1 0 1,1-1-1,0 1 1,-1 0-1,1-1 1,0 1-1,0-1 1,-1 1-1,1-1 1,0 1-1,0-1 1,0 1 0,0-1-1,0 0 1,-1 0-1,1 1 1,0-1-1,0 0 1,0 0-1,0 0 1,0 0-1,0 0 1,0 0-1,0 0 1,0-1 0,0 1-1,0 0 1,0 0-1,0-1 1,-1 1-1,1 0 1,0-1-1,0 1 1,0-1-1,0 0 1,-1 1-1,1-1 1,0 1-1,-1-1 1,1 0 0,0 1-1,-1-1 5,6-5-215,0 1 0,0-1 0,-1 0 0,0 0 1,0-1-1,2-3 215,-5 6-9,17-22-73,-18 25 80,-1 1 1,1-1 0,-1 1 0,1 0 0,-1-1 0,1 1 0,0 0-1,-1 0 1,1-1 0,-1 1 0,1 0 0,0 0 0,-1 0-1,1 0 1,-1 0 0,1 0 0,0 0 0,-1 0 0,1 0 0,0 0-1,-1 0 1,1 0 0,-1 0 0,1 0 0,0 1 0,-1-1-1,1 0 1,-1 0 0,1 1 0,-1-1 0,1 0 0,-1 1 0,1-1-1,-1 1 1,1-1 0,-1 0 0,1 1 0,-1-1 0,0 1 0,1-1-1,-1 1 1,0 0 0,1-1 0,-1 1 0,0-1 0,0 1 1,6 10 178,0 0 1,-1 1 0,-1 0-1,0-1 1,0 2 0,-1-1-1,-1 0 1,0 1 0,-1-1-1,0 1 1,-1-1 0,-1 11-179,1-12 153,-1 0 1,0-1-1,-1 1 1,-1-1 0,1 1-1,-2-1 1,1 0-1,-1 0 1,-1 0 0,0-1-1,0 0 1,-1 0-1,0 0 1,-1 0-1,-1 0-153,5-6 27,0-1 0,0 1 0,-1-1 0,1 0 0,-1 0-1,1 0 1,-1 0 0,0-1 0,0 0 0,0 1 0,0-2-1,0 1 1,0 0 0,0-1 0,0 1 0,0-1 0,0 0-1,0-1 1,0 1 0,-3-1-27,4 0-230,-1 0 1,0 0-1,1 0 0,-1 0 1,1-1-1,0 1 0,-1-1 1,1 0-1,0 0 0,-2-2 230,3 3-493,0-1 0,0 0 1,0 0-1,0-1 0,1 1 0,-1 0 0,1 0 0,-1-1 0,1 1 0,0-1 0,0 0 0,0 1 0,0-1 0,0-1 493,0-11-3210</inkml:trace>
+</inkml:ink>
+</file>
+
+<file path=ppt/ink/ink55.xml><?xml version="1.0" encoding="utf-8"?>
+<inkml:ink xmlns:inkml="http://www.w3.org/2003/InkML">
+  <inkml:definitions>
+    <inkml:context xml:id="ctx0">
+      <inkml:inkSource xml:id="inkSrc0">
+        <inkml:traceFormat>
+          <inkml:channel name="X" type="integer" min="-2.14748E9" max="2.14748E9" units="cm"/>
+          <inkml:channel name="Y" type="integer" min="-2.14748E9" max="2.14748E9" units="cm"/>
+          <inkml:channel name="F" type="integer" max="32767" units="dev"/>
+        </inkml:traceFormat>
+        <inkml:channelProperties>
+          <inkml:channelProperty channel="X" name="resolution" value="1000" units="1/cm"/>
+          <inkml:channelProperty channel="Y" name="resolution" value="1000" units="1/cm"/>
+          <inkml:channelProperty channel="F" name="resolution" value="0" units="1/dev"/>
+        </inkml:channelProperties>
+      </inkml:inkSource>
+      <inkml:timestamp xml:id="ts0" timeString="2018-12-12T16:57:48.295"/>
+    </inkml:context>
+    <inkml:brush xml:id="br0">
+      <inkml:brushProperty name="width" value="0.05" units="cm"/>
+      <inkml:brushProperty name="height" value="0.05" units="cm"/>
+      <inkml:brushProperty name="color" value="#004F8B"/>
+    </inkml:brush>
+  </inkml:definitions>
+  <inkml:trace contextRef="#ctx0" brushRef="#br0">20 72 2048,'1'-3'293,"1"1"-1,-1 0 1,1 0 0,-1-1-1,0 1 1,0-1 0,0 1 0,0-1-1,0 0 1,0 1 0,-1-1-1,1 0 1,-1 1 0,0-1-1,0 0 1,0 0 0,0 0-293,-1-19 1765,0 31-809,-1 35-317,1-3-488,0-7 275,2-1 0,1 0 0,4 23-426,4-41-2069,-6-14 357</inkml:trace>
+  <inkml:trace contextRef="#ctx0" brushRef="#br0" timeOffset="683.661">10 6 3456,'-1'-1'136,"1"1"1,0 0-1,0 0 1,0-1-1,0 1 0,0 0 1,0 0-1,0-1 1,0 1-1,0 0 1,-1 0-1,1-1 0,0 1 1,0 0-1,0 0 1,-1 0-1,1-1 1,0 1-1,0 0 0,0 0 1,-1 0-1,1 0 1,0 0-1,0 0 0,-1-1 1,1 1-1,0 0 1,0 0-1,-1 0 1,1 0-1,0 0 0,-1 0 1,1 0-1,0 0 1,0 0-1,-1 0 1,1 0-1,0 0 0,0 0 1,-1 0-1,1 1 1,0-1-1,-1 0-136,6 14 1279,13 22-1513,-18-36 336,7 13-79,0-1-1,1-1 1,0 1-1,1-1 1,0-1-1,1 0 1,0 0-1,1-1 1,3 2-23,-13-10 12,0-1 1,0 1-1,0-1 1,0 0-1,0 0 0,0 1 1,0-1-1,1 0 1,-1 0-1,0 0 1,0 0-1,0 0 1,0 0-1,0 0 1,1-1-1,-1 1 0,0 0 1,0-1-1,0 1 1,0-1-1,0 1 1,0-1-1,0 1 1,0-1-1,0 0 1,0 1-1,0-1 1,0 0-1,-1 0 0,1 0 1,0 0-1,-1 0 1,1 0-1,0 0 1,0 0-13,25-45 635,-20 34-560,-3 7-89,-1-1 0,1 1 0,1 0-1,-1 0 1,1 1 0,-1-1 0,1 1 0,0 0-1,1 0 1,-1 0 0,1 0 0,4-2 14,-9 6-6,1 0 1,0 0 0,-1 0-1,1 1 1,0-1 0,-1 0-1,1 0 1,0 0 0,-1 0-1,1 1 1,-1-1 0,1 0-1,0 1 1,-1-1 0,1 0-1,-1 1 1,1-1-1,-1 1 1,1-1 0,-1 1-1,0-1 1,1 1 0,-1-1-1,1 1 1,-1-1 0,0 1-1,0 0 1,1-1 0,-1 1-1,0-1 1,0 1 0,0 0-1,0-1 1,1 1 0,-1 0-1,0-1 1,0 1 0,0 0-1,-1-1 1,1 1 5,2 33 120,-2-32-112,-5 57-51,3-47 43,1 0 0,0 0 0,0 0 0,1 0 0,1 0 0,0 1 1,0-1-1,2 2 0,-2-12-73,-1-1 1,1 1 0,-1-1-1,1 1 1,0-1 0,0 1-1,0-1 1,0 0 0,0 1-1,0-1 1,0 0 0,0 0-1,0 0 1,1 1 72,0-1-511,-1 0 0,1 0-1,0-1 1,-1 1 0,1-1 0,0 1 0,0-1 0,-1 1 0,1-1-1,0 0 1,0 0 0,1 0 511,10 0-2677</inkml:trace>
+</inkml:ink>
+</file>
+
+<file path=ppt/ink/ink56.xml><?xml version="1.0" encoding="utf-8"?>
+<inkml:ink xmlns:inkml="http://www.w3.org/2003/InkML">
+  <inkml:definitions>
+    <inkml:context xml:id="ctx0">
+      <inkml:inkSource xml:id="inkSrc0">
+        <inkml:traceFormat>
+          <inkml:channel name="X" type="integer" min="-2.14748E9" max="2.14748E9" units="cm"/>
+          <inkml:channel name="Y" type="integer" min="-2.14748E9" max="2.14748E9" units="cm"/>
+          <inkml:channel name="F" type="integer" max="32767" units="dev"/>
+        </inkml:traceFormat>
+        <inkml:channelProperties>
+          <inkml:channelProperty channel="X" name="resolution" value="1000" units="1/cm"/>
+          <inkml:channelProperty channel="Y" name="resolution" value="1000" units="1/cm"/>
+          <inkml:channelProperty channel="F" name="resolution" value="0" units="1/dev"/>
+        </inkml:channelProperties>
+      </inkml:inkSource>
+      <inkml:timestamp xml:id="ts0" timeString="2018-12-12T16:57:54.870"/>
+    </inkml:context>
+    <inkml:brush xml:id="br0">
+      <inkml:brushProperty name="width" value="0.05" units="cm"/>
+      <inkml:brushProperty name="height" value="0.05" units="cm"/>
+      <inkml:brushProperty name="color" value="#004F8B"/>
+    </inkml:brush>
+  </inkml:definitions>
+  <inkml:trace contextRef="#ctx0" brushRef="#br0">76 1 3712,'-5'3'531,"0"1"0,0-1 0,0 1 0,1 1 0,0-1 0,0 0 0,0 1 0,0 0 0,1 0 0,0 0 1,0 0-1,0 0 0,1 1 0,-1 0 0,1-1 0,1 1 0,-2 4-531,-1 7 415,1-1 0,0 1 0,1 0 0,1 0 1,1 14-416,2-11 30,1-1-1,0 0 1,1 0 0,1 0 0,1-1 0,0 0 0,2 0 0,0 0 0,1-1-30,-3-5-501,1-1 0,1 0 1,0-1-1,0 0 0,1 1 501,15 8-2699,6-2-655</inkml:trace>
+</inkml:ink>
+</file>
+
+<file path=ppt/ink/ink57.xml><?xml version="1.0" encoding="utf-8"?>
+<inkml:ink xmlns:inkml="http://www.w3.org/2003/InkML">
+  <inkml:definitions>
+    <inkml:context xml:id="ctx0">
+      <inkml:inkSource xml:id="inkSrc0">
+        <inkml:traceFormat>
+          <inkml:channel name="X" type="integer" min="-2.14748E9" max="2.14748E9" units="cm"/>
+          <inkml:channel name="Y" type="integer" min="-2.14748E9" max="2.14748E9" units="cm"/>
+          <inkml:channel name="F" type="integer" max="32767" units="dev"/>
+        </inkml:traceFormat>
+        <inkml:channelProperties>
+          <inkml:channelProperty channel="X" name="resolution" value="1000" units="1/cm"/>
+          <inkml:channelProperty channel="Y" name="resolution" value="1000" units="1/cm"/>
+          <inkml:channelProperty channel="F" name="resolution" value="0" units="1/dev"/>
+        </inkml:channelProperties>
+      </inkml:inkSource>
+      <inkml:timestamp xml:id="ts0" timeString="2018-12-12T16:57:52.334"/>
+    </inkml:context>
+    <inkml:brush xml:id="br0">
+      <inkml:brushProperty name="width" value="0.05" units="cm"/>
+      <inkml:brushProperty name="height" value="0.05" units="cm"/>
+      <inkml:brushProperty name="color" value="#004F8B"/>
+    </inkml:brush>
+  </inkml:definitions>
+  <inkml:trace contextRef="#ctx0" brushRef="#br0">47 30 2304,'0'-2'119,"1"1"0,0-1-1,-1 1 1,1 0 0,0-1 0,0 1 0,0 0-1,0 0 1,0 0 0,0 0 0,0-1 0,0 2-1,0-1 1,1 0 0,-1 0 0,0 0 0,1 0-1,-1 1 1,1-1 0,-1 1 0,0-1 0,1 1-1,0 0-118,1-2 9,0 1 0,1 0-1,-1 0 1,1 0 0,-1 1-1,1-1 1,-1 1 0,1 0 0,2 0-9,-5 1-9,1-1 1,-1 0 0,1 1 0,-1-1 0,0 1 0,1 0-1,-1-1 1,0 1 0,1 0 0,-1 0 0,0 0 0,0 0-1,0 0 1,0 0 0,0 0 0,0 0 0,0 1 0,0-1-1,0 0 1,0 0 0,-1 1 0,1-1 0,0 1 0,-1-1 8,1 2-2,-1 0 1,1 1-1,-1-1 1,0 0-1,0 0 1,0 0-1,0 0 1,-1 1-1,0-1 1,1 0-1,-2 2 2,-1 5 21,-1 0 0,0-1 1,-1 1-1,0-1 0,0 0 0,-1-1 1,0 1-22,-45 43 459,5-6 809,46-46-1244,0 0 0,0 0 0,0 0-1,0 0 1,0 0 0,0 0 0,0 0-1,0 0 1,0 0 0,-1 0 0,1 1-1,0-1 1,0 0 0,0 0 0,0 0-1,0 0 1,0 0 0,0 0 0,0 0-1,0 1 1,0-1 0,0 0 0,0 0-1,0 0 1,0 0 0,0 0 0,0 0-1,0 0 1,0 1 0,0-1 0,0 0-1,1 0 1,-1 0 0,0 0 0,0 0-1,0 0 1,0 0 0,0 0 0,0 1-1,0-1 1,0 0 0,0 0 0,0 0-1,0 0 1,1 0 0,-1 0 0,0 0-1,0 0 1,0 0 0,0 0 0,0 0-1,0 0 1,0 0 0,1 0 0,-1 0-1,0 0 1,0 0 0,0 0 0,0 0-1,0 0 1,0 0 0,0 0 0,1 0-1,-1 0 1,0 0 0,0 0-24,16-1 619,17-7 69,-17 4-334,1 1-1,0 0 1,0 1-1,9 1-353,21-3-1209,-2-6-4724,-35 7 3608</inkml:trace>
+  <inkml:trace contextRef="#ctx0" brushRef="#br0" timeOffset="435.996">307 143 4224,'4'31'5420,"9"6"-4020,-12-33-1382,0-1-1,1 0 1,0 0 0,-1 0-1,1 0 1,0 0 0,1 0-1,-1 0 1,0-1 0,1 1-1,0-1 1,-1 0-1,1 1 1,0-1 0,0-1-1,0 1 1,0 0 0,1-1-1,-1 1 1,1-1-18,-2-1 30,-1 1 0,1-1 0,-1 0 0,1 0-1,-1 0 1,1 0 0,-1 0 0,1-1 0,-1 1 0,1 0 0,-1-1 0,1 1-1,-1-1 1,1 1 0,-1-1 0,0 0 0,1 0 0,-1 0 0,0 1 0,0-1-1,2-1-29,-1-1 34,0 0 0,1 0 0,-1 1-1,0-2 1,-1 1 0,1 0 0,0 0-1,-1 0 1,1-4-34,1-1 14,-1-1 0,0 1 0,-1-1 0,0 1 0,0-1 0,-1 0 0,0-8-14,0 13 28,-1 0 1,1 0-1,-1 0 0,0 0 0,0 0 0,0 0 0,0 0 1,-1 1-1,0-1 0,0 0 0,0 1 0,0-1 0,0 1 1,-1 0-1,1 0 0,-2-1-28,2 3 22,-1-1-1,1 0 1,-1 1 0,0 0 0,0-1-1,0 1 1,0 0 0,0 1 0,0-1-1,0 0 1,0 1 0,0 0-1,0 0 1,0 0 0,-1 0 0,1 0-1,0 0 1,0 1 0,0 0 0,-3 0-22,4 0-4,-2-1-188,-1 1 1,1 0 0,0 0 0,0 0 0,0 0 0,0 0-1,0 1 1,0 0 0,1 0 0,-1 0 0,0 0-1,1 1 1,0-1 0,-1 1 0,1 0 0,0 0 0,0 0-1,0 1 192,3 1-2421,9 3-256</inkml:trace>
+  <inkml:trace contextRef="#ctx0" brushRef="#br0" timeOffset="834.002">500 95 4096,'29'-7'8549,"-27"7"-8500,1-1 1,-1 0-1,1 0 0,0 0 1,-1 0-1,0 0 1,1 0-1,-1-1 0,0 1 1,1-1-1,-1 1 0,0-1 1,0 0-1,0 0 1,-1 0-1,1 0 0,1-3-49,-1 3-63,-1 0-1,1 0 1,-1 0-1,1 0 1,0 0-1,0 1 1,0-1-1,0 1 1,0-1-1,0 1 1,1 0-1,-1-1 1,0 1-1,1 0 1,-1 1-1,1-1 1,1 0 63,-3 25-219,-18 82 1796,10-73-1381,1 0 0,2 1 1,1 14-197,5-38-2141,6-13-1478,-1-3 595</inkml:trace>
+  <inkml:trace contextRef="#ctx0" brushRef="#br0" timeOffset="1283.05">689 22 4096,'0'0'176,"1"0"1,-1-1-1,1 1 1,-1 0-1,1-1 0,-1 1 1,1 0-1,-1-1 1,1 1-1,-1 0 0,1 0 1,-1 0-1,1 0 1,-1-1-1,1 1 1,-1 0-1,1 0 0,0 0 1,-1 0-1,1 0 1,-1 0-1,1 0 0,-1 1 1,1-1-1,-1 0 1,1 0-1,0 0 1,-1 0-1,1 1 0,-1-1 1,1 0-1,-1 1-176,1 0 124,-1 0 0,1 1 0,0-1 1,-1 1-1,1-1 0,-1 1 0,0-1 0,0 1 0,1-1 0,-1 1 0,0-1 0,0 1 0,-1 0-124,1 4 73,-1 0 0,0 0 0,-1 0 0,0-1 0,0 1 0,-2 5-73,2-8 27,0 0 1,1 0-1,-1 0 1,1 1-1,0-1 1,0 0-1,0 1 1,0-1-1,1 1 1,-1 0-1,1-1 1,0 1-1,0-1 1,0 1-1,1-1 1,-1 1-1,1-1 1,0 1-1,0 0-27,1-2 49,0 0 1,0 0-1,0 0 0,0-1 0,0 1 0,0-1 1,1 0-1,-1 1 0,0-1 0,1 0 0,-1 0 1,1 0-1,-1-1 0,1 1 0,0-1-49,3 2 68,-1-1 0,1-1 1,0 1-1,-1-1 0,1 0 0,4-1-68,23-4 51,8-3-565,-14 6-2708,-26 2 1136,-1 0-809,0 0 148</inkml:trace>
+  <inkml:trace contextRef="#ctx0" brushRef="#br0" timeOffset="1598.051">831 42 4480,'-8'3'1760,"6"2"-1376,-3 10 1088,2-8 480,1 9 64,-3 4 64,2 3-704,-1 0-353,1 4-607,3 0-192,0 1-32,-4-6-160,4-2-96,0-5-256,0-2-128,0-2-2015,0-8-897,4 5-512</inkml:trace>
+</inkml:ink>
+</file>
+
+<file path=ppt/ink/ink58.xml><?xml version="1.0" encoding="utf-8"?>
+<inkml:ink xmlns:inkml="http://www.w3.org/2003/InkML">
+  <inkml:definitions>
+    <inkml:context xml:id="ctx0">
+      <inkml:inkSource xml:id="inkSrc0">
+        <inkml:traceFormat>
+          <inkml:channel name="X" type="integer" min="-2.14748E9" max="2.14748E9" units="cm"/>
+          <inkml:channel name="Y" type="integer" min="-2.14748E9" max="2.14748E9" units="cm"/>
+          <inkml:channel name="F" type="integer" max="32767" units="dev"/>
+        </inkml:traceFormat>
+        <inkml:channelProperties>
+          <inkml:channelProperty channel="X" name="resolution" value="1000" units="1/cm"/>
+          <inkml:channelProperty channel="Y" name="resolution" value="1000" units="1/cm"/>
+          <inkml:channelProperty channel="F" name="resolution" value="0" units="1/dev"/>
+        </inkml:channelProperties>
+      </inkml:inkSource>
+      <inkml:timestamp xml:id="ts0" timeString="2018-12-12T16:57:55.649"/>
+    </inkml:context>
+    <inkml:brush xml:id="br0">
+      <inkml:brushProperty name="width" value="0.05" units="cm"/>
+      <inkml:brushProperty name="height" value="0.05" units="cm"/>
+      <inkml:brushProperty name="color" value="#004F8B"/>
+    </inkml:brush>
+  </inkml:definitions>
+  <inkml:trace contextRef="#ctx0" brushRef="#br0">0 0 3968,'7'1'755,"0"1"-1,-1 0 1,0 0 0,1 0-1,-1 1 1,0 0 0,0 0-1,0 1 1,-1-1 0,1 1-1,-1 1 1,0-1 0,0 1-1,4 4-754,16 33 1792,-19-29-1577,-1 1 0,-1 1 0,0-1 0,-1 0 0,-1 1 0,0 0 0,-1 0 1,-1 0-1,0-1 0,-1 1 0,-1 0 0,0 0 0,-2 4-215,2-6-255,-2 0 0,0 0 0,0 0 0,-1-1 0,-1 0 0,0 0 0,-1 0 0,0-1 0,-4 5 255,-1 0-3253,4 0-1168</inkml:trace>
+</inkml:ink>
+</file>
+
+<file path=ppt/ink/ink59.xml><?xml version="1.0" encoding="utf-8"?>
+<inkml:ink xmlns:inkml="http://www.w3.org/2003/InkML">
+  <inkml:definitions>
+    <inkml:context xml:id="ctx0">
+      <inkml:inkSource xml:id="inkSrc0">
+        <inkml:traceFormat>
+          <inkml:channel name="X" type="integer" min="-2.14748E9" max="2.14748E9" units="cm"/>
+          <inkml:channel name="Y" type="integer" min="-2.14748E9" max="2.14748E9" units="cm"/>
+          <inkml:channel name="F" type="integer" max="32767" units="dev"/>
+        </inkml:traceFormat>
+        <inkml:channelProperties>
+          <inkml:channelProperty channel="X" name="resolution" value="1000" units="1/cm"/>
+          <inkml:channelProperty channel="Y" name="resolution" value="1000" units="1/cm"/>
+          <inkml:channelProperty channel="F" name="resolution" value="0" units="1/dev"/>
+        </inkml:channelProperties>
+      </inkml:inkSource>
+      <inkml:timestamp xml:id="ts0" timeString="2018-12-12T16:58:02.956"/>
+    </inkml:context>
+    <inkml:brush xml:id="br0">
+      <inkml:brushProperty name="width" value="0.05" units="cm"/>
+      <inkml:brushProperty name="height" value="0.05" units="cm"/>
+      <inkml:brushProperty name="color" value="#004F8B"/>
+    </inkml:brush>
+  </inkml:definitions>
+  <inkml:trace contextRef="#ctx0" brushRef="#br0">38 55 2048,'0'0'752,"6"-5"4186,17-13-3471,-19 14-1325,10-3 783,-13 7-717,24-4 138,-1 1 190,-17 2-516,1 0 0,-1 0 0,1 1 0,0 0 1,1 0-21,-7 0 4,-1 0 0,1 1 1,0-1-1,-1 0 1,1 1-1,-1-1 1,1 1-1,-1 0 1,1-1-1,-1 1 1,1 0-1,-1 0 0,1 0 1,-1 0-1,0 0 1,0 0-1,0 0 1,0 1-1,0-1 1,0 0-1,0 1 0,0-1 1,0 1-1,0-1 1,-1 1-1,1-1-4,-1 1 46,1 0 0,-1-1-1,0 1 1,0 0-1,1 0 1,-1-1 0,-1 1-1,1 0 1,0-1 0,0 1-1,-1 0 1,1 0 0,-1-1-1,1 1 1,-1-1-1,0 1 1,1 0 0,-1-1-1,0 1 1,0-1 0,-1 1-46,-29 31 432,6-6-340,25-27-95,-1 1-1,1-1 1,0 0 0,-1 1 0,1-1-1,0 1 1,0-1 0,-1 1 0,1-1-1,0 1 1,0-1 0,0 1-1,0 0 1,-1-1 0,1 1 0,0-1-1,0 1 1,0-1 0,0 1 0,0-1-1,0 1 1,1 0 0,-1-1-1,0 1 1,0-1 0,0 1 0,0-1-1,1 1 1,-1-1 0,0 1 0,1-1-1,-1 1 1,0-1 0,1 0 0,-1 1-1,0-1 1,1 1 0,-1-1-1,1 0 1,-1 1 0,1-1 0,-1 0-1,1 0 1,-1 1 0,1-1 0,-1 0-1,1 0 1,0 0 3,36 7-50,-15-4-159,-15-2 124,0 1 1,0 1-1,0-1 1,0 1-1,-1 0 1,1 1-1,-1 0 1,1 0 84,-6-3 7,0 0 1,0-1 0,0 1 0,0 0-1,0 0 1,0 0 0,0 0-1,0 0 1,0 1 0,0-1-1,-1 0 1,1 0 0,0 0-1,-1 1 1,1-1 0,-1 0 0,1 1-1,-1-1 1,0 0 0,0 1-1,1-1 1,-1 0 0,0 1-1,0-1 1,-1 1 0,1-1-1,0 0 1,0 1 0,-1-1 0,1 0-1,0 1 1,-1-1 0,1 0-1,-1 0 1,0 1 0,1-1-1,-1 0 1,0 0 0,0 0-1,0 0 1,0 0 0,0 0 0,0 0-1,0 0 1,0 0 0,0-1-1,-1 1-7,-10 8 215,-1 0-1,0-1 0,0-1 0,-1 0 0,0 0 1,0-2-1,-1 0 0,1 0 0,-1-2 0,0 0 1,0 0-1,-3-1-214,13-2-2,1 0 0,-1 0-1,1-1 1,-1 1 0,0-1 0,1 0 0,0 0 0,-1 0-1,1-1 1,0 0 0,-1 0 2,-20-14-1599,24 14 1145,-1 1-1,1-1 0,0 0 1,-1 0-1,1 1 0,0-1 1,0 0-1,0 0 0,0 0 1,0 0-1,0-1 455,1-5-3338,4 1 447</inkml:trace>
+  <inkml:trace contextRef="#ctx0" brushRef="#br0" timeOffset="621.708">323 71 768,'0'1'-121,"0"-1"255,0 0-1,0 0 1,0 0 0,0 0 0,0 0-1,0 1 1,0-1 0,0 0-1,0 0 1,0 0 0,0 0-1,0 0 1,0 0 0,0 0 0,0 1-1,0-1 1,0 0 0,0 0-1,0 0 1,0 0 0,0 0-1,0 0 1,0 1 0,0-1-1,0 0 1,0 0 0,0 0 0,1 0-1,-1 0 1,0 0 0,0 0-1,0 0 1,0 0 0,0 1-1,0-1 1,0 0 0,0 0 0,0 0-1,1 0 1,-1 0 0,0 0-1,0 0 1,0 0 0,0 0-1,0 0 1,0 0 0,1 0-1,-1 0 1,0 0 0,0 0 0,0 0-1,0 0 1,0 0 0,0 0-1,0 0 1,1 0 0,-1 0-1,0 0 1,0 0 0,0 0-1,0 0 1,0 0 0,0 0 0,0-1-1,0 1 1,1 0 0,-1 0-1,0 0-133,1 2 93,0-1 1,0 1-1,0-1 0,0 1 0,0-1 0,1 1 0,-1-1 0,1 0 1,-1 0-1,1 0 0,-1 0 0,1 0 0,0 0 0,-1 0 0,1 0 0,0 0 1,0-1-1,-1 1 0,1-1 0,0 0 0,0 1 0,0-1 0,0 0 0,0 0 1,1 0-94,2 0 104,1 0 0,0-1 0,-1 0 1,1 1-1,-1-2 0,0 1 1,1-1-1,0 0-104,-4 2 64,0-1 0,0 0 0,-1 1 0,1-1 0,0 0 1,-1 0-1,1 0 0,-1 0 0,1 0 0,-1-1 0,1 1 0,-1 0 0,0-1 0,1 1 1,-1-1-1,0 1 0,0-1 0,0 0 0,0 1 0,0-1 0,-1 0 0,1 0 0,-1 1 1,1-1-1,-1 0 0,1 0 0,-1 0 0,0 0 0,0 0 0,0 0 0,0-1-64,-1 2 27,0-1-1,1 0 0,-1 0 1,0 0-1,-1 1 1,1-1-1,0 1 0,0-1 1,-1 1-1,1-1 0,-1 1 1,1 0-1,-1-1 1,1 1-1,-1 0 0,0 0 1,0 0-1,1 1 0,-1-1 1,0 0-1,0 1 1,0-1-1,0 1 0,0-1 1,0 1-1,0 0 0,0 0 1,0 0-1,0 0 1,-1 0-27,-2 0-19,1 0 0,-1 0 0,1 0 0,-1 0 0,1 1 0,0 0 0,-1 0 0,1 0 0,-1 0 0,1 1 0,0-1 0,0 1 0,0 0 0,0 1 1,0-1-1,1 1 0,-1-1 0,1 1 0,-1 0 0,1 1 19,-1-1-50,-8 9-1360,12-11 1281,0-1 0,0 0 1,0 0-1,-1 0 0,1 1 1,0-1-1,0 0 0,0 0 0,0 1 1,0-1-1,0 0 0,-1 0 1,1 1-1,0-1 0,0 0 1,0 1-1,0-1 0,0 0 0,0 0 1,0 1-1,0-1 0,0 0 1,0 1-1,0-1 0,0 0 1,1 0-1,-1 1 0,0-1 0,0 0 1,0 0-1,0 1 0,0-1 1,0 0-1,1 0 0,-1 0 0,0 1 1,0-1-1,0 0 0,1 0 1,-1 0-1,0 1 0,0-1 1,1 0-1,-1 0 0,0 0 0,0 0 1,1 0 128,5 1-2736</inkml:trace>
+  <inkml:trace contextRef="#ctx0" brushRef="#br0" timeOffset="1004.319">619 1 6400,'-2'1'489,"0"-1"1,-1 1-1,1 0 0,0 0 1,0 0-1,0 1 1,0-1-1,0 0 0,0 1 1,0-1-1,1 1 1,-1 0-1,0 0 0,1 0 1,-2 1-490,-30 43 132,16-22 693,-2-2-425,-1 0-1,-13 9-399,10-9 129,1 0-1,-2 6-128,-11 10 294,33-36-445,0 1 1,0-1-1,-1 0 0,1 0 0,-1 0 0,1-1 0,-1 1 0,0-1 0,0 1 0,0-1 0,1 0 0,-1 0 0,-1 0 1,1 0 150,2-1-1739,1 0-458,3-2-1843,4 0 2765,-7 2 681,10-3-1865</inkml:trace>
+  <inkml:trace contextRef="#ctx0" brushRef="#br0" timeOffset="1335.32">533 241 4352,'3'0'521,"0"1"0,-1-1 1,1 1-1,0 0 0,-1-1 1,1 1-1,-1 0 0,1 0 1,-1 1-1,1-1 0,-1 1 0,0-1 1,0 1-1,1 0 0,-1-1 1,0 1-522,-1 0 209,1 0 1,0 0 0,0-1-1,1 1 1,-1-1-1,0 1 1,0-1 0,1 0-1,-1 0 1,1 0-1,-1 0 1,1 0 0,-1-1-1,1 1 1,-1-1-1,1 0 1,0 1 0,-1-1-1,1 0 1,1-1-210,0 0 175,-1 0-1,1-1 1,-1 1 0,0-1 0,0 0 0,0 0-1,0 0 1,0 0 0,0 0 0,0-1 0,-1 1 0,1-1-1,-1 0 1,0 0 0,0 0 0,0 0 0,0 0-1,0 0 1,-1-1 0,1-1-175,-1 4 20,0-1 0,0 1 1,-1-1-1,1 1 0,-1-1 0,1 1 1,-1-1-1,1 1 0,-1-1 0,0 1 0,0-1 1,0 1-1,0-1 0,0 1 0,0-1 1,0 0-1,-1 1 0,1-1 0,-1 1 1,1-1-1,-1 1 0,1 0 0,-1-1 0,0 1 1,0-1-1,1 1 0,-1 0 0,0 0 1,0-1-1,0 1 0,-1 0 0,1 0 0,0 0 1,0 0-1,0 0 0,-1 1 0,1-1 1,-1 0-1,1 1 0,0-1 0,-1 0 0,1 1 1,-1 0-1,0-1 0,1 1 0,-1 0-20,-3 0-44,0 0 0,0 0-1,0 1 1,0-1 0,0 1-1,0 0 1,0 1 0,0-1-1,0 1 1,1 0 0,-1 0 0,1 0-1,-1 1 1,1 0 0,0 0 44,0-1-506,1 1 0,0-1 0,0 1 0,-1 0 0,2 0 0,-1 0 1,0 0-1,1 1 0,-1-1 0,1 1 0,0 0 506,-1 6-3376,5 1-618</inkml:trace>
+</inkml:ink>
+</file>
+
 <file path=ppt/ink/ink6.xml><?xml version="1.0" encoding="utf-8"?>
 <inkml:ink xmlns:inkml="http://www.w3.org/2003/InkML">
   <inkml:definitions>
@@ -1841,7 +2799,7 @@
   </inkml:definitions>
   <inkml:trace contextRef="#ctx0" brushRef="#br0">79 40 3456,'-10'-16'2567,"7"14"3020,2 76-4376,-3-1 0,-7 35-1211,8-93-155,3-15-1615,4-31-7793,-4 16 7915</inkml:trace>
   <inkml:trace contextRef="#ctx0" brushRef="#br0" timeOffset="333.532">26 52 4864,'0'0'91,"0"0"0,0 0 0,0 0 0,0 1 0,0-1 0,-1 0 0,1 0 0,0 1 0,0-1 0,0 0 0,0 0 0,0 0 0,0 1 0,0-1 0,1 0 1,-1 0-1,0 0 0,0 1 0,0-1 0,0 0 0,0 0 0,0 0 0,0 1 0,0-1 0,0 0 0,1 0 0,-1 0 0,0 1 0,0-1 0,0 0 0,0 0 0,1 0 0,-1 0 0,0 0 0,0 0 0,0 1 0,1-1 0,-1 0 0,0 0 1,0 0-1,0 0 0,1 0 0,-1 0 0,0 0 0,0 0 0,0 0 0,1 0 0,-1 0 0,0 0 0,0 0 0,1 0-91,20-1 1177,21-8-1211,-41 9-32,9-4 66,-1 1 0,1 0 0,0 0 0,6 0 0,6 5-3422,-19 1 831,-3-1 4</inkml:trace>
-  <inkml:trace contextRef="#ctx0" brushRef="#br0" timeOffset="664.402">1 175 3328,'2'6'1216,"-2"-6"-928,5 8 672,-3-5 256,3-3-224,1 3-32,4-1-192,0 2-96,2-1-352,1-3-128,0 0-64,0 0-64,-3 0-64,-3 0-64,4-3 32,0-1-1440,-4 2-640,3-1-480</inkml:trace>
+  <inkml:trace contextRef="#ctx0" brushRef="#br0" timeOffset="664.401">1 175 3328,'2'6'1216,"-2"-6"-928,5 8 672,-3-5 256,3-3-224,1 3-32,4-1-192,0 2-96,2-1-352,1-3-128,0 0-64,0 0-64,-3 0-64,-3 0-64,4-3 32,0-1-1440,-4 2-640,3-1-480</inkml:trace>
   <inkml:trace contextRef="#ctx0" brushRef="#br0" timeOffset="1147.306">198 29 4224,'0'0'120,"0"0"1,0 0-1,0 0 1,0 0-1,-1 0 1,1 0-1,0 0 1,0-1-1,0 1 1,0 0 0,0 0-1,0 0 1,0 0-1,0 0 1,-1-1-1,1 1 1,0 0-1,0 0 1,0 0-1,0 0 1,0-1-1,0 1 1,0 0-1,0 0 1,0 0-1,0 0 1,0-1-1,0 1 1,0 0-1,0 0 1,0 0-1,0 0 1,0-1-1,1 1 1,-1 0-1,0 0 1,0 0-1,0 0 1,0 0-1,0-1 1,0 1-1,0 0 1,0 0-1,1 0 1,-1 0-1,0 0 1,0 0 0,0 0-1,0 0 1,0-1-1,1 1 1,-1 0-1,0 0 1,0 0-1,0 0 1,0 0-1,1 0 1,-1 0-1,0 0 1,0 0-1,0 0 1,0 0-1,1 0-120,6 3 3290,-4 1-4402,0 4 1149,0-1 0,-1 1 1,0-1-1,-1 1 0,0 0 0,0 0 0,0 0 0,-1 0 0,-1 0 0,1 0 1,-1-1-1,0 1 0,-2 3-37,-1 31-3,0 56 121,8-97-136,1 0 0,-1-1 1,1 1-1,-1-1 0,0 0 0,1 0 1,1-1 17,-2 1-20,4 0 34,-1-1 0,0 0 1,1 0-1,-1-1 0,6-1-14,5-5-3789,-17 7 776,0 1-496,3 0 933</inkml:trace>
   <inkml:trace contextRef="#ctx0" brushRef="#br0" timeOffset="2115.67">428 23 3456,'12'-4'1509,"-7"7"725,-8 18 1241,-1-8-3712,-1 12 440,-2-1 1,-1 0-1,0 0 0,-2 0 1,-1-1-1,-1-1 0,0 0 1,-7 6-204,37-56-8363,-16 19 6262</inkml:trace>
   <inkml:trace contextRef="#ctx0" brushRef="#br0" timeOffset="2446.348">438 21 3968,'2'0'254,"0"1"1,0-1-1,0 0 0,0 1 1,0 0-1,-1-1 0,1 1 1,0 0-1,0 0 0,-1 0 1,1 0-1,-1 0 1,1 1-1,-1-1 0,1 0 1,-1 1-1,0-1 0,0 1 1,1-1-1,-1 1 0,0 0 1,0 0-255,20 46 698,-14-31-379,-4-10-597,31 78 445,-25-48-5826,-8-31 2960</inkml:trace>
@@ -1882,7 +2840,7 @@
   <inkml:trace contextRef="#ctx0" brushRef="#br0" timeOffset="57633.465">311 175 4736,'-5'14'1760,"3"-8"-1376,2 14 320,0-14 96,0 5-96,0 1-32,2-4-96,1 1-32,-3 2-288,0 3-32,0-2 96,-3-4-128,1 1-32,-1-3-160,1-4-64,0 1-1824,2-3-704,0 0-192</inkml:trace>
   <inkml:trace contextRef="#ctx0" brushRef="#br0" timeOffset="57960.992">367 49 7680,'13'-8'2880,"-8"5"-2240,-3 0-96,-2 3-224,0 0-544,0 0-96,6 0-2464,-6 3-1088,5 2 1472,0 1 800</inkml:trace>
   <inkml:trace contextRef="#ctx0" brushRef="#br0" timeOffset="58315.689">411 143 3840,'-1'0'1608,"0"3"3516,2 10-4358,-3 8 873,0 0 1,-1 0-1,-1-1 0,-1 1 0,-2 1-1639,2-3 305,5-19-315,0 0 0,0 0-1,0 0 1,0 0 0,-1 1 0,1-1-1,0 0 1,0 0 0,0 1-1,0-1 1,0 0 0,0 0-1,0 0 1,-1 1 0,1-1-1,0 0 1,0 0 0,0 1-1,0-1 1,0 0 0,0 0 0,0 1-1,0-1 1,0 0 0,1 0-1,-1 1 1,0-1 0,0 0-1,0 0 1,0 1 0,0-1-1,0 0 1,0 0 0,0 0-1,1 1 1,-1-1 0,0 0 0,0 0-1,0 0 1,1 0 0,-1 1-1,0-1 1,0 0 0,1 0 10,9-8-1075,11-18-579,-20 25 1658,-1 0-8,1 0-1,-1 0 1,1 0 0,-1 1-1,1-1 1,-1 0 0,1 0-1,0 0 1,-1 0 0,1 1-1,0-1 1,0 0 0,-1 1-1,1-1 1,0 1 0,0-1 0,0 1-1,0-1 1,0 1 0,0-1-1,0 1 1,0 0 0,0 0-1,0-1 1,0 1 0,0 0-1,0 0 1,0 0 0,0 0 0,0 0-1,0 1 1,0-1 0,1 0 4,-1 2 134,1-1 1,-1 0 0,0 1-1,0 0 1,0-1-1,-1 1 1,1-1 0,0 1-1,-1 0 1,1 0 0,-1-1-1,1 1 1,-1 0 0,0 0-1,1 0 1,-1 0-1,0-1 1,-1 1 0,1 1-135,0 7 122,0 16-170,8-14-6453,-3-8 2427</inkml:trace>
-  <inkml:trace contextRef="#ctx0" brushRef="#br0" timeOffset="58946.227">608 272 5120,'14'-25'6887,"-2"-7"-3662,-11 29-3163,0 0 1,0 0-1,-1 0 1,1 0-1,-1 0 1,0 0-1,0-1 1,0 1-1,0 0 1,0 0-1,-1 0 1,1 0-1,-1 0 1,0 0-1,0 0 1,0 0-1,0 0 1,-1-2-63,1 5 27,1-1 1,0 1-1,-1-1 1,1 1-1,-1 0 0,1-1 1,-1 1-1,1-1 1,0 1-1,-1 0 1,1-1-1,-1 1 0,0 0 1,1 0-1,-1-1 1,1 1-1,-1 0 0,1 0 1,-1 0-1,0 0 1,1 0-1,-1 0 1,1 0-1,-1 0 0,0 0 1,1 0-1,-1 0 1,1 0-1,-1 0-27,-18 13 1023,-8 23 657,21-26-1478,-1 1-114,1-1 0,0 1 1,1 1-1,0-1 0,1 1 0,-2 7-88,6-18-18,0-1-1,0 0 1,0 0-1,0 1 1,0-1-1,0 0 1,0 0-1,0 1 1,0-1-1,0 0 1,0 1-1,0-1 1,0 0-1,0 1 1,0-1 0,0 0-1,0 0 1,0 1-1,0-1 1,0 0-1,0 0 1,1 1-1,-1-1 1,0 0-1,0 0 1,0 1-1,1-1 1,-1 0-1,0 0 1,0 0 0,0 1-1,1-1 1,-1 0-1,0 0 19,12-3-1040,15-15-778,-21 14 1715,-5 3 103,0 0 0,1 0 0,-1 0 1,1 1-1,-1-1 0,1 0 0,-1 1 1,1-1-1,-1 1 0,1-1 0,0 1 0,-1 0 1,1-1-1,0 1 0,-1 0 0,1 0 1,0 0-1,-1 1 0,1-1 0,0 0 0,-1 1 1,2-1-1,-2 1 6,0 0 0,1 0 0,-1 1-1,0-1 1,0 0 0,0 0 0,0 1 0,0-1 0,0 0 0,0 1 0,0-1 0,-1 1 0,1-1 0,-1 1 0,1-1 0,-1 1 0,1 0 0,-1 0-6,2 10 280,-1 0 1,-1 0-1,0 0 1,-1-1-1,-1 8-280,1-9 91,0 0 0,-1 1-1,-1-1 1,1-1 0,-2 1-1,1 0 1,-2-1 0,1 0-1,-1 1 1,-2 1-91,6-9 21,-1 1 1,0-1-1,0 1 1,-1-1-1,1 0 1,0 0-1,-1 0 1,1 0-1,-1 0 1,1 0-1,-1-1 1,0 0-1,0 1 1,0-1-1,0 0 1,0 0-1,0 0 1,0-1-1,0 1 1,0-1-1,0 0 1,-1 0-1,1 0 1,0 0-1,0 0 1,0-1-1,0 1 1,0-1-1,0 0 1,0 0-1,0 0 1,0 0-1,0-1 1,0 1-1,0-1-21,3 2-2,-4-2-294,1 0 0,-1 0 0,0 0 1,1 0-1,0-1 0,-1 1 0,-2-4 296,5 5-323,1 0 0,-1 0 0,0 0 0,1 0 0,-1 0 0,0 0 0,1-1 0,0 1 0,-1 0 0,1 0 0,0-1 0,-1 1 0,1 0 0,0 0-1,0-1 1,0 1 0,0 0 0,0-1 323,2-9-3834</inkml:trace>
+  <inkml:trace contextRef="#ctx0" brushRef="#br0" timeOffset="58946.225">608 272 5120,'14'-25'6887,"-2"-7"-3662,-11 29-3163,0 0 1,0 0-1,-1 0 1,1 0-1,-1 0 1,0 0-1,0-1 1,0 1-1,0 0 1,0 0-1,-1 0 1,1 0-1,-1 0 1,0 0-1,0 0 1,0 0-1,0 0 1,-1-2-63,1 5 27,1-1 1,0 1-1,-1-1 1,1 1-1,-1 0 0,1-1 1,-1 1-1,1-1 1,0 1-1,-1 0 1,1-1-1,-1 1 0,0 0 1,1 0-1,-1-1 1,1 1-1,-1 0 0,1 0 1,-1 0-1,0 0 1,1 0-1,-1 0 1,1 0-1,-1 0 0,0 0 1,1 0-1,-1 0 1,1 0-1,-1 0-27,-18 13 1023,-8 23 657,21-26-1478,-1 1-114,1-1 0,0 1 1,1 1-1,0-1 0,1 1 0,-2 7-88,6-18-18,0-1-1,0 0 1,0 0-1,0 1 1,0-1-1,0 0 1,0 0-1,0 1 1,0-1-1,0 0 1,0 1-1,0-1 1,0 0-1,0 1 1,0-1 0,0 0-1,0 0 1,0 1-1,0-1 1,0 0-1,0 0 1,1 1-1,-1-1 1,0 0-1,0 0 1,0 1-1,1-1 1,-1 0-1,0 0 1,0 0 0,0 1-1,1-1 1,-1 0-1,0 0 19,12-3-1040,15-15-778,-21 14 1715,-5 3 103,0 0 0,1 0 0,-1 0 1,1 1-1,-1-1 0,1 0 0,-1 1 1,1-1-1,-1 1 0,1-1 0,0 1 0,-1 0 1,1-1-1,0 1 0,-1 0 0,1 0 1,0 0-1,-1 1 0,1-1 0,0 0 0,-1 1 1,2-1-1,-2 1 6,0 0 0,1 0 0,-1 1-1,0-1 1,0 0 0,0 0 0,0 1 0,0-1 0,0 0 0,0 1 0,0-1 0,-1 1 0,1-1 0,-1 1 0,1-1 0,-1 1 0,1 0 0,-1 0-6,2 10 280,-1 0 1,-1 0-1,0 0 1,-1-1-1,-1 8-280,1-9 91,0 0 0,-1 1-1,-1-1 1,1-1 0,-2 1-1,1 0 1,-2-1 0,1 0-1,-1 1 1,-2 1-91,6-9 21,-1 1 1,0-1-1,0 1 1,-1-1-1,1 0 1,0 0-1,-1 0 1,1 0-1,-1 0 1,1 0-1,-1-1 1,0 0-1,0 1 1,0-1-1,0 0 1,0 0-1,0 0 1,0-1-1,0 1 1,0-1-1,0 0 1,-1 0-1,1 0 1,0 0-1,0 0 1,0-1-1,0 1 1,0-1-1,0 0 1,0 0-1,0 0 1,0 0-1,0-1 1,0 1-1,0-1-21,3 2-2,-4-2-294,1 0 0,-1 0 0,0 0 1,1 0-1,0-1 0,-1 1 0,-2-4 296,5 5-323,1 0 0,-1 0 0,0 0 0,1 0 0,-1 0 0,0 0 0,1-1 0,0 1 0,-1 0 0,1 0 0,0-1 0,-1 1 0,1 0 0,0 0-1,0-1 1,0 1 0,0 0 0,0-1 323,2-9-3834</inkml:trace>
   <inkml:trace contextRef="#ctx0" brushRef="#br0" timeOffset="59494.289">660 237 4864,'0'1'275,"1"0"-1,-1-1 1,0 1 0,1 0 0,-1-1-1,0 1 1,1-1 0,-1 1 0,1-1-1,-1 1 1,0-1 0,1 1 0,0-1-1,-1 1 1,1-1 0,-1 0 0,1 1-1,-1-1 1,1 0 0,0 1 0,-1-1-1,1 0 1,0 0 0,-1 0 0,1 0-1,0 1 1,-1-1 0,1 0 0,0 0-1,0 0-274,26-8 3528,-21 4-3343,0 1 0,1-1 1,-1 0-1,-1-1 0,1 0 0,0 1 0,-1-2-185,-4 5 21,1 0-1,-1-1 1,0 1 0,0-1-1,0 0 1,0 1 0,0-1-1,0 0 1,0 1 0,-1-1-1,1 0 1,-1 0-1,1 0 1,-1 0 0,1 0-1,-1 0 1,0 1 0,0-1-1,0 0 1,0 0 0,-1 0-1,1 0 1,0 0 0,-1 0-1,0-1-20,1 2-3,-1 1-1,1-1 0,0 1 1,-1-1-1,1 1 1,-1-1-1,1 1 1,-1 0-1,1-1 0,-1 1 1,1 0-1,-1-1 1,0 1-1,1 0 0,-1-1 1,1 1-1,-1 0 1,0 0-1,1 0 1,-1 0-1,0 0 0,1 0 1,-1 0-1,0 0 1,1 0-1,-1 0 4,-1 0-20,-1 1-1,1 0 0,0 0 1,0-1-1,0 1 1,1 0-1,-1 1 0,0-1 1,0 0-1,0 0 1,1 1-1,-2 1 21,-3 3-24,0 1 0,1-1 0,0 1 0,1 0 0,0 0 0,0 1 0,0-1 0,0 4 24,2-7 82,0 1 0,0-1 0,1 0 0,0 1 0,0-1 0,0 1 0,1-1 0,0 1 0,-1-1 0,1 1 0,1 0 0,-1-1 0,1 1 0,0-1 0,0 1 0,0-1-82,0-2 14,0 0-1,1-1 0,-1 1 1,1-1-1,-1 0 1,1 1-1,-1-1 1,1 0-1,-1 0 1,1 0-1,0 0 0,0 0 1,0-1-1,0 1 1,-1 0-1,1-1 1,0 1-1,0-1 1,0 0-1,0 0 1,0 0-1,0 0 0,0 0 1,0 0-1,0 0 1,0-1-1,0 1 1,0-1-1,0 1 1,0-1-1,0 0-13,7-1-442,1-1 0,-1 0 1,0-1-1,0 0 0,7-5 442,21-17-4821,-8 5-4923,-24 17 7899</inkml:trace>
   <inkml:trace contextRef="#ctx0" brushRef="#br0" timeOffset="59830.332">901 187 8320,'7'126'14596,"-7"-119"-13118,0-7-1506,11-61-1247,-11 58 1161,1-1-1,0 1 1,0 0-1,1-1 0,-1 1 1,1 0-1,-1 0 1,1 0-1,0 0 0,0 1 1,0-1-1,1 0 1,-1 1-1,1 0 1,-1-1-1,2 1 115,0 0-955,0 1 0,0 0 1,0 1-1,0-1 0,1 1 0,-1 0 0,0 0 0,0 0 1,0 0-1,2 1 955,8 0-5726,-4-1 2110</inkml:trace>
 </inkml:ink>
@@ -2033,7 +2991,7 @@
           <a:p>
             <a:fld id="{ABD63305-B72E-4F22-B0D9-812BAC717847}" type="datetimeFigureOut">
               <a:rPr lang="en-US" smtClean="0"/>
-              <a:t>12/12/2018</a:t>
+              <a:t>3/7/2019</a:t>
             </a:fld>
             <a:endParaRPr lang="en-US"/>
           </a:p>
@@ -2431,7 +3389,7 @@
           <a:p>
             <a:fld id="{FBC88FB9-3F80-4B9C-918D-86541A235AE3}" type="datetime1">
               <a:rPr lang="en-US" smtClean="0"/>
-              <a:t>12/12/2018</a:t>
+              <a:t>3/7/2019</a:t>
             </a:fld>
             <a:endParaRPr lang="en-US"/>
           </a:p>
@@ -2601,7 +3559,7 @@
           <a:p>
             <a:fld id="{104C3B38-9D41-48B0-9F00-B67EA91321D3}" type="datetime1">
               <a:rPr lang="en-US" smtClean="0"/>
-              <a:t>12/12/2018</a:t>
+              <a:t>3/7/2019</a:t>
             </a:fld>
             <a:endParaRPr lang="en-US"/>
           </a:p>
@@ -2781,7 +3739,7 @@
           <a:p>
             <a:fld id="{55B7DE25-87C8-4F0B-8082-393D0E146215}" type="datetime1">
               <a:rPr lang="en-US" smtClean="0"/>
-              <a:t>12/12/2018</a:t>
+              <a:t>3/7/2019</a:t>
             </a:fld>
             <a:endParaRPr lang="en-US"/>
           </a:p>
@@ -2951,7 +3909,7 @@
           <a:p>
             <a:fld id="{C1C6A387-0C0D-4268-81DF-ADFF59C1EE9C}" type="datetime1">
               <a:rPr lang="en-US" smtClean="0"/>
-              <a:t>12/12/2018</a:t>
+              <a:t>3/7/2019</a:t>
             </a:fld>
             <a:endParaRPr lang="en-US"/>
           </a:p>
@@ -3195,7 +4153,7 @@
           <a:p>
             <a:fld id="{A2138EA0-8988-4CDE-B4CF-BDA64A684FB2}" type="datetime1">
               <a:rPr lang="en-US" smtClean="0"/>
-              <a:t>12/12/2018</a:t>
+              <a:t>3/7/2019</a:t>
             </a:fld>
             <a:endParaRPr lang="en-US"/>
           </a:p>
@@ -3427,7 +4385,7 @@
           <a:p>
             <a:fld id="{7D43AE63-C342-45E6-A1FD-78AD443B3D7E}" type="datetime1">
               <a:rPr lang="en-US" smtClean="0"/>
-              <a:t>12/12/2018</a:t>
+              <a:t>3/7/2019</a:t>
             </a:fld>
             <a:endParaRPr lang="en-US"/>
           </a:p>
@@ -3794,7 +4752,7 @@
           <a:p>
             <a:fld id="{BB5A4F49-420C-4F65-BFAC-D600C2A9FBD6}" type="datetime1">
               <a:rPr lang="en-US" smtClean="0"/>
-              <a:t>12/12/2018</a:t>
+              <a:t>3/7/2019</a:t>
             </a:fld>
             <a:endParaRPr lang="en-US"/>
           </a:p>
@@ -3912,7 +4870,7 @@
           <a:p>
             <a:fld id="{2676A7FD-CC5C-48AD-9871-7B282DEDEB63}" type="datetime1">
               <a:rPr lang="en-US" smtClean="0"/>
-              <a:t>12/12/2018</a:t>
+              <a:t>3/7/2019</a:t>
             </a:fld>
             <a:endParaRPr lang="en-US"/>
           </a:p>
@@ -4007,7 +4965,7 @@
           <a:p>
             <a:fld id="{170A1047-7AE4-4E6C-A905-A9CFC449C8C9}" type="datetime1">
               <a:rPr lang="en-US" smtClean="0"/>
-              <a:t>12/12/2018</a:t>
+              <a:t>3/7/2019</a:t>
             </a:fld>
             <a:endParaRPr lang="en-US"/>
           </a:p>
@@ -4284,7 +5242,7 @@
           <a:p>
             <a:fld id="{63882572-BFED-4FAE-9433-EF99CBAF302D}" type="datetime1">
               <a:rPr lang="en-US" smtClean="0"/>
-              <a:t>12/12/2018</a:t>
+              <a:t>3/7/2019</a:t>
             </a:fld>
             <a:endParaRPr lang="en-US"/>
           </a:p>
@@ -4541,7 +5499,7 @@
           <a:p>
             <a:fld id="{8922A0B0-2172-4689-95C5-7909649212CA}" type="datetime1">
               <a:rPr lang="en-US" smtClean="0"/>
-              <a:t>12/12/2018</a:t>
+              <a:t>3/7/2019</a:t>
             </a:fld>
             <a:endParaRPr lang="en-US"/>
           </a:p>
@@ -4754,7 +5712,7 @@
           <a:p>
             <a:fld id="{FD1A5978-12A6-42FE-824C-89B78480B7E6}" type="datetime1">
               <a:rPr lang="en-US" smtClean="0"/>
-              <a:t>12/12/2018</a:t>
+              <a:t>3/7/2019</a:t>
             </a:fld>
             <a:endParaRPr lang="en-US"/>
           </a:p>
@@ -5497,8 +6455,8 @@
           </a:prstGeom>
         </p:spPr>
       </p:pic>
-      <mc:AlternateContent xmlns:mc="http://schemas.openxmlformats.org/markup-compatibility/2006">
-        <mc:Choice xmlns:p14="http://schemas.microsoft.com/office/powerpoint/2010/main" Requires="p14">
+      <mc:AlternateContent xmlns:mc="http://schemas.openxmlformats.org/markup-compatibility/2006" xmlns:p14="http://schemas.microsoft.com/office/powerpoint/2010/main">
+        <mc:Choice Requires="p14">
           <p:contentPart p14:bwMode="auto" r:id="rId3">
             <p14:nvContentPartPr>
               <p14:cNvPr id="3" name="Ink 2">
@@ -5517,7 +6475,7 @@
             </p14:xfrm>
           </p:contentPart>
         </mc:Choice>
-        <mc:Fallback>
+        <mc:Fallback xmlns="">
           <p:pic>
             <p:nvPicPr>
               <p:cNvPr id="3" name="Ink 2">
@@ -5548,8 +6506,8 @@
           </p:pic>
         </mc:Fallback>
       </mc:AlternateContent>
-      <mc:AlternateContent xmlns:mc="http://schemas.openxmlformats.org/markup-compatibility/2006">
-        <mc:Choice xmlns:p14="http://schemas.microsoft.com/office/powerpoint/2010/main" Requires="p14">
+      <mc:AlternateContent xmlns:mc="http://schemas.openxmlformats.org/markup-compatibility/2006" xmlns:p14="http://schemas.microsoft.com/office/powerpoint/2010/main">
+        <mc:Choice Requires="p14">
           <p:contentPart p14:bwMode="auto" r:id="rId5">
             <p14:nvContentPartPr>
               <p14:cNvPr id="6" name="Ink 5">
@@ -5568,7 +6526,7 @@
             </p14:xfrm>
           </p:contentPart>
         </mc:Choice>
-        <mc:Fallback>
+        <mc:Fallback xmlns="">
           <p:pic>
             <p:nvPicPr>
               <p:cNvPr id="6" name="Ink 5">
@@ -5599,8 +6557,8 @@
           </p:pic>
         </mc:Fallback>
       </mc:AlternateContent>
-      <mc:AlternateContent xmlns:mc="http://schemas.openxmlformats.org/markup-compatibility/2006">
-        <mc:Choice xmlns:p14="http://schemas.microsoft.com/office/powerpoint/2010/main" Requires="p14">
+      <mc:AlternateContent xmlns:mc="http://schemas.openxmlformats.org/markup-compatibility/2006" xmlns:p14="http://schemas.microsoft.com/office/powerpoint/2010/main">
+        <mc:Choice Requires="p14">
           <p:contentPart p14:bwMode="auto" r:id="rId7">
             <p14:nvContentPartPr>
               <p14:cNvPr id="7" name="Ink 6">
@@ -5619,7 +6577,7 @@
             </p14:xfrm>
           </p:contentPart>
         </mc:Choice>
-        <mc:Fallback>
+        <mc:Fallback xmlns="">
           <p:pic>
             <p:nvPicPr>
               <p:cNvPr id="7" name="Ink 6">
@@ -5680,6 +6638,135 @@
           <a:chExt cx="0" cy="0"/>
         </a:xfrm>
       </p:grpSpPr>
+      <p:pic>
+        <p:nvPicPr>
+          <p:cNvPr id="8" name="Picture 7">
+            <a:extLst>
+              <a:ext uri="{FF2B5EF4-FFF2-40B4-BE49-F238E27FC236}">
+                <a16:creationId xmlns:a16="http://schemas.microsoft.com/office/drawing/2014/main" id="{4ABB3391-74F5-40E4-9148-1DA4060413BA}"/>
+              </a:ext>
+            </a:extLst>
+          </p:cNvPr>
+          <p:cNvPicPr>
+            <a:picLocks noChangeAspect="1"/>
+          </p:cNvPicPr>
+          <p:nvPr/>
+        </p:nvPicPr>
+        <p:blipFill>
+          <a:blip r:embed="rId2"/>
+          <a:stretch>
+            <a:fillRect/>
+          </a:stretch>
+        </p:blipFill>
+        <p:spPr>
+          <a:xfrm>
+            <a:off x="153955" y="1017262"/>
+            <a:ext cx="8808097" cy="5569264"/>
+          </a:xfrm>
+          <a:prstGeom prst="rect">
+            <a:avLst/>
+          </a:prstGeom>
+        </p:spPr>
+      </p:pic>
+      <p:sp>
+        <p:nvSpPr>
+          <p:cNvPr id="2" name="Title 1">
+            <a:extLst>
+              <a:ext uri="{FF2B5EF4-FFF2-40B4-BE49-F238E27FC236}">
+                <a16:creationId xmlns:a16="http://schemas.microsoft.com/office/drawing/2014/main" id="{A3A56E3E-C25E-434A-B620-14E20769BFF2}"/>
+              </a:ext>
+            </a:extLst>
+          </p:cNvPr>
+          <p:cNvSpPr>
+            <a:spLocks noGrp="1"/>
+          </p:cNvSpPr>
+          <p:nvPr>
+            <p:ph type="title"/>
+          </p:nvPr>
+        </p:nvSpPr>
+        <p:spPr>
+          <a:xfrm>
+            <a:off x="557363" y="81181"/>
+            <a:ext cx="7886700" cy="1325563"/>
+          </a:xfrm>
+        </p:spPr>
+        <p:txBody>
+          <a:bodyPr>
+            <a:noAutofit/>
+          </a:bodyPr>
+          <a:lstStyle/>
+          <a:p>
+            <a:r>
+              <a:rPr lang="en-GB" sz="2400" dirty="0"/>
+              <a:t>“Coherence length” \xi and “normalized degree of coherence” \zeta vs. slit separation for wavelengths of 8, 13.5 </a:t>
+            </a:r>
+            <a:r>
+              <a:rPr lang="en-GB" sz="2400"/>
+              <a:t>and 18nm</a:t>
+            </a:r>
+            <a:endParaRPr lang="en-US" sz="2400" dirty="0"/>
+          </a:p>
+        </p:txBody>
+      </p:sp>
+      <p:sp>
+        <p:nvSpPr>
+          <p:cNvPr id="4" name="Slide Number Placeholder 3">
+            <a:extLst>
+              <a:ext uri="{FF2B5EF4-FFF2-40B4-BE49-F238E27FC236}">
+                <a16:creationId xmlns:a16="http://schemas.microsoft.com/office/drawing/2014/main" id="{978C5CEC-0FC2-4196-A243-CEEEC469E6E8}"/>
+              </a:ext>
+            </a:extLst>
+          </p:cNvPr>
+          <p:cNvSpPr>
+            <a:spLocks noGrp="1"/>
+          </p:cNvSpPr>
+          <p:nvPr>
+            <p:ph type="sldNum" sz="quarter" idx="12"/>
+          </p:nvPr>
+        </p:nvSpPr>
+        <p:spPr/>
+        <p:txBody>
+          <a:bodyPr/>
+          <a:lstStyle/>
+          <a:p>
+            <a:fld id="{4AD7F1FB-58A7-44B0-8504-E0770B674EC0}" type="slidenum">
+              <a:rPr lang="en-US" smtClean="0"/>
+              <a:t>4</a:t>
+            </a:fld>
+            <a:endParaRPr lang="en-US"/>
+          </a:p>
+        </p:txBody>
+      </p:sp>
+    </p:spTree>
+    <p:extLst>
+      <p:ext uri="{BB962C8B-B14F-4D97-AF65-F5344CB8AC3E}">
+        <p14:creationId xmlns:p14="http://schemas.microsoft.com/office/powerpoint/2010/main" val="3234310808"/>
+      </p:ext>
+    </p:extLst>
+  </p:cSld>
+  <p:clrMapOvr>
+    <a:masterClrMapping/>
+  </p:clrMapOvr>
+</p:sld>
+</file>
+
+<file path=ppt/slides/slide5.xml><?xml version="1.0" encoding="utf-8"?>
+<p:sld xmlns:a="http://schemas.openxmlformats.org/drawingml/2006/main" xmlns:r="http://schemas.openxmlformats.org/officeDocument/2006/relationships" xmlns:p="http://schemas.openxmlformats.org/presentationml/2006/main">
+  <p:cSld>
+    <p:spTree>
+      <p:nvGrpSpPr>
+        <p:cNvPr id="1" name=""/>
+        <p:cNvGrpSpPr/>
+        <p:nvPr/>
+      </p:nvGrpSpPr>
+      <p:grpSpPr>
+        <a:xfrm>
+          <a:off x="0" y="0"/>
+          <a:ext cx="0" cy="0"/>
+          <a:chOff x="0" y="0"/>
+          <a:chExt cx="0" cy="0"/>
+        </a:xfrm>
+      </p:grpSpPr>
       <p:sp>
         <p:nvSpPr>
           <p:cNvPr id="2" name="Title 1">
@@ -5732,7 +6819,7 @@
           <a:p>
             <a:fld id="{4AD7F1FB-58A7-44B0-8504-E0770B674EC0}" type="slidenum">
               <a:rPr lang="en-US" smtClean="0"/>
-              <a:t>4</a:t>
+              <a:t>5</a:t>
             </a:fld>
             <a:endParaRPr lang="en-US"/>
           </a:p>
@@ -5759,7 +6846,7 @@
         </p:blipFill>
         <p:spPr>
           <a:xfrm>
-            <a:off x="1858107" y="2472396"/>
+            <a:off x="1858107" y="2467506"/>
             <a:ext cx="5128846" cy="3014004"/>
           </a:xfrm>
           <a:prstGeom prst="rect">
@@ -5767,8 +6854,8 @@
           </a:prstGeom>
         </p:spPr>
       </p:pic>
-      <mc:AlternateContent xmlns:mc="http://schemas.openxmlformats.org/markup-compatibility/2006">
-        <mc:Choice xmlns:p14="http://schemas.microsoft.com/office/powerpoint/2010/main" Requires="p14">
+      <mc:AlternateContent xmlns:mc="http://schemas.openxmlformats.org/markup-compatibility/2006" xmlns:p14="http://schemas.microsoft.com/office/powerpoint/2010/main">
+        <mc:Choice Requires="p14">
           <p:contentPart p14:bwMode="auto" r:id="rId3">
             <p14:nvContentPartPr>
               <p14:cNvPr id="7" name="Ink 6">
@@ -5787,7 +6874,7 @@
             </p14:xfrm>
           </p:contentPart>
         </mc:Choice>
-        <mc:Fallback>
+        <mc:Fallback xmlns="">
           <p:pic>
             <p:nvPicPr>
               <p:cNvPr id="7" name="Ink 6">
@@ -5818,8 +6905,8 @@
           </p:pic>
         </mc:Fallback>
       </mc:AlternateContent>
-      <mc:AlternateContent xmlns:mc="http://schemas.openxmlformats.org/markup-compatibility/2006">
-        <mc:Choice xmlns:p14="http://schemas.microsoft.com/office/powerpoint/2010/main" Requires="p14">
+      <mc:AlternateContent xmlns:mc="http://schemas.openxmlformats.org/markup-compatibility/2006" xmlns:p14="http://schemas.microsoft.com/office/powerpoint/2010/main">
+        <mc:Choice Requires="p14">
           <p:contentPart p14:bwMode="auto" r:id="rId5">
             <p14:nvContentPartPr>
               <p14:cNvPr id="19" name="Ink 18">
@@ -5838,7 +6925,7 @@
             </p14:xfrm>
           </p:contentPart>
         </mc:Choice>
-        <mc:Fallback>
+        <mc:Fallback xmlns="">
           <p:pic>
             <p:nvPicPr>
               <p:cNvPr id="19" name="Ink 18">
@@ -5869,8 +6956,8 @@
           </p:pic>
         </mc:Fallback>
       </mc:AlternateContent>
-      <mc:AlternateContent xmlns:mc="http://schemas.openxmlformats.org/markup-compatibility/2006">
-        <mc:Choice xmlns:p14="http://schemas.microsoft.com/office/powerpoint/2010/main" Requires="p14">
+      <mc:AlternateContent xmlns:mc="http://schemas.openxmlformats.org/markup-compatibility/2006" xmlns:p14="http://schemas.microsoft.com/office/powerpoint/2010/main">
+        <mc:Choice Requires="p14">
           <p:contentPart p14:bwMode="auto" r:id="rId7">
             <p14:nvContentPartPr>
               <p14:cNvPr id="20" name="Ink 19">
@@ -5889,7 +6976,7 @@
             </p14:xfrm>
           </p:contentPart>
         </mc:Choice>
-        <mc:Fallback>
+        <mc:Fallback xmlns="">
           <p:pic>
             <p:nvPicPr>
               <p:cNvPr id="20" name="Ink 19">
@@ -5920,8 +7007,8 @@
           </p:pic>
         </mc:Fallback>
       </mc:AlternateContent>
-      <mc:AlternateContent xmlns:mc="http://schemas.openxmlformats.org/markup-compatibility/2006">
-        <mc:Choice xmlns:p14="http://schemas.microsoft.com/office/powerpoint/2010/main" Requires="p14">
+      <mc:AlternateContent xmlns:mc="http://schemas.openxmlformats.org/markup-compatibility/2006" xmlns:p14="http://schemas.microsoft.com/office/powerpoint/2010/main">
+        <mc:Choice Requires="p14">
           <p:contentPart p14:bwMode="auto" r:id="rId9">
             <p14:nvContentPartPr>
               <p14:cNvPr id="29" name="Ink 28">
@@ -5940,7 +7027,7 @@
             </p14:xfrm>
           </p:contentPart>
         </mc:Choice>
-        <mc:Fallback>
+        <mc:Fallback xmlns="">
           <p:pic>
             <p:nvPicPr>
               <p:cNvPr id="29" name="Ink 28">
@@ -5971,8 +7058,8 @@
           </p:pic>
         </mc:Fallback>
       </mc:AlternateContent>
-      <mc:AlternateContent xmlns:mc="http://schemas.openxmlformats.org/markup-compatibility/2006">
-        <mc:Choice xmlns:p14="http://schemas.microsoft.com/office/powerpoint/2010/main" Requires="p14">
+      <mc:AlternateContent xmlns:mc="http://schemas.openxmlformats.org/markup-compatibility/2006" xmlns:p14="http://schemas.microsoft.com/office/powerpoint/2010/main">
+        <mc:Choice Requires="p14">
           <p:contentPart p14:bwMode="auto" r:id="rId11">
             <p14:nvContentPartPr>
               <p14:cNvPr id="35" name="Ink 34">
@@ -5991,7 +7078,7 @@
             </p14:xfrm>
           </p:contentPart>
         </mc:Choice>
-        <mc:Fallback>
+        <mc:Fallback xmlns="">
           <p:pic>
             <p:nvPicPr>
               <p:cNvPr id="35" name="Ink 34">
@@ -6022,8 +7109,8 @@
           </p:pic>
         </mc:Fallback>
       </mc:AlternateContent>
-      <mc:AlternateContent xmlns:mc="http://schemas.openxmlformats.org/markup-compatibility/2006">
-        <mc:Choice xmlns:p14="http://schemas.microsoft.com/office/powerpoint/2010/main" Requires="p14">
+      <mc:AlternateContent xmlns:mc="http://schemas.openxmlformats.org/markup-compatibility/2006" xmlns:p14="http://schemas.microsoft.com/office/powerpoint/2010/main">
+        <mc:Choice Requires="p14">
           <p:contentPart p14:bwMode="auto" r:id="rId13">
             <p14:nvContentPartPr>
               <p14:cNvPr id="40" name="Ink 39">
@@ -6042,7 +7129,7 @@
             </p14:xfrm>
           </p:contentPart>
         </mc:Choice>
-        <mc:Fallback>
+        <mc:Fallback xmlns="">
           <p:pic>
             <p:nvPicPr>
               <p:cNvPr id="40" name="Ink 39">
@@ -6073,8 +7160,8 @@
           </p:pic>
         </mc:Fallback>
       </mc:AlternateContent>
-      <mc:AlternateContent xmlns:mc="http://schemas.openxmlformats.org/markup-compatibility/2006">
-        <mc:Choice xmlns:p14="http://schemas.microsoft.com/office/powerpoint/2010/main" Requires="p14">
+      <mc:AlternateContent xmlns:mc="http://schemas.openxmlformats.org/markup-compatibility/2006" xmlns:p14="http://schemas.microsoft.com/office/powerpoint/2010/main">
+        <mc:Choice Requires="p14">
           <p:contentPart p14:bwMode="auto" r:id="rId15">
             <p14:nvContentPartPr>
               <p14:cNvPr id="48" name="Ink 47">
@@ -6093,7 +7180,7 @@
             </p14:xfrm>
           </p:contentPart>
         </mc:Choice>
-        <mc:Fallback>
+        <mc:Fallback xmlns="">
           <p:pic>
             <p:nvPicPr>
               <p:cNvPr id="48" name="Ink 47">
@@ -6124,8 +7211,8 @@
           </p:pic>
         </mc:Fallback>
       </mc:AlternateContent>
-      <mc:AlternateContent xmlns:mc="http://schemas.openxmlformats.org/markup-compatibility/2006">
-        <mc:Choice xmlns:p14="http://schemas.microsoft.com/office/powerpoint/2010/main" Requires="p14">
+      <mc:AlternateContent xmlns:mc="http://schemas.openxmlformats.org/markup-compatibility/2006" xmlns:p14="http://schemas.microsoft.com/office/powerpoint/2010/main">
+        <mc:Choice Requires="p14">
           <p:contentPart p14:bwMode="auto" r:id="rId17">
             <p14:nvContentPartPr>
               <p14:cNvPr id="49" name="Ink 48">
@@ -6144,7 +7231,7 @@
             </p14:xfrm>
           </p:contentPart>
         </mc:Choice>
-        <mc:Fallback>
+        <mc:Fallback xmlns="">
           <p:pic>
             <p:nvPicPr>
               <p:cNvPr id="49" name="Ink 48">
@@ -6175,8 +7262,8 @@
           </p:pic>
         </mc:Fallback>
       </mc:AlternateContent>
-      <mc:AlternateContent xmlns:mc="http://schemas.openxmlformats.org/markup-compatibility/2006">
-        <mc:Choice xmlns:p14="http://schemas.microsoft.com/office/powerpoint/2010/main" Requires="p14">
+      <mc:AlternateContent xmlns:mc="http://schemas.openxmlformats.org/markup-compatibility/2006" xmlns:p14="http://schemas.microsoft.com/office/powerpoint/2010/main">
+        <mc:Choice Requires="p14">
           <p:contentPart p14:bwMode="auto" r:id="rId19">
             <p14:nvContentPartPr>
               <p14:cNvPr id="50" name="Ink 49">
@@ -6195,7 +7282,7 @@
             </p14:xfrm>
           </p:contentPart>
         </mc:Choice>
-        <mc:Fallback>
+        <mc:Fallback xmlns="">
           <p:pic>
             <p:nvPicPr>
               <p:cNvPr id="50" name="Ink 49">
@@ -6226,8 +7313,8 @@
           </p:pic>
         </mc:Fallback>
       </mc:AlternateContent>
-      <mc:AlternateContent xmlns:mc="http://schemas.openxmlformats.org/markup-compatibility/2006">
-        <mc:Choice xmlns:p14="http://schemas.microsoft.com/office/powerpoint/2010/main" Requires="p14">
+      <mc:AlternateContent xmlns:mc="http://schemas.openxmlformats.org/markup-compatibility/2006" xmlns:p14="http://schemas.microsoft.com/office/powerpoint/2010/main">
+        <mc:Choice Requires="p14">
           <p:contentPart p14:bwMode="auto" r:id="rId21">
             <p14:nvContentPartPr>
               <p14:cNvPr id="51" name="Ink 50">
@@ -6246,7 +7333,7 @@
             </p14:xfrm>
           </p:contentPart>
         </mc:Choice>
-        <mc:Fallback>
+        <mc:Fallback xmlns="">
           <p:pic>
             <p:nvPicPr>
               <p:cNvPr id="51" name="Ink 50">
@@ -6277,8 +7364,8 @@
           </p:pic>
         </mc:Fallback>
       </mc:AlternateContent>
-      <mc:AlternateContent xmlns:mc="http://schemas.openxmlformats.org/markup-compatibility/2006">
-        <mc:Choice xmlns:p14="http://schemas.microsoft.com/office/powerpoint/2010/main" Requires="p14">
+      <mc:AlternateContent xmlns:mc="http://schemas.openxmlformats.org/markup-compatibility/2006" xmlns:p14="http://schemas.microsoft.com/office/powerpoint/2010/main">
+        <mc:Choice Requires="p14">
           <p:contentPart p14:bwMode="auto" r:id="rId23">
             <p14:nvContentPartPr>
               <p14:cNvPr id="52" name="Ink 51">
@@ -6297,7 +7384,7 @@
             </p14:xfrm>
           </p:contentPart>
         </mc:Choice>
-        <mc:Fallback>
+        <mc:Fallback xmlns="">
           <p:pic>
             <p:nvPicPr>
               <p:cNvPr id="52" name="Ink 51">
@@ -6328,8 +7415,8 @@
           </p:pic>
         </mc:Fallback>
       </mc:AlternateContent>
-      <mc:AlternateContent xmlns:mc="http://schemas.openxmlformats.org/markup-compatibility/2006">
-        <mc:Choice xmlns:p14="http://schemas.microsoft.com/office/powerpoint/2010/main" Requires="p14">
+      <mc:AlternateContent xmlns:mc="http://schemas.openxmlformats.org/markup-compatibility/2006" xmlns:p14="http://schemas.microsoft.com/office/powerpoint/2010/main">
+        <mc:Choice Requires="p14">
           <p:contentPart p14:bwMode="auto" r:id="rId25">
             <p14:nvContentPartPr>
               <p14:cNvPr id="53" name="Ink 52">
@@ -6348,7 +7435,7 @@
             </p14:xfrm>
           </p:contentPart>
         </mc:Choice>
-        <mc:Fallback>
+        <mc:Fallback xmlns="">
           <p:pic>
             <p:nvPicPr>
               <p:cNvPr id="53" name="Ink 52">
@@ -6379,8 +7466,8 @@
           </p:pic>
         </mc:Fallback>
       </mc:AlternateContent>
-      <mc:AlternateContent xmlns:mc="http://schemas.openxmlformats.org/markup-compatibility/2006">
-        <mc:Choice xmlns:p14="http://schemas.microsoft.com/office/powerpoint/2010/main" Requires="p14">
+      <mc:AlternateContent xmlns:mc="http://schemas.openxmlformats.org/markup-compatibility/2006" xmlns:p14="http://schemas.microsoft.com/office/powerpoint/2010/main">
+        <mc:Choice Requires="p14">
           <p:contentPart p14:bwMode="auto" r:id="rId27">
             <p14:nvContentPartPr>
               <p14:cNvPr id="54" name="Ink 53">
@@ -6399,7 +7486,7 @@
             </p14:xfrm>
           </p:contentPart>
         </mc:Choice>
-        <mc:Fallback>
+        <mc:Fallback xmlns="">
           <p:pic>
             <p:nvPicPr>
               <p:cNvPr id="54" name="Ink 53">
@@ -6430,8 +7517,8 @@
           </p:pic>
         </mc:Fallback>
       </mc:AlternateContent>
-      <mc:AlternateContent xmlns:mc="http://schemas.openxmlformats.org/markup-compatibility/2006">
-        <mc:Choice xmlns:p14="http://schemas.microsoft.com/office/powerpoint/2010/main" Requires="p14">
+      <mc:AlternateContent xmlns:mc="http://schemas.openxmlformats.org/markup-compatibility/2006" xmlns:p14="http://schemas.microsoft.com/office/powerpoint/2010/main">
+        <mc:Choice Requires="p14">
           <p:contentPart p14:bwMode="auto" r:id="rId29">
             <p14:nvContentPartPr>
               <p14:cNvPr id="55" name="Ink 54">
@@ -6450,7 +7537,7 @@
             </p14:xfrm>
           </p:contentPart>
         </mc:Choice>
-        <mc:Fallback>
+        <mc:Fallback xmlns="">
           <p:pic>
             <p:nvPicPr>
               <p:cNvPr id="55" name="Ink 54">
@@ -6481,8 +7568,8 @@
           </p:pic>
         </mc:Fallback>
       </mc:AlternateContent>
-      <mc:AlternateContent xmlns:mc="http://schemas.openxmlformats.org/markup-compatibility/2006">
-        <mc:Choice xmlns:p14="http://schemas.microsoft.com/office/powerpoint/2010/main" Requires="p14">
+      <mc:AlternateContent xmlns:mc="http://schemas.openxmlformats.org/markup-compatibility/2006" xmlns:p14="http://schemas.microsoft.com/office/powerpoint/2010/main">
+        <mc:Choice Requires="p14">
           <p:contentPart p14:bwMode="auto" r:id="rId31">
             <p14:nvContentPartPr>
               <p14:cNvPr id="56" name="Ink 55">
@@ -6501,7 +7588,7 @@
             </p14:xfrm>
           </p:contentPart>
         </mc:Choice>
-        <mc:Fallback>
+        <mc:Fallback xmlns="">
           <p:pic>
             <p:nvPicPr>
               <p:cNvPr id="56" name="Ink 55">
@@ -6532,8 +7619,8 @@
           </p:pic>
         </mc:Fallback>
       </mc:AlternateContent>
-      <mc:AlternateContent xmlns:mc="http://schemas.openxmlformats.org/markup-compatibility/2006">
-        <mc:Choice xmlns:p14="http://schemas.microsoft.com/office/powerpoint/2010/main" Requires="p14">
+      <mc:AlternateContent xmlns:mc="http://schemas.openxmlformats.org/markup-compatibility/2006" xmlns:p14="http://schemas.microsoft.com/office/powerpoint/2010/main">
+        <mc:Choice Requires="p14">
           <p:contentPart p14:bwMode="auto" r:id="rId33">
             <p14:nvContentPartPr>
               <p14:cNvPr id="57" name="Ink 56">
@@ -6552,7 +7639,7 @@
             </p14:xfrm>
           </p:contentPart>
         </mc:Choice>
-        <mc:Fallback>
+        <mc:Fallback xmlns="">
           <p:pic>
             <p:nvPicPr>
               <p:cNvPr id="57" name="Ink 56">
@@ -6583,8 +7670,8 @@
           </p:pic>
         </mc:Fallback>
       </mc:AlternateContent>
-      <mc:AlternateContent xmlns:mc="http://schemas.openxmlformats.org/markup-compatibility/2006">
-        <mc:Choice xmlns:p14="http://schemas.microsoft.com/office/powerpoint/2010/main" Requires="p14">
+      <mc:AlternateContent xmlns:mc="http://schemas.openxmlformats.org/markup-compatibility/2006" xmlns:p14="http://schemas.microsoft.com/office/powerpoint/2010/main">
+        <mc:Choice Requires="p14">
           <p:contentPart p14:bwMode="auto" r:id="rId35">
             <p14:nvContentPartPr>
               <p14:cNvPr id="58" name="Ink 57">
@@ -6603,7 +7690,7 @@
             </p14:xfrm>
           </p:contentPart>
         </mc:Choice>
-        <mc:Fallback>
+        <mc:Fallback xmlns="">
           <p:pic>
             <p:nvPicPr>
               <p:cNvPr id="58" name="Ink 57">
@@ -6634,8 +7721,8 @@
           </p:pic>
         </mc:Fallback>
       </mc:AlternateContent>
-      <mc:AlternateContent xmlns:mc="http://schemas.openxmlformats.org/markup-compatibility/2006">
-        <mc:Choice xmlns:p14="http://schemas.microsoft.com/office/powerpoint/2010/main" Requires="p14">
+      <mc:AlternateContent xmlns:mc="http://schemas.openxmlformats.org/markup-compatibility/2006" xmlns:p14="http://schemas.microsoft.com/office/powerpoint/2010/main">
+        <mc:Choice Requires="p14">
           <p:contentPart p14:bwMode="auto" r:id="rId37">
             <p14:nvContentPartPr>
               <p14:cNvPr id="59" name="Ink 58">
@@ -6654,7 +7741,7 @@
             </p14:xfrm>
           </p:contentPart>
         </mc:Choice>
-        <mc:Fallback>
+        <mc:Fallback xmlns="">
           <p:pic>
             <p:nvPicPr>
               <p:cNvPr id="59" name="Ink 58">
@@ -6685,8 +7772,8 @@
           </p:pic>
         </mc:Fallback>
       </mc:AlternateContent>
-      <mc:AlternateContent xmlns:mc="http://schemas.openxmlformats.org/markup-compatibility/2006">
-        <mc:Choice xmlns:p14="http://schemas.microsoft.com/office/powerpoint/2010/main" Requires="p14">
+      <mc:AlternateContent xmlns:mc="http://schemas.openxmlformats.org/markup-compatibility/2006" xmlns:p14="http://schemas.microsoft.com/office/powerpoint/2010/main">
+        <mc:Choice Requires="p14">
           <p:contentPart p14:bwMode="auto" r:id="rId38">
             <p14:nvContentPartPr>
               <p14:cNvPr id="66" name="Ink 65">
@@ -6705,7 +7792,7 @@
             </p14:xfrm>
           </p:contentPart>
         </mc:Choice>
-        <mc:Fallback>
+        <mc:Fallback xmlns="">
           <p:pic>
             <p:nvPicPr>
               <p:cNvPr id="66" name="Ink 65">
@@ -6736,8 +7823,8 @@
           </p:pic>
         </mc:Fallback>
       </mc:AlternateContent>
-      <mc:AlternateContent xmlns:mc="http://schemas.openxmlformats.org/markup-compatibility/2006">
-        <mc:Choice xmlns:p14="http://schemas.microsoft.com/office/powerpoint/2010/main" Requires="p14">
+      <mc:AlternateContent xmlns:mc="http://schemas.openxmlformats.org/markup-compatibility/2006" xmlns:p14="http://schemas.microsoft.com/office/powerpoint/2010/main">
+        <mc:Choice Requires="p14">
           <p:contentPart p14:bwMode="auto" r:id="rId40">
             <p14:nvContentPartPr>
               <p14:cNvPr id="69" name="Ink 68">
@@ -6756,7 +7843,7 @@
             </p14:xfrm>
           </p:contentPart>
         </mc:Choice>
-        <mc:Fallback>
+        <mc:Fallback xmlns="">
           <p:pic>
             <p:nvPicPr>
               <p:cNvPr id="69" name="Ink 68">
@@ -6787,8 +7874,8 @@
           </p:pic>
         </mc:Fallback>
       </mc:AlternateContent>
-      <mc:AlternateContent xmlns:mc="http://schemas.openxmlformats.org/markup-compatibility/2006">
-        <mc:Choice xmlns:p14="http://schemas.microsoft.com/office/powerpoint/2010/main" Requires="p14">
+      <mc:AlternateContent xmlns:mc="http://schemas.openxmlformats.org/markup-compatibility/2006" xmlns:p14="http://schemas.microsoft.com/office/powerpoint/2010/main">
+        <mc:Choice Requires="p14">
           <p:contentPart p14:bwMode="auto" r:id="rId42">
             <p14:nvContentPartPr>
               <p14:cNvPr id="81" name="Ink 80">
@@ -6807,7 +7894,7 @@
             </p14:xfrm>
           </p:contentPart>
         </mc:Choice>
-        <mc:Fallback>
+        <mc:Fallback xmlns="">
           <p:pic>
             <p:nvPicPr>
               <p:cNvPr id="81" name="Ink 80">
@@ -6838,8 +7925,8 @@
           </p:pic>
         </mc:Fallback>
       </mc:AlternateContent>
-      <mc:AlternateContent xmlns:mc="http://schemas.openxmlformats.org/markup-compatibility/2006">
-        <mc:Choice xmlns:p14="http://schemas.microsoft.com/office/powerpoint/2010/main" Requires="p14">
+      <mc:AlternateContent xmlns:mc="http://schemas.openxmlformats.org/markup-compatibility/2006" xmlns:p14="http://schemas.microsoft.com/office/powerpoint/2010/main">
+        <mc:Choice Requires="p14">
           <p:contentPart p14:bwMode="auto" r:id="rId44">
             <p14:nvContentPartPr>
               <p14:cNvPr id="82" name="Ink 81">
@@ -6858,7 +7945,7 @@
             </p14:xfrm>
           </p:contentPart>
         </mc:Choice>
-        <mc:Fallback>
+        <mc:Fallback xmlns="">
           <p:pic>
             <p:nvPicPr>
               <p:cNvPr id="82" name="Ink 81">
@@ -6889,8 +7976,8 @@
           </p:pic>
         </mc:Fallback>
       </mc:AlternateContent>
-      <mc:AlternateContent xmlns:mc="http://schemas.openxmlformats.org/markup-compatibility/2006">
-        <mc:Choice xmlns:p14="http://schemas.microsoft.com/office/powerpoint/2010/main" Requires="p14">
+      <mc:AlternateContent xmlns:mc="http://schemas.openxmlformats.org/markup-compatibility/2006" xmlns:p14="http://schemas.microsoft.com/office/powerpoint/2010/main">
+        <mc:Choice Requires="p14">
           <p:contentPart p14:bwMode="auto" r:id="rId46">
             <p14:nvContentPartPr>
               <p14:cNvPr id="87" name="Ink 86">
@@ -6909,7 +7996,7 @@
             </p14:xfrm>
           </p:contentPart>
         </mc:Choice>
-        <mc:Fallback>
+        <mc:Fallback xmlns="">
           <p:pic>
             <p:nvPicPr>
               <p:cNvPr id="87" name="Ink 86">
@@ -6940,8 +8027,8 @@
           </p:pic>
         </mc:Fallback>
       </mc:AlternateContent>
-      <mc:AlternateContent xmlns:mc="http://schemas.openxmlformats.org/markup-compatibility/2006">
-        <mc:Choice xmlns:p14="http://schemas.microsoft.com/office/powerpoint/2010/main" Requires="p14">
+      <mc:AlternateContent xmlns:mc="http://schemas.openxmlformats.org/markup-compatibility/2006" xmlns:p14="http://schemas.microsoft.com/office/powerpoint/2010/main">
+        <mc:Choice Requires="p14">
           <p:contentPart p14:bwMode="auto" r:id="rId48">
             <p14:nvContentPartPr>
               <p14:cNvPr id="88" name="Ink 87">
@@ -6960,7 +8047,7 @@
             </p14:xfrm>
           </p:contentPart>
         </mc:Choice>
-        <mc:Fallback>
+        <mc:Fallback xmlns="">
           <p:pic>
             <p:nvPicPr>
               <p:cNvPr id="88" name="Ink 87">
@@ -6991,8 +8078,8 @@
           </p:pic>
         </mc:Fallback>
       </mc:AlternateContent>
-      <mc:AlternateContent xmlns:mc="http://schemas.openxmlformats.org/markup-compatibility/2006">
-        <mc:Choice xmlns:p14="http://schemas.microsoft.com/office/powerpoint/2010/main" Requires="p14">
+      <mc:AlternateContent xmlns:mc="http://schemas.openxmlformats.org/markup-compatibility/2006" xmlns:p14="http://schemas.microsoft.com/office/powerpoint/2010/main">
+        <mc:Choice Requires="p14">
           <p:contentPart p14:bwMode="auto" r:id="rId50">
             <p14:nvContentPartPr>
               <p14:cNvPr id="94" name="Ink 93">
@@ -7011,7 +8098,7 @@
             </p14:xfrm>
           </p:contentPart>
         </mc:Choice>
-        <mc:Fallback>
+        <mc:Fallback xmlns="">
           <p:pic>
             <p:nvPicPr>
               <p:cNvPr id="94" name="Ink 93">
@@ -7042,8 +8129,8 @@
           </p:pic>
         </mc:Fallback>
       </mc:AlternateContent>
-      <mc:AlternateContent xmlns:mc="http://schemas.openxmlformats.org/markup-compatibility/2006">
-        <mc:Choice xmlns:p14="http://schemas.microsoft.com/office/powerpoint/2010/main" Requires="p14">
+      <mc:AlternateContent xmlns:mc="http://schemas.openxmlformats.org/markup-compatibility/2006" xmlns:p14="http://schemas.microsoft.com/office/powerpoint/2010/main">
+        <mc:Choice Requires="p14">
           <p:contentPart p14:bwMode="auto" r:id="rId52">
             <p14:nvContentPartPr>
               <p14:cNvPr id="95" name="Ink 94">
@@ -7062,7 +8149,7 @@
             </p14:xfrm>
           </p:contentPart>
         </mc:Choice>
-        <mc:Fallback>
+        <mc:Fallback xmlns="">
           <p:pic>
             <p:nvPicPr>
               <p:cNvPr id="95" name="Ink 94">
@@ -7093,8 +8180,8 @@
           </p:pic>
         </mc:Fallback>
       </mc:AlternateContent>
-      <mc:AlternateContent xmlns:mc="http://schemas.openxmlformats.org/markup-compatibility/2006">
-        <mc:Choice xmlns:p14="http://schemas.microsoft.com/office/powerpoint/2010/main" Requires="p14">
+      <mc:AlternateContent xmlns:mc="http://schemas.openxmlformats.org/markup-compatibility/2006" xmlns:p14="http://schemas.microsoft.com/office/powerpoint/2010/main">
+        <mc:Choice Requires="p14">
           <p:contentPart p14:bwMode="auto" r:id="rId54">
             <p14:nvContentPartPr>
               <p14:cNvPr id="96" name="Ink 95">
@@ -7113,7 +8200,7 @@
             </p14:xfrm>
           </p:contentPart>
         </mc:Choice>
-        <mc:Fallback>
+        <mc:Fallback xmlns="">
           <p:pic>
             <p:nvPicPr>
               <p:cNvPr id="96" name="Ink 95">
@@ -7144,8 +8231,8 @@
           </p:pic>
         </mc:Fallback>
       </mc:AlternateContent>
-      <mc:AlternateContent xmlns:mc="http://schemas.openxmlformats.org/markup-compatibility/2006">
-        <mc:Choice xmlns:p14="http://schemas.microsoft.com/office/powerpoint/2010/main" Requires="p14">
+      <mc:AlternateContent xmlns:mc="http://schemas.openxmlformats.org/markup-compatibility/2006" xmlns:p14="http://schemas.microsoft.com/office/powerpoint/2010/main">
+        <mc:Choice Requires="p14">
           <p:contentPart p14:bwMode="auto" r:id="rId56">
             <p14:nvContentPartPr>
               <p14:cNvPr id="101" name="Ink 100">
@@ -7164,7 +8251,7 @@
             </p14:xfrm>
           </p:contentPart>
         </mc:Choice>
-        <mc:Fallback>
+        <mc:Fallback xmlns="">
           <p:pic>
             <p:nvPicPr>
               <p:cNvPr id="101" name="Ink 100">
@@ -7199,6 +8286,1556 @@
     <p:extLst>
       <p:ext uri="{BB962C8B-B14F-4D97-AF65-F5344CB8AC3E}">
         <p14:creationId xmlns:p14="http://schemas.microsoft.com/office/powerpoint/2010/main" val="3171243530"/>
+      </p:ext>
+    </p:extLst>
+  </p:cSld>
+  <p:clrMapOvr>
+    <a:masterClrMapping/>
+  </p:clrMapOvr>
+</p:sld>
+</file>
+
+<file path=ppt/slides/slide6.xml><?xml version="1.0" encoding="utf-8"?>
+<p:sld xmlns:a="http://schemas.openxmlformats.org/drawingml/2006/main" xmlns:r="http://schemas.openxmlformats.org/officeDocument/2006/relationships" xmlns:p="http://schemas.openxmlformats.org/presentationml/2006/main">
+  <p:cSld>
+    <p:spTree>
+      <p:nvGrpSpPr>
+        <p:cNvPr id="1" name=""/>
+        <p:cNvGrpSpPr/>
+        <p:nvPr/>
+      </p:nvGrpSpPr>
+      <p:grpSpPr>
+        <a:xfrm>
+          <a:off x="0" y="0"/>
+          <a:ext cx="0" cy="0"/>
+          <a:chOff x="0" y="0"/>
+          <a:chExt cx="0" cy="0"/>
+        </a:xfrm>
+      </p:grpSpPr>
+      <p:pic>
+        <p:nvPicPr>
+          <p:cNvPr id="3" name="Picture 2">
+            <a:extLst>
+              <a:ext uri="{FF2B5EF4-FFF2-40B4-BE49-F238E27FC236}">
+                <a16:creationId xmlns:a16="http://schemas.microsoft.com/office/drawing/2014/main" id="{99F89362-4001-406A-BD8A-3C5097374021}"/>
+              </a:ext>
+            </a:extLst>
+          </p:cNvPr>
+          <p:cNvPicPr>
+            <a:picLocks noChangeAspect="1"/>
+          </p:cNvPicPr>
+          <p:nvPr/>
+        </p:nvPicPr>
+        <p:blipFill>
+          <a:blip r:embed="rId2">
+            <a:alphaModFix/>
+          </a:blip>
+          <a:stretch>
+            <a:fillRect/>
+          </a:stretch>
+        </p:blipFill>
+        <p:spPr>
+          <a:xfrm>
+            <a:off x="1844067" y="2565530"/>
+            <a:ext cx="5058283" cy="2914180"/>
+          </a:xfrm>
+          <a:prstGeom prst="rect">
+            <a:avLst/>
+          </a:prstGeom>
+        </p:spPr>
+      </p:pic>
+      <p:sp>
+        <p:nvSpPr>
+          <p:cNvPr id="2" name="Title 1">
+            <a:extLst>
+              <a:ext uri="{FF2B5EF4-FFF2-40B4-BE49-F238E27FC236}">
+                <a16:creationId xmlns:a16="http://schemas.microsoft.com/office/drawing/2014/main" id="{AAEE8B13-2E97-426B-B7E7-4B402CFCF955}"/>
+              </a:ext>
+            </a:extLst>
+          </p:cNvPr>
+          <p:cNvSpPr>
+            <a:spLocks noGrp="1"/>
+          </p:cNvSpPr>
+          <p:nvPr>
+            <p:ph type="title"/>
+          </p:nvPr>
+        </p:nvSpPr>
+        <p:spPr/>
+        <p:txBody>
+          <a:bodyPr>
+            <a:normAutofit fontScale="90000"/>
+          </a:bodyPr>
+          <a:lstStyle/>
+          <a:p>
+            <a:r>
+              <a:rPr lang="en-GB" dirty="0"/>
+              <a:t>Total normalized degree of coherence vs. wavelength updated</a:t>
+            </a:r>
+            <a:endParaRPr lang="en-US" dirty="0"/>
+          </a:p>
+        </p:txBody>
+      </p:sp>
+      <p:sp>
+        <p:nvSpPr>
+          <p:cNvPr id="4" name="Slide Number Placeholder 3">
+            <a:extLst>
+              <a:ext uri="{FF2B5EF4-FFF2-40B4-BE49-F238E27FC236}">
+                <a16:creationId xmlns:a16="http://schemas.microsoft.com/office/drawing/2014/main" id="{5103715F-D023-4BA8-9020-0F24407A4307}"/>
+              </a:ext>
+            </a:extLst>
+          </p:cNvPr>
+          <p:cNvSpPr>
+            <a:spLocks noGrp="1"/>
+          </p:cNvSpPr>
+          <p:nvPr>
+            <p:ph type="sldNum" sz="quarter" idx="12"/>
+          </p:nvPr>
+        </p:nvSpPr>
+        <p:spPr/>
+        <p:txBody>
+          <a:bodyPr/>
+          <a:lstStyle/>
+          <a:p>
+            <a:fld id="{4AD7F1FB-58A7-44B0-8504-E0770B674EC0}" type="slidenum">
+              <a:rPr lang="en-US" smtClean="0"/>
+              <a:t>6</a:t>
+            </a:fld>
+            <a:endParaRPr lang="en-US"/>
+          </a:p>
+        </p:txBody>
+      </p:sp>
+      <mc:AlternateContent xmlns:mc="http://schemas.openxmlformats.org/markup-compatibility/2006" xmlns:p14="http://schemas.microsoft.com/office/powerpoint/2010/main">
+        <mc:Choice Requires="p14">
+          <p:contentPart p14:bwMode="auto" r:id="rId3">
+            <p14:nvContentPartPr>
+              <p14:cNvPr id="7" name="Ink 6">
+                <a:extLst>
+                  <a:ext uri="{FF2B5EF4-FFF2-40B4-BE49-F238E27FC236}">
+                    <a16:creationId xmlns:a16="http://schemas.microsoft.com/office/drawing/2014/main" id="{D993CFB4-2239-4298-BABC-E0BEAA91EEAA}"/>
+                  </a:ext>
+                </a:extLst>
+              </p14:cNvPr>
+              <p14:cNvContentPartPr/>
+              <p14:nvPr/>
+            </p14:nvContentPartPr>
+            <p14:xfrm>
+              <a:off x="2751191" y="3930059"/>
+              <a:ext cx="68760" cy="58320"/>
+            </p14:xfrm>
+          </p:contentPart>
+        </mc:Choice>
+        <mc:Fallback xmlns="">
+          <p:pic>
+            <p:nvPicPr>
+              <p:cNvPr id="7" name="Ink 6">
+                <a:extLst>
+                  <a:ext uri="{FF2B5EF4-FFF2-40B4-BE49-F238E27FC236}">
+                    <a16:creationId xmlns:a16="http://schemas.microsoft.com/office/drawing/2014/main" id="{D993CFB4-2239-4298-BABC-E0BEAA91EEAA}"/>
+                  </a:ext>
+                </a:extLst>
+              </p:cNvPr>
+              <p:cNvPicPr/>
+              <p:nvPr/>
+            </p:nvPicPr>
+            <p:blipFill>
+              <a:blip r:embed="rId4"/>
+              <a:stretch>
+                <a:fillRect/>
+              </a:stretch>
+            </p:blipFill>
+            <p:spPr>
+              <a:xfrm>
+                <a:off x="2742238" y="3921419"/>
+                <a:ext cx="86308" cy="75960"/>
+              </a:xfrm>
+              <a:prstGeom prst="rect">
+                <a:avLst/>
+              </a:prstGeom>
+            </p:spPr>
+          </p:pic>
+        </mc:Fallback>
+      </mc:AlternateContent>
+      <mc:AlternateContent xmlns:mc="http://schemas.openxmlformats.org/markup-compatibility/2006" xmlns:p14="http://schemas.microsoft.com/office/powerpoint/2010/main">
+        <mc:Choice Requires="p14">
+          <p:contentPart p14:bwMode="auto" r:id="rId5">
+            <p14:nvContentPartPr>
+              <p14:cNvPr id="19" name="Ink 18">
+                <a:extLst>
+                  <a:ext uri="{FF2B5EF4-FFF2-40B4-BE49-F238E27FC236}">
+                    <a16:creationId xmlns:a16="http://schemas.microsoft.com/office/drawing/2014/main" id="{EDC3D75F-C697-48EC-8C10-6587490C4E76}"/>
+                  </a:ext>
+                </a:extLst>
+              </p14:cNvPr>
+              <p14:cNvContentPartPr/>
+              <p14:nvPr/>
+            </p14:nvContentPartPr>
+            <p14:xfrm>
+              <a:off x="2852351" y="3676979"/>
+              <a:ext cx="29880" cy="101880"/>
+            </p14:xfrm>
+          </p:contentPart>
+        </mc:Choice>
+        <mc:Fallback xmlns="">
+          <p:pic>
+            <p:nvPicPr>
+              <p:cNvPr id="19" name="Ink 18">
+                <a:extLst>
+                  <a:ext uri="{FF2B5EF4-FFF2-40B4-BE49-F238E27FC236}">
+                    <a16:creationId xmlns:a16="http://schemas.microsoft.com/office/drawing/2014/main" id="{EDC3D75F-C697-48EC-8C10-6587490C4E76}"/>
+                  </a:ext>
+                </a:extLst>
+              </p:cNvPr>
+              <p:cNvPicPr/>
+              <p:nvPr/>
+            </p:nvPicPr>
+            <p:blipFill>
+              <a:blip r:embed="rId6"/>
+              <a:stretch>
+                <a:fillRect/>
+              </a:stretch>
+            </p:blipFill>
+            <p:spPr>
+              <a:xfrm>
+                <a:off x="2843711" y="3668339"/>
+                <a:ext cx="47520" cy="119520"/>
+              </a:xfrm>
+              <a:prstGeom prst="rect">
+                <a:avLst/>
+              </a:prstGeom>
+            </p:spPr>
+          </p:pic>
+        </mc:Fallback>
+      </mc:AlternateContent>
+      <mc:AlternateContent xmlns:mc="http://schemas.openxmlformats.org/markup-compatibility/2006" xmlns:p14="http://schemas.microsoft.com/office/powerpoint/2010/main">
+        <mc:Choice Requires="p14">
+          <p:contentPart p14:bwMode="auto" r:id="rId7">
+            <p14:nvContentPartPr>
+              <p14:cNvPr id="20" name="Ink 19">
+                <a:extLst>
+                  <a:ext uri="{FF2B5EF4-FFF2-40B4-BE49-F238E27FC236}">
+                    <a16:creationId xmlns:a16="http://schemas.microsoft.com/office/drawing/2014/main" id="{3BCC4D58-B083-4CD5-B030-BE3511772369}"/>
+                  </a:ext>
+                </a:extLst>
+              </p14:cNvPr>
+              <p14:cNvContentPartPr/>
+              <p14:nvPr/>
+            </p14:nvContentPartPr>
+            <p14:xfrm>
+              <a:off x="2486591" y="3658259"/>
+              <a:ext cx="331920" cy="105480"/>
+            </p14:xfrm>
+          </p:contentPart>
+        </mc:Choice>
+        <mc:Fallback xmlns="">
+          <p:pic>
+            <p:nvPicPr>
+              <p:cNvPr id="20" name="Ink 19">
+                <a:extLst>
+                  <a:ext uri="{FF2B5EF4-FFF2-40B4-BE49-F238E27FC236}">
+                    <a16:creationId xmlns:a16="http://schemas.microsoft.com/office/drawing/2014/main" id="{3BCC4D58-B083-4CD5-B030-BE3511772369}"/>
+                  </a:ext>
+                </a:extLst>
+              </p:cNvPr>
+              <p:cNvPicPr/>
+              <p:nvPr/>
+            </p:nvPicPr>
+            <p:blipFill>
+              <a:blip r:embed="rId8"/>
+              <a:stretch>
+                <a:fillRect/>
+              </a:stretch>
+            </p:blipFill>
+            <p:spPr>
+              <a:xfrm>
+                <a:off x="2477951" y="3649259"/>
+                <a:ext cx="349560" cy="123120"/>
+              </a:xfrm>
+              <a:prstGeom prst="rect">
+                <a:avLst/>
+              </a:prstGeom>
+            </p:spPr>
+          </p:pic>
+        </mc:Fallback>
+      </mc:AlternateContent>
+      <mc:AlternateContent xmlns:mc="http://schemas.openxmlformats.org/markup-compatibility/2006" xmlns:p14="http://schemas.microsoft.com/office/powerpoint/2010/main">
+        <mc:Choice Requires="p14">
+          <p:contentPart p14:bwMode="auto" r:id="rId9">
+            <p14:nvContentPartPr>
+              <p14:cNvPr id="29" name="Ink 28">
+                <a:extLst>
+                  <a:ext uri="{FF2B5EF4-FFF2-40B4-BE49-F238E27FC236}">
+                    <a16:creationId xmlns:a16="http://schemas.microsoft.com/office/drawing/2014/main" id="{998E5B83-59DA-49A7-8E97-B9F1C6DB216D}"/>
+                  </a:ext>
+                </a:extLst>
+              </p14:cNvPr>
+              <p14:cNvContentPartPr/>
+              <p14:nvPr/>
+            </p14:nvContentPartPr>
+            <p14:xfrm>
+              <a:off x="2991671" y="3643859"/>
+              <a:ext cx="367560" cy="186840"/>
+            </p14:xfrm>
+          </p:contentPart>
+        </mc:Choice>
+        <mc:Fallback xmlns="">
+          <p:pic>
+            <p:nvPicPr>
+              <p:cNvPr id="29" name="Ink 28">
+                <a:extLst>
+                  <a:ext uri="{FF2B5EF4-FFF2-40B4-BE49-F238E27FC236}">
+                    <a16:creationId xmlns:a16="http://schemas.microsoft.com/office/drawing/2014/main" id="{998E5B83-59DA-49A7-8E97-B9F1C6DB216D}"/>
+                  </a:ext>
+                </a:extLst>
+              </p:cNvPr>
+              <p:cNvPicPr/>
+              <p:nvPr/>
+            </p:nvPicPr>
+            <p:blipFill>
+              <a:blip r:embed="rId10"/>
+              <a:stretch>
+                <a:fillRect/>
+              </a:stretch>
+            </p:blipFill>
+            <p:spPr>
+              <a:xfrm>
+                <a:off x="2983031" y="3635219"/>
+                <a:ext cx="385200" cy="204480"/>
+              </a:xfrm>
+              <a:prstGeom prst="rect">
+                <a:avLst/>
+              </a:prstGeom>
+            </p:spPr>
+          </p:pic>
+        </mc:Fallback>
+      </mc:AlternateContent>
+      <mc:AlternateContent xmlns:mc="http://schemas.openxmlformats.org/markup-compatibility/2006" xmlns:p14="http://schemas.microsoft.com/office/powerpoint/2010/main">
+        <mc:Choice Requires="p14">
+          <p:contentPart p14:bwMode="auto" r:id="rId11">
+            <p14:nvContentPartPr>
+              <p14:cNvPr id="35" name="Ink 34">
+                <a:extLst>
+                  <a:ext uri="{FF2B5EF4-FFF2-40B4-BE49-F238E27FC236}">
+                    <a16:creationId xmlns:a16="http://schemas.microsoft.com/office/drawing/2014/main" id="{46C6931C-055A-4582-A7A7-2F27BC69A649}"/>
+                  </a:ext>
+                </a:extLst>
+              </p14:cNvPr>
+              <p14:cNvContentPartPr/>
+              <p14:nvPr/>
+            </p14:nvContentPartPr>
+            <p14:xfrm>
+              <a:off x="3392711" y="3630539"/>
+              <a:ext cx="301680" cy="162720"/>
+            </p14:xfrm>
+          </p:contentPart>
+        </mc:Choice>
+        <mc:Fallback xmlns="">
+          <p:pic>
+            <p:nvPicPr>
+              <p:cNvPr id="35" name="Ink 34">
+                <a:extLst>
+                  <a:ext uri="{FF2B5EF4-FFF2-40B4-BE49-F238E27FC236}">
+                    <a16:creationId xmlns:a16="http://schemas.microsoft.com/office/drawing/2014/main" id="{46C6931C-055A-4582-A7A7-2F27BC69A649}"/>
+                  </a:ext>
+                </a:extLst>
+              </p:cNvPr>
+              <p:cNvPicPr/>
+              <p:nvPr/>
+            </p:nvPicPr>
+            <p:blipFill>
+              <a:blip r:embed="rId12"/>
+              <a:stretch>
+                <a:fillRect/>
+              </a:stretch>
+            </p:blipFill>
+            <p:spPr>
+              <a:xfrm>
+                <a:off x="3384061" y="3621899"/>
+                <a:ext cx="319341" cy="180360"/>
+              </a:xfrm>
+              <a:prstGeom prst="rect">
+                <a:avLst/>
+              </a:prstGeom>
+            </p:spPr>
+          </p:pic>
+        </mc:Fallback>
+      </mc:AlternateContent>
+      <mc:AlternateContent xmlns:mc="http://schemas.openxmlformats.org/markup-compatibility/2006" xmlns:p14="http://schemas.microsoft.com/office/powerpoint/2010/main">
+        <mc:Choice Requires="p14">
+          <p:contentPart p14:bwMode="auto" r:id="rId13">
+            <p14:nvContentPartPr>
+              <p14:cNvPr id="40" name="Ink 39">
+                <a:extLst>
+                  <a:ext uri="{FF2B5EF4-FFF2-40B4-BE49-F238E27FC236}">
+                    <a16:creationId xmlns:a16="http://schemas.microsoft.com/office/drawing/2014/main" id="{6FE44679-218D-49C8-95E8-E1C49F3CE707}"/>
+                  </a:ext>
+                </a:extLst>
+              </p14:cNvPr>
+              <p14:cNvContentPartPr/>
+              <p14:nvPr/>
+            </p14:nvContentPartPr>
+            <p14:xfrm>
+              <a:off x="7987445" y="5216477"/>
+              <a:ext cx="137880" cy="192240"/>
+            </p14:xfrm>
+          </p:contentPart>
+        </mc:Choice>
+        <mc:Fallback xmlns="">
+          <p:pic>
+            <p:nvPicPr>
+              <p:cNvPr id="40" name="Ink 39">
+                <a:extLst>
+                  <a:ext uri="{FF2B5EF4-FFF2-40B4-BE49-F238E27FC236}">
+                    <a16:creationId xmlns:a16="http://schemas.microsoft.com/office/drawing/2014/main" id="{6FE44679-218D-49C8-95E8-E1C49F3CE707}"/>
+                  </a:ext>
+                </a:extLst>
+              </p:cNvPr>
+              <p:cNvPicPr/>
+              <p:nvPr/>
+            </p:nvPicPr>
+            <p:blipFill>
+              <a:blip r:embed="rId14"/>
+              <a:stretch>
+                <a:fillRect/>
+              </a:stretch>
+            </p:blipFill>
+            <p:spPr>
+              <a:xfrm>
+                <a:off x="7978421" y="5207494"/>
+                <a:ext cx="155566" cy="209847"/>
+              </a:xfrm>
+              <a:prstGeom prst="rect">
+                <a:avLst/>
+              </a:prstGeom>
+            </p:spPr>
+          </p:pic>
+        </mc:Fallback>
+      </mc:AlternateContent>
+      <mc:AlternateContent xmlns:mc="http://schemas.openxmlformats.org/markup-compatibility/2006" xmlns:p14="http://schemas.microsoft.com/office/powerpoint/2010/main">
+        <mc:Choice Requires="p14">
+          <p:contentPart p14:bwMode="auto" r:id="rId15">
+            <p14:nvContentPartPr>
+              <p14:cNvPr id="48" name="Ink 47">
+                <a:extLst>
+                  <a:ext uri="{FF2B5EF4-FFF2-40B4-BE49-F238E27FC236}">
+                    <a16:creationId xmlns:a16="http://schemas.microsoft.com/office/drawing/2014/main" id="{2A5207BE-244A-4AAA-853A-2F278A6CA56B}"/>
+                  </a:ext>
+                </a:extLst>
+              </p14:cNvPr>
+              <p14:cNvContentPartPr/>
+              <p14:nvPr/>
+            </p14:nvContentPartPr>
+            <p14:xfrm>
+              <a:off x="6856685" y="5203877"/>
+              <a:ext cx="23040" cy="2880"/>
+            </p14:xfrm>
+          </p:contentPart>
+        </mc:Choice>
+        <mc:Fallback xmlns="">
+          <p:pic>
+            <p:nvPicPr>
+              <p:cNvPr id="48" name="Ink 47">
+                <a:extLst>
+                  <a:ext uri="{FF2B5EF4-FFF2-40B4-BE49-F238E27FC236}">
+                    <a16:creationId xmlns:a16="http://schemas.microsoft.com/office/drawing/2014/main" id="{2A5207BE-244A-4AAA-853A-2F278A6CA56B}"/>
+                  </a:ext>
+                </a:extLst>
+              </p:cNvPr>
+              <p:cNvPicPr/>
+              <p:nvPr/>
+            </p:nvPicPr>
+            <p:blipFill>
+              <a:blip r:embed="rId16"/>
+              <a:stretch>
+                <a:fillRect/>
+              </a:stretch>
+            </p:blipFill>
+            <p:spPr>
+              <a:xfrm>
+                <a:off x="6847685" y="5195237"/>
+                <a:ext cx="40680" cy="20520"/>
+              </a:xfrm>
+              <a:prstGeom prst="rect">
+                <a:avLst/>
+              </a:prstGeom>
+            </p:spPr>
+          </p:pic>
+        </mc:Fallback>
+      </mc:AlternateContent>
+      <mc:AlternateContent xmlns:mc="http://schemas.openxmlformats.org/markup-compatibility/2006" xmlns:p14="http://schemas.microsoft.com/office/powerpoint/2010/main">
+        <mc:Choice Requires="p14">
+          <p:contentPart p14:bwMode="auto" r:id="rId17">
+            <p14:nvContentPartPr>
+              <p14:cNvPr id="49" name="Ink 48">
+                <a:extLst>
+                  <a:ext uri="{FF2B5EF4-FFF2-40B4-BE49-F238E27FC236}">
+                    <a16:creationId xmlns:a16="http://schemas.microsoft.com/office/drawing/2014/main" id="{32B0AB7B-8842-4269-B5BF-CC7D1642BC2F}"/>
+                  </a:ext>
+                </a:extLst>
+              </p14:cNvPr>
+              <p14:cNvContentPartPr/>
+              <p14:nvPr/>
+            </p14:nvContentPartPr>
+            <p14:xfrm>
+              <a:off x="7146485" y="5201357"/>
+              <a:ext cx="18000" cy="360"/>
+            </p14:xfrm>
+          </p:contentPart>
+        </mc:Choice>
+        <mc:Fallback xmlns="">
+          <p:pic>
+            <p:nvPicPr>
+              <p:cNvPr id="49" name="Ink 48">
+                <a:extLst>
+                  <a:ext uri="{FF2B5EF4-FFF2-40B4-BE49-F238E27FC236}">
+                    <a16:creationId xmlns:a16="http://schemas.microsoft.com/office/drawing/2014/main" id="{32B0AB7B-8842-4269-B5BF-CC7D1642BC2F}"/>
+                  </a:ext>
+                </a:extLst>
+              </p:cNvPr>
+              <p:cNvPicPr/>
+              <p:nvPr/>
+            </p:nvPicPr>
+            <p:blipFill>
+              <a:blip r:embed="rId18"/>
+              <a:stretch>
+                <a:fillRect/>
+              </a:stretch>
+            </p:blipFill>
+            <p:spPr>
+              <a:xfrm>
+                <a:off x="7137845" y="5192717"/>
+                <a:ext cx="35640" cy="18000"/>
+              </a:xfrm>
+              <a:prstGeom prst="rect">
+                <a:avLst/>
+              </a:prstGeom>
+            </p:spPr>
+          </p:pic>
+        </mc:Fallback>
+      </mc:AlternateContent>
+      <mc:AlternateContent xmlns:mc="http://schemas.openxmlformats.org/markup-compatibility/2006" xmlns:p14="http://schemas.microsoft.com/office/powerpoint/2010/main">
+        <mc:Choice Requires="p14">
+          <p:contentPart p14:bwMode="auto" r:id="rId19">
+            <p14:nvContentPartPr>
+              <p14:cNvPr id="50" name="Ink 49">
+                <a:extLst>
+                  <a:ext uri="{FF2B5EF4-FFF2-40B4-BE49-F238E27FC236}">
+                    <a16:creationId xmlns:a16="http://schemas.microsoft.com/office/drawing/2014/main" id="{A5BD4E27-AD84-4C5F-83D3-0111D915AF9F}"/>
+                  </a:ext>
+                </a:extLst>
+              </p14:cNvPr>
+              <p14:cNvContentPartPr/>
+              <p14:nvPr/>
+            </p14:nvContentPartPr>
+            <p14:xfrm>
+              <a:off x="7243325" y="5197397"/>
+              <a:ext cx="15120" cy="360"/>
+            </p14:xfrm>
+          </p:contentPart>
+        </mc:Choice>
+        <mc:Fallback xmlns="">
+          <p:pic>
+            <p:nvPicPr>
+              <p:cNvPr id="50" name="Ink 49">
+                <a:extLst>
+                  <a:ext uri="{FF2B5EF4-FFF2-40B4-BE49-F238E27FC236}">
+                    <a16:creationId xmlns:a16="http://schemas.microsoft.com/office/drawing/2014/main" id="{A5BD4E27-AD84-4C5F-83D3-0111D915AF9F}"/>
+                  </a:ext>
+                </a:extLst>
+              </p:cNvPr>
+              <p:cNvPicPr/>
+              <p:nvPr/>
+            </p:nvPicPr>
+            <p:blipFill>
+              <a:blip r:embed="rId20"/>
+              <a:stretch>
+                <a:fillRect/>
+              </a:stretch>
+            </p:blipFill>
+            <p:spPr>
+              <a:xfrm>
+                <a:off x="7234685" y="5188397"/>
+                <a:ext cx="32760" cy="18000"/>
+              </a:xfrm>
+              <a:prstGeom prst="rect">
+                <a:avLst/>
+              </a:prstGeom>
+            </p:spPr>
+          </p:pic>
+        </mc:Fallback>
+      </mc:AlternateContent>
+      <mc:AlternateContent xmlns:mc="http://schemas.openxmlformats.org/markup-compatibility/2006" xmlns:p14="http://schemas.microsoft.com/office/powerpoint/2010/main">
+        <mc:Choice Requires="p14">
+          <p:contentPart p14:bwMode="auto" r:id="rId21">
+            <p14:nvContentPartPr>
+              <p14:cNvPr id="51" name="Ink 50">
+                <a:extLst>
+                  <a:ext uri="{FF2B5EF4-FFF2-40B4-BE49-F238E27FC236}">
+                    <a16:creationId xmlns:a16="http://schemas.microsoft.com/office/drawing/2014/main" id="{BD929BB4-BA48-4674-9BD5-8E4275F16698}"/>
+                  </a:ext>
+                </a:extLst>
+              </p14:cNvPr>
+              <p14:cNvContentPartPr/>
+              <p14:nvPr/>
+            </p14:nvContentPartPr>
+            <p14:xfrm>
+              <a:off x="7352045" y="5201357"/>
+              <a:ext cx="23040" cy="360"/>
+            </p14:xfrm>
+          </p:contentPart>
+        </mc:Choice>
+        <mc:Fallback xmlns="">
+          <p:pic>
+            <p:nvPicPr>
+              <p:cNvPr id="51" name="Ink 50">
+                <a:extLst>
+                  <a:ext uri="{FF2B5EF4-FFF2-40B4-BE49-F238E27FC236}">
+                    <a16:creationId xmlns:a16="http://schemas.microsoft.com/office/drawing/2014/main" id="{BD929BB4-BA48-4674-9BD5-8E4275F16698}"/>
+                  </a:ext>
+                </a:extLst>
+              </p:cNvPr>
+              <p:cNvPicPr/>
+              <p:nvPr/>
+            </p:nvPicPr>
+            <p:blipFill>
+              <a:blip r:embed="rId22"/>
+              <a:stretch>
+                <a:fillRect/>
+              </a:stretch>
+            </p:blipFill>
+            <p:spPr>
+              <a:xfrm>
+                <a:off x="7343045" y="5192717"/>
+                <a:ext cx="40680" cy="18000"/>
+              </a:xfrm>
+              <a:prstGeom prst="rect">
+                <a:avLst/>
+              </a:prstGeom>
+            </p:spPr>
+          </p:pic>
+        </mc:Fallback>
+      </mc:AlternateContent>
+      <mc:AlternateContent xmlns:mc="http://schemas.openxmlformats.org/markup-compatibility/2006" xmlns:p14="http://schemas.microsoft.com/office/powerpoint/2010/main">
+        <mc:Choice Requires="p14">
+          <p:contentPart p14:bwMode="auto" r:id="rId23">
+            <p14:nvContentPartPr>
+              <p14:cNvPr id="52" name="Ink 51">
+                <a:extLst>
+                  <a:ext uri="{FF2B5EF4-FFF2-40B4-BE49-F238E27FC236}">
+                    <a16:creationId xmlns:a16="http://schemas.microsoft.com/office/drawing/2014/main" id="{5F4562F2-DC40-4283-9AD8-F9E227E036F1}"/>
+                  </a:ext>
+                </a:extLst>
+              </p14:cNvPr>
+              <p14:cNvContentPartPr/>
+              <p14:nvPr/>
+            </p14:nvContentPartPr>
+            <p14:xfrm>
+              <a:off x="7466165" y="5192717"/>
+              <a:ext cx="180000" cy="3600"/>
+            </p14:xfrm>
+          </p:contentPart>
+        </mc:Choice>
+        <mc:Fallback xmlns="">
+          <p:pic>
+            <p:nvPicPr>
+              <p:cNvPr id="52" name="Ink 51">
+                <a:extLst>
+                  <a:ext uri="{FF2B5EF4-FFF2-40B4-BE49-F238E27FC236}">
+                    <a16:creationId xmlns:a16="http://schemas.microsoft.com/office/drawing/2014/main" id="{5F4562F2-DC40-4283-9AD8-F9E227E036F1}"/>
+                  </a:ext>
+                </a:extLst>
+              </p:cNvPr>
+              <p:cNvPicPr/>
+              <p:nvPr/>
+            </p:nvPicPr>
+            <p:blipFill>
+              <a:blip r:embed="rId24"/>
+              <a:stretch>
+                <a:fillRect/>
+              </a:stretch>
+            </p:blipFill>
+            <p:spPr>
+              <a:xfrm>
+                <a:off x="7457525" y="5183717"/>
+                <a:ext cx="197640" cy="21240"/>
+              </a:xfrm>
+              <a:prstGeom prst="rect">
+                <a:avLst/>
+              </a:prstGeom>
+            </p:spPr>
+          </p:pic>
+        </mc:Fallback>
+      </mc:AlternateContent>
+      <mc:AlternateContent xmlns:mc="http://schemas.openxmlformats.org/markup-compatibility/2006" xmlns:p14="http://schemas.microsoft.com/office/powerpoint/2010/main">
+        <mc:Choice Requires="p14">
+          <p:contentPart p14:bwMode="auto" r:id="rId25">
+            <p14:nvContentPartPr>
+              <p14:cNvPr id="53" name="Ink 52">
+                <a:extLst>
+                  <a:ext uri="{FF2B5EF4-FFF2-40B4-BE49-F238E27FC236}">
+                    <a16:creationId xmlns:a16="http://schemas.microsoft.com/office/drawing/2014/main" id="{5599F342-9D70-4146-8CD8-03807EDC8567}"/>
+                  </a:ext>
+                </a:extLst>
+              </p14:cNvPr>
+              <p14:cNvContentPartPr/>
+              <p14:nvPr/>
+            </p14:nvContentPartPr>
+            <p14:xfrm>
+              <a:off x="7710245" y="5195957"/>
+              <a:ext cx="47160" cy="360"/>
+            </p14:xfrm>
+          </p:contentPart>
+        </mc:Choice>
+        <mc:Fallback xmlns="">
+          <p:pic>
+            <p:nvPicPr>
+              <p:cNvPr id="53" name="Ink 52">
+                <a:extLst>
+                  <a:ext uri="{FF2B5EF4-FFF2-40B4-BE49-F238E27FC236}">
+                    <a16:creationId xmlns:a16="http://schemas.microsoft.com/office/drawing/2014/main" id="{5599F342-9D70-4146-8CD8-03807EDC8567}"/>
+                  </a:ext>
+                </a:extLst>
+              </p:cNvPr>
+              <p:cNvPicPr/>
+              <p:nvPr/>
+            </p:nvPicPr>
+            <p:blipFill>
+              <a:blip r:embed="rId26"/>
+              <a:stretch>
+                <a:fillRect/>
+              </a:stretch>
+            </p:blipFill>
+            <p:spPr>
+              <a:xfrm>
+                <a:off x="7701605" y="5186957"/>
+                <a:ext cx="64800" cy="18000"/>
+              </a:xfrm>
+              <a:prstGeom prst="rect">
+                <a:avLst/>
+              </a:prstGeom>
+            </p:spPr>
+          </p:pic>
+        </mc:Fallback>
+      </mc:AlternateContent>
+      <mc:AlternateContent xmlns:mc="http://schemas.openxmlformats.org/markup-compatibility/2006" xmlns:p14="http://schemas.microsoft.com/office/powerpoint/2010/main">
+        <mc:Choice Requires="p14">
+          <p:contentPart p14:bwMode="auto" r:id="rId27">
+            <p14:nvContentPartPr>
+              <p14:cNvPr id="54" name="Ink 53">
+                <a:extLst>
+                  <a:ext uri="{FF2B5EF4-FFF2-40B4-BE49-F238E27FC236}">
+                    <a16:creationId xmlns:a16="http://schemas.microsoft.com/office/drawing/2014/main" id="{EB83E669-1562-4981-9AA6-33F16EA57F29}"/>
+                  </a:ext>
+                </a:extLst>
+              </p14:cNvPr>
+              <p14:cNvContentPartPr/>
+              <p14:nvPr/>
+            </p14:nvContentPartPr>
+            <p14:xfrm>
+              <a:off x="7853885" y="5192717"/>
+              <a:ext cx="34920" cy="1800"/>
+            </p14:xfrm>
+          </p:contentPart>
+        </mc:Choice>
+        <mc:Fallback xmlns="">
+          <p:pic>
+            <p:nvPicPr>
+              <p:cNvPr id="54" name="Ink 53">
+                <a:extLst>
+                  <a:ext uri="{FF2B5EF4-FFF2-40B4-BE49-F238E27FC236}">
+                    <a16:creationId xmlns:a16="http://schemas.microsoft.com/office/drawing/2014/main" id="{EB83E669-1562-4981-9AA6-33F16EA57F29}"/>
+                  </a:ext>
+                </a:extLst>
+              </p:cNvPr>
+              <p:cNvPicPr/>
+              <p:nvPr/>
+            </p:nvPicPr>
+            <p:blipFill>
+              <a:blip r:embed="rId28"/>
+              <a:stretch>
+                <a:fillRect/>
+              </a:stretch>
+            </p:blipFill>
+            <p:spPr>
+              <a:xfrm>
+                <a:off x="7845245" y="5183717"/>
+                <a:ext cx="52560" cy="19440"/>
+              </a:xfrm>
+              <a:prstGeom prst="rect">
+                <a:avLst/>
+              </a:prstGeom>
+            </p:spPr>
+          </p:pic>
+        </mc:Fallback>
+      </mc:AlternateContent>
+      <mc:AlternateContent xmlns:mc="http://schemas.openxmlformats.org/markup-compatibility/2006" xmlns:p14="http://schemas.microsoft.com/office/powerpoint/2010/main">
+        <mc:Choice Requires="p14">
+          <p:contentPart p14:bwMode="auto" r:id="rId29">
+            <p14:nvContentPartPr>
+              <p14:cNvPr id="55" name="Ink 54">
+                <a:extLst>
+                  <a:ext uri="{FF2B5EF4-FFF2-40B4-BE49-F238E27FC236}">
+                    <a16:creationId xmlns:a16="http://schemas.microsoft.com/office/drawing/2014/main" id="{C80C05BA-F545-4EF0-93AC-DDF5B543CB01}"/>
+                  </a:ext>
+                </a:extLst>
+              </p14:cNvPr>
+              <p14:cNvContentPartPr/>
+              <p14:nvPr/>
+            </p14:nvContentPartPr>
+            <p14:xfrm>
+              <a:off x="7998605" y="5191637"/>
+              <a:ext cx="151920" cy="6120"/>
+            </p14:xfrm>
+          </p:contentPart>
+        </mc:Choice>
+        <mc:Fallback xmlns="">
+          <p:pic>
+            <p:nvPicPr>
+              <p:cNvPr id="55" name="Ink 54">
+                <a:extLst>
+                  <a:ext uri="{FF2B5EF4-FFF2-40B4-BE49-F238E27FC236}">
+                    <a16:creationId xmlns:a16="http://schemas.microsoft.com/office/drawing/2014/main" id="{C80C05BA-F545-4EF0-93AC-DDF5B543CB01}"/>
+                  </a:ext>
+                </a:extLst>
+              </p:cNvPr>
+              <p:cNvPicPr/>
+              <p:nvPr/>
+            </p:nvPicPr>
+            <p:blipFill>
+              <a:blip r:embed="rId30"/>
+              <a:stretch>
+                <a:fillRect/>
+              </a:stretch>
+            </p:blipFill>
+            <p:spPr>
+              <a:xfrm>
+                <a:off x="7989965" y="5182997"/>
+                <a:ext cx="169560" cy="23760"/>
+              </a:xfrm>
+              <a:prstGeom prst="rect">
+                <a:avLst/>
+              </a:prstGeom>
+            </p:spPr>
+          </p:pic>
+        </mc:Fallback>
+      </mc:AlternateContent>
+      <mc:AlternateContent xmlns:mc="http://schemas.openxmlformats.org/markup-compatibility/2006" xmlns:p14="http://schemas.microsoft.com/office/powerpoint/2010/main">
+        <mc:Choice Requires="p14">
+          <p:contentPart p14:bwMode="auto" r:id="rId31">
+            <p14:nvContentPartPr>
+              <p14:cNvPr id="56" name="Ink 55">
+                <a:extLst>
+                  <a:ext uri="{FF2B5EF4-FFF2-40B4-BE49-F238E27FC236}">
+                    <a16:creationId xmlns:a16="http://schemas.microsoft.com/office/drawing/2014/main" id="{DED26B3F-7B2D-49B5-911C-21A0DDEFE4B9}"/>
+                  </a:ext>
+                </a:extLst>
+              </p14:cNvPr>
+              <p14:cNvContentPartPr/>
+              <p14:nvPr/>
+            </p14:nvContentPartPr>
+            <p14:xfrm>
+              <a:off x="8184725" y="5192717"/>
+              <a:ext cx="10080" cy="1800"/>
+            </p14:xfrm>
+          </p:contentPart>
+        </mc:Choice>
+        <mc:Fallback xmlns="">
+          <p:pic>
+            <p:nvPicPr>
+              <p:cNvPr id="56" name="Ink 55">
+                <a:extLst>
+                  <a:ext uri="{FF2B5EF4-FFF2-40B4-BE49-F238E27FC236}">
+                    <a16:creationId xmlns:a16="http://schemas.microsoft.com/office/drawing/2014/main" id="{DED26B3F-7B2D-49B5-911C-21A0DDEFE4B9}"/>
+                  </a:ext>
+                </a:extLst>
+              </p:cNvPr>
+              <p:cNvPicPr/>
+              <p:nvPr/>
+            </p:nvPicPr>
+            <p:blipFill>
+              <a:blip r:embed="rId32"/>
+              <a:stretch>
+                <a:fillRect/>
+              </a:stretch>
+            </p:blipFill>
+            <p:spPr>
+              <a:xfrm>
+                <a:off x="8175725" y="5183717"/>
+                <a:ext cx="27720" cy="19440"/>
+              </a:xfrm>
+              <a:prstGeom prst="rect">
+                <a:avLst/>
+              </a:prstGeom>
+            </p:spPr>
+          </p:pic>
+        </mc:Fallback>
+      </mc:AlternateContent>
+      <mc:AlternateContent xmlns:mc="http://schemas.openxmlformats.org/markup-compatibility/2006" xmlns:p14="http://schemas.microsoft.com/office/powerpoint/2010/main">
+        <mc:Choice Requires="p14">
+          <p:contentPart p14:bwMode="auto" r:id="rId33">
+            <p14:nvContentPartPr>
+              <p14:cNvPr id="57" name="Ink 56">
+                <a:extLst>
+                  <a:ext uri="{FF2B5EF4-FFF2-40B4-BE49-F238E27FC236}">
+                    <a16:creationId xmlns:a16="http://schemas.microsoft.com/office/drawing/2014/main" id="{7E1671F2-3344-4401-946B-2F209F5AC9D6}"/>
+                  </a:ext>
+                </a:extLst>
+              </p14:cNvPr>
+              <p14:cNvContentPartPr/>
+              <p14:nvPr/>
+            </p14:nvContentPartPr>
+            <p14:xfrm>
+              <a:off x="6978005" y="5201357"/>
+              <a:ext cx="10080" cy="360"/>
+            </p14:xfrm>
+          </p:contentPart>
+        </mc:Choice>
+        <mc:Fallback xmlns="">
+          <p:pic>
+            <p:nvPicPr>
+              <p:cNvPr id="57" name="Ink 56">
+                <a:extLst>
+                  <a:ext uri="{FF2B5EF4-FFF2-40B4-BE49-F238E27FC236}">
+                    <a16:creationId xmlns:a16="http://schemas.microsoft.com/office/drawing/2014/main" id="{7E1671F2-3344-4401-946B-2F209F5AC9D6}"/>
+                  </a:ext>
+                </a:extLst>
+              </p:cNvPr>
+              <p:cNvPicPr/>
+              <p:nvPr/>
+            </p:nvPicPr>
+            <p:blipFill>
+              <a:blip r:embed="rId34"/>
+              <a:stretch>
+                <a:fillRect/>
+              </a:stretch>
+            </p:blipFill>
+            <p:spPr>
+              <a:xfrm>
+                <a:off x="6969365" y="5192717"/>
+                <a:ext cx="27720" cy="18000"/>
+              </a:xfrm>
+              <a:prstGeom prst="rect">
+                <a:avLst/>
+              </a:prstGeom>
+            </p:spPr>
+          </p:pic>
+        </mc:Fallback>
+      </mc:AlternateContent>
+      <mc:AlternateContent xmlns:mc="http://schemas.openxmlformats.org/markup-compatibility/2006" xmlns:p14="http://schemas.microsoft.com/office/powerpoint/2010/main">
+        <mc:Choice Requires="p14">
+          <p:contentPart p14:bwMode="auto" r:id="rId35">
+            <p14:nvContentPartPr>
+              <p14:cNvPr id="58" name="Ink 57">
+                <a:extLst>
+                  <a:ext uri="{FF2B5EF4-FFF2-40B4-BE49-F238E27FC236}">
+                    <a16:creationId xmlns:a16="http://schemas.microsoft.com/office/drawing/2014/main" id="{804F2B3F-69DE-4A45-9F20-BAF7E6627818}"/>
+                  </a:ext>
+                </a:extLst>
+              </p14:cNvPr>
+              <p14:cNvContentPartPr/>
+              <p14:nvPr/>
+            </p14:nvContentPartPr>
+            <p14:xfrm>
+              <a:off x="8314325" y="5184437"/>
+              <a:ext cx="16920" cy="3600"/>
+            </p14:xfrm>
+          </p:contentPart>
+        </mc:Choice>
+        <mc:Fallback xmlns="">
+          <p:pic>
+            <p:nvPicPr>
+              <p:cNvPr id="58" name="Ink 57">
+                <a:extLst>
+                  <a:ext uri="{FF2B5EF4-FFF2-40B4-BE49-F238E27FC236}">
+                    <a16:creationId xmlns:a16="http://schemas.microsoft.com/office/drawing/2014/main" id="{804F2B3F-69DE-4A45-9F20-BAF7E6627818}"/>
+                  </a:ext>
+                </a:extLst>
+              </p:cNvPr>
+              <p:cNvPicPr/>
+              <p:nvPr/>
+            </p:nvPicPr>
+            <p:blipFill>
+              <a:blip r:embed="rId36"/>
+              <a:stretch>
+                <a:fillRect/>
+              </a:stretch>
+            </p:blipFill>
+            <p:spPr>
+              <a:xfrm>
+                <a:off x="8305685" y="5175797"/>
+                <a:ext cx="34560" cy="21240"/>
+              </a:xfrm>
+              <a:prstGeom prst="rect">
+                <a:avLst/>
+              </a:prstGeom>
+            </p:spPr>
+          </p:pic>
+        </mc:Fallback>
+      </mc:AlternateContent>
+      <mc:AlternateContent xmlns:mc="http://schemas.openxmlformats.org/markup-compatibility/2006" xmlns:p14="http://schemas.microsoft.com/office/powerpoint/2010/main">
+        <mc:Choice Requires="p14">
+          <p:contentPart p14:bwMode="auto" r:id="rId37">
+            <p14:nvContentPartPr>
+              <p14:cNvPr id="59" name="Ink 58">
+                <a:extLst>
+                  <a:ext uri="{FF2B5EF4-FFF2-40B4-BE49-F238E27FC236}">
+                    <a16:creationId xmlns:a16="http://schemas.microsoft.com/office/drawing/2014/main" id="{2B4AD6C4-9E67-4DC3-A3E2-53BF016840D7}"/>
+                  </a:ext>
+                </a:extLst>
+              </p14:cNvPr>
+              <p14:cNvContentPartPr/>
+              <p14:nvPr/>
+            </p14:nvContentPartPr>
+            <p14:xfrm>
+              <a:off x="8395325" y="5181917"/>
+              <a:ext cx="47160" cy="360"/>
+            </p14:xfrm>
+          </p:contentPart>
+        </mc:Choice>
+        <mc:Fallback xmlns="">
+          <p:pic>
+            <p:nvPicPr>
+              <p:cNvPr id="59" name="Ink 58">
+                <a:extLst>
+                  <a:ext uri="{FF2B5EF4-FFF2-40B4-BE49-F238E27FC236}">
+                    <a16:creationId xmlns:a16="http://schemas.microsoft.com/office/drawing/2014/main" id="{2B4AD6C4-9E67-4DC3-A3E2-53BF016840D7}"/>
+                  </a:ext>
+                </a:extLst>
+              </p:cNvPr>
+              <p:cNvPicPr/>
+              <p:nvPr/>
+            </p:nvPicPr>
+            <p:blipFill>
+              <a:blip r:embed="rId26"/>
+              <a:stretch>
+                <a:fillRect/>
+              </a:stretch>
+            </p:blipFill>
+            <p:spPr>
+              <a:xfrm>
+                <a:off x="8386325" y="5172917"/>
+                <a:ext cx="64800" cy="18000"/>
+              </a:xfrm>
+              <a:prstGeom prst="rect">
+                <a:avLst/>
+              </a:prstGeom>
+            </p:spPr>
+          </p:pic>
+        </mc:Fallback>
+      </mc:AlternateContent>
+      <mc:AlternateContent xmlns:mc="http://schemas.openxmlformats.org/markup-compatibility/2006" xmlns:p14="http://schemas.microsoft.com/office/powerpoint/2010/main">
+        <mc:Choice Requires="p14">
+          <p:contentPart p14:bwMode="auto" r:id="rId38">
+            <p14:nvContentPartPr>
+              <p14:cNvPr id="66" name="Ink 65">
+                <a:extLst>
+                  <a:ext uri="{FF2B5EF4-FFF2-40B4-BE49-F238E27FC236}">
+                    <a16:creationId xmlns:a16="http://schemas.microsoft.com/office/drawing/2014/main" id="{25E3BA22-9680-4452-88AD-60266F43AA01}"/>
+                  </a:ext>
+                </a:extLst>
+              </p14:cNvPr>
+              <p14:cNvContentPartPr/>
+              <p14:nvPr/>
+            </p14:nvContentPartPr>
+            <p14:xfrm>
+              <a:off x="2964005" y="3874397"/>
+              <a:ext cx="305280" cy="129960"/>
+            </p14:xfrm>
+          </p:contentPart>
+        </mc:Choice>
+        <mc:Fallback xmlns="">
+          <p:pic>
+            <p:nvPicPr>
+              <p:cNvPr id="66" name="Ink 65">
+                <a:extLst>
+                  <a:ext uri="{FF2B5EF4-FFF2-40B4-BE49-F238E27FC236}">
+                    <a16:creationId xmlns:a16="http://schemas.microsoft.com/office/drawing/2014/main" id="{25E3BA22-9680-4452-88AD-60266F43AA01}"/>
+                  </a:ext>
+                </a:extLst>
+              </p:cNvPr>
+              <p:cNvPicPr/>
+              <p:nvPr/>
+            </p:nvPicPr>
+            <p:blipFill>
+              <a:blip r:embed="rId39"/>
+              <a:stretch>
+                <a:fillRect/>
+              </a:stretch>
+            </p:blipFill>
+            <p:spPr>
+              <a:xfrm>
+                <a:off x="2955355" y="3865757"/>
+                <a:ext cx="322941" cy="147600"/>
+              </a:xfrm>
+              <a:prstGeom prst="rect">
+                <a:avLst/>
+              </a:prstGeom>
+            </p:spPr>
+          </p:pic>
+        </mc:Fallback>
+      </mc:AlternateContent>
+      <mc:AlternateContent xmlns:mc="http://schemas.openxmlformats.org/markup-compatibility/2006" xmlns:p14="http://schemas.microsoft.com/office/powerpoint/2010/main">
+        <mc:Choice Requires="p14">
+          <p:contentPart p14:bwMode="auto" r:id="rId40">
+            <p14:nvContentPartPr>
+              <p14:cNvPr id="69" name="Ink 68">
+                <a:extLst>
+                  <a:ext uri="{FF2B5EF4-FFF2-40B4-BE49-F238E27FC236}">
+                    <a16:creationId xmlns:a16="http://schemas.microsoft.com/office/drawing/2014/main" id="{9C744417-3E08-46C6-A3AD-2EDAD0CD026A}"/>
+                  </a:ext>
+                </a:extLst>
+              </p14:cNvPr>
+              <p14:cNvContentPartPr/>
+              <p14:nvPr/>
+            </p14:nvContentPartPr>
+            <p14:xfrm>
+              <a:off x="7965485" y="4999037"/>
+              <a:ext cx="95040" cy="82080"/>
+            </p14:xfrm>
+          </p:contentPart>
+        </mc:Choice>
+        <mc:Fallback xmlns="">
+          <p:pic>
+            <p:nvPicPr>
+              <p:cNvPr id="69" name="Ink 68">
+                <a:extLst>
+                  <a:ext uri="{FF2B5EF4-FFF2-40B4-BE49-F238E27FC236}">
+                    <a16:creationId xmlns:a16="http://schemas.microsoft.com/office/drawing/2014/main" id="{9C744417-3E08-46C6-A3AD-2EDAD0CD026A}"/>
+                  </a:ext>
+                </a:extLst>
+              </p:cNvPr>
+              <p:cNvPicPr/>
+              <p:nvPr/>
+            </p:nvPicPr>
+            <p:blipFill>
+              <a:blip r:embed="rId41"/>
+              <a:stretch>
+                <a:fillRect/>
+              </a:stretch>
+            </p:blipFill>
+            <p:spPr>
+              <a:xfrm>
+                <a:off x="7956845" y="4990359"/>
+                <a:ext cx="112680" cy="99798"/>
+              </a:xfrm>
+              <a:prstGeom prst="rect">
+                <a:avLst/>
+              </a:prstGeom>
+            </p:spPr>
+          </p:pic>
+        </mc:Fallback>
+      </mc:AlternateContent>
+      <mc:AlternateContent xmlns:mc="http://schemas.openxmlformats.org/markup-compatibility/2006" xmlns:p14="http://schemas.microsoft.com/office/powerpoint/2010/main">
+        <mc:Choice Requires="p14">
+          <p:contentPart p14:bwMode="auto" r:id="rId42">
+            <p14:nvContentPartPr>
+              <p14:cNvPr id="81" name="Ink 80">
+                <a:extLst>
+                  <a:ext uri="{FF2B5EF4-FFF2-40B4-BE49-F238E27FC236}">
+                    <a16:creationId xmlns:a16="http://schemas.microsoft.com/office/drawing/2014/main" id="{84D9994D-BB81-4757-8B49-922466386044}"/>
+                  </a:ext>
+                </a:extLst>
+              </p14:cNvPr>
+              <p14:cNvContentPartPr/>
+              <p14:nvPr/>
+            </p14:nvContentPartPr>
+            <p14:xfrm>
+              <a:off x="8133605" y="4781957"/>
+              <a:ext cx="57600" cy="122400"/>
+            </p14:xfrm>
+          </p:contentPart>
+        </mc:Choice>
+        <mc:Fallback xmlns="">
+          <p:pic>
+            <p:nvPicPr>
+              <p:cNvPr id="81" name="Ink 80">
+                <a:extLst>
+                  <a:ext uri="{FF2B5EF4-FFF2-40B4-BE49-F238E27FC236}">
+                    <a16:creationId xmlns:a16="http://schemas.microsoft.com/office/drawing/2014/main" id="{84D9994D-BB81-4757-8B49-922466386044}"/>
+                  </a:ext>
+                </a:extLst>
+              </p:cNvPr>
+              <p:cNvPicPr/>
+              <p:nvPr/>
+            </p:nvPicPr>
+            <p:blipFill>
+              <a:blip r:embed="rId43"/>
+              <a:stretch>
+                <a:fillRect/>
+              </a:stretch>
+            </p:blipFill>
+            <p:spPr>
+              <a:xfrm>
+                <a:off x="8124965" y="4772957"/>
+                <a:ext cx="75240" cy="140040"/>
+              </a:xfrm>
+              <a:prstGeom prst="rect">
+                <a:avLst/>
+              </a:prstGeom>
+            </p:spPr>
+          </p:pic>
+        </mc:Fallback>
+      </mc:AlternateContent>
+      <mc:AlternateContent xmlns:mc="http://schemas.openxmlformats.org/markup-compatibility/2006" xmlns:p14="http://schemas.microsoft.com/office/powerpoint/2010/main">
+        <mc:Choice Requires="p14">
+          <p:contentPart p14:bwMode="auto" r:id="rId44">
+            <p14:nvContentPartPr>
+              <p14:cNvPr id="82" name="Ink 81">
+                <a:extLst>
+                  <a:ext uri="{FF2B5EF4-FFF2-40B4-BE49-F238E27FC236}">
+                    <a16:creationId xmlns:a16="http://schemas.microsoft.com/office/drawing/2014/main" id="{175C8390-DE8F-4E2E-998B-0C192CB7EC2A}"/>
+                  </a:ext>
+                </a:extLst>
+              </p14:cNvPr>
+              <p14:cNvContentPartPr/>
+              <p14:nvPr/>
+            </p14:nvContentPartPr>
+            <p14:xfrm>
+              <a:off x="7679645" y="4741637"/>
+              <a:ext cx="411120" cy="156240"/>
+            </p14:xfrm>
+          </p:contentPart>
+        </mc:Choice>
+        <mc:Fallback xmlns="">
+          <p:pic>
+            <p:nvPicPr>
+              <p:cNvPr id="82" name="Ink 81">
+                <a:extLst>
+                  <a:ext uri="{FF2B5EF4-FFF2-40B4-BE49-F238E27FC236}">
+                    <a16:creationId xmlns:a16="http://schemas.microsoft.com/office/drawing/2014/main" id="{175C8390-DE8F-4E2E-998B-0C192CB7EC2A}"/>
+                  </a:ext>
+                </a:extLst>
+              </p:cNvPr>
+              <p:cNvPicPr/>
+              <p:nvPr/>
+            </p:nvPicPr>
+            <p:blipFill>
+              <a:blip r:embed="rId45"/>
+              <a:stretch>
+                <a:fillRect/>
+              </a:stretch>
+            </p:blipFill>
+            <p:spPr>
+              <a:xfrm>
+                <a:off x="7670645" y="4732637"/>
+                <a:ext cx="428760" cy="173880"/>
+              </a:xfrm>
+              <a:prstGeom prst="rect">
+                <a:avLst/>
+              </a:prstGeom>
+            </p:spPr>
+          </p:pic>
+        </mc:Fallback>
+      </mc:AlternateContent>
+      <mc:AlternateContent xmlns:mc="http://schemas.openxmlformats.org/markup-compatibility/2006" xmlns:p14="http://schemas.microsoft.com/office/powerpoint/2010/main">
+        <mc:Choice Requires="p14">
+          <p:contentPart p14:bwMode="auto" r:id="rId46">
+            <p14:nvContentPartPr>
+              <p14:cNvPr id="87" name="Ink 86">
+                <a:extLst>
+                  <a:ext uri="{FF2B5EF4-FFF2-40B4-BE49-F238E27FC236}">
+                    <a16:creationId xmlns:a16="http://schemas.microsoft.com/office/drawing/2014/main" id="{C8CC716F-5D39-4FE6-A798-4CB5D10E8A55}"/>
+                  </a:ext>
+                </a:extLst>
+              </p14:cNvPr>
+              <p14:cNvContentPartPr/>
+              <p14:nvPr/>
+            </p14:nvContentPartPr>
+            <p14:xfrm>
+              <a:off x="7694045" y="4547957"/>
+              <a:ext cx="163080" cy="155160"/>
+            </p14:xfrm>
+          </p:contentPart>
+        </mc:Choice>
+        <mc:Fallback xmlns="">
+          <p:pic>
+            <p:nvPicPr>
+              <p:cNvPr id="87" name="Ink 86">
+                <a:extLst>
+                  <a:ext uri="{FF2B5EF4-FFF2-40B4-BE49-F238E27FC236}">
+                    <a16:creationId xmlns:a16="http://schemas.microsoft.com/office/drawing/2014/main" id="{C8CC716F-5D39-4FE6-A798-4CB5D10E8A55}"/>
+                  </a:ext>
+                </a:extLst>
+              </p:cNvPr>
+              <p:cNvPicPr/>
+              <p:nvPr/>
+            </p:nvPicPr>
+            <p:blipFill>
+              <a:blip r:embed="rId47"/>
+              <a:stretch>
+                <a:fillRect/>
+              </a:stretch>
+            </p:blipFill>
+            <p:spPr>
+              <a:xfrm>
+                <a:off x="7685045" y="4539317"/>
+                <a:ext cx="180720" cy="172800"/>
+              </a:xfrm>
+              <a:prstGeom prst="rect">
+                <a:avLst/>
+              </a:prstGeom>
+            </p:spPr>
+          </p:pic>
+        </mc:Fallback>
+      </mc:AlternateContent>
+      <mc:AlternateContent xmlns:mc="http://schemas.openxmlformats.org/markup-compatibility/2006" xmlns:p14="http://schemas.microsoft.com/office/powerpoint/2010/main">
+        <mc:Choice Requires="p14">
+          <p:contentPart p14:bwMode="auto" r:id="rId48">
+            <p14:nvContentPartPr>
+              <p14:cNvPr id="88" name="Ink 87">
+                <a:extLst>
+                  <a:ext uri="{FF2B5EF4-FFF2-40B4-BE49-F238E27FC236}">
+                    <a16:creationId xmlns:a16="http://schemas.microsoft.com/office/drawing/2014/main" id="{838011DF-5EB3-43B0-80CC-39A86B677A16}"/>
+                  </a:ext>
+                </a:extLst>
+              </p14:cNvPr>
+              <p14:cNvContentPartPr/>
+              <p14:nvPr/>
+            </p14:nvContentPartPr>
+            <p14:xfrm>
+              <a:off x="7554725" y="4497197"/>
+              <a:ext cx="108720" cy="101160"/>
+            </p14:xfrm>
+          </p:contentPart>
+        </mc:Choice>
+        <mc:Fallback xmlns="">
+          <p:pic>
+            <p:nvPicPr>
+              <p:cNvPr id="88" name="Ink 87">
+                <a:extLst>
+                  <a:ext uri="{FF2B5EF4-FFF2-40B4-BE49-F238E27FC236}">
+                    <a16:creationId xmlns:a16="http://schemas.microsoft.com/office/drawing/2014/main" id="{838011DF-5EB3-43B0-80CC-39A86B677A16}"/>
+                  </a:ext>
+                </a:extLst>
+              </p:cNvPr>
+              <p:cNvPicPr/>
+              <p:nvPr/>
+            </p:nvPicPr>
+            <p:blipFill>
+              <a:blip r:embed="rId49"/>
+              <a:stretch>
+                <a:fillRect/>
+              </a:stretch>
+            </p:blipFill>
+            <p:spPr>
+              <a:xfrm>
+                <a:off x="7545725" y="4488197"/>
+                <a:ext cx="126360" cy="118800"/>
+              </a:xfrm>
+              <a:prstGeom prst="rect">
+                <a:avLst/>
+              </a:prstGeom>
+            </p:spPr>
+          </p:pic>
+        </mc:Fallback>
+      </mc:AlternateContent>
+      <mc:AlternateContent xmlns:mc="http://schemas.openxmlformats.org/markup-compatibility/2006" xmlns:p14="http://schemas.microsoft.com/office/powerpoint/2010/main">
+        <mc:Choice Requires="p14">
+          <p:contentPart p14:bwMode="auto" r:id="rId50">
+            <p14:nvContentPartPr>
+              <p14:cNvPr id="94" name="Ink 93">
+                <a:extLst>
+                  <a:ext uri="{FF2B5EF4-FFF2-40B4-BE49-F238E27FC236}">
+                    <a16:creationId xmlns:a16="http://schemas.microsoft.com/office/drawing/2014/main" id="{049AD953-D970-4262-8974-EA2CC675D9CD}"/>
+                  </a:ext>
+                </a:extLst>
+              </p14:cNvPr>
+              <p14:cNvContentPartPr/>
+              <p14:nvPr/>
+            </p14:nvContentPartPr>
+            <p14:xfrm>
+              <a:off x="7466525" y="4500437"/>
+              <a:ext cx="55800" cy="177120"/>
+            </p14:xfrm>
+          </p:contentPart>
+        </mc:Choice>
+        <mc:Fallback xmlns="">
+          <p:pic>
+            <p:nvPicPr>
+              <p:cNvPr id="94" name="Ink 93">
+                <a:extLst>
+                  <a:ext uri="{FF2B5EF4-FFF2-40B4-BE49-F238E27FC236}">
+                    <a16:creationId xmlns:a16="http://schemas.microsoft.com/office/drawing/2014/main" id="{049AD953-D970-4262-8974-EA2CC675D9CD}"/>
+                  </a:ext>
+                </a:extLst>
+              </p:cNvPr>
+              <p:cNvPicPr/>
+              <p:nvPr/>
+            </p:nvPicPr>
+            <p:blipFill>
+              <a:blip r:embed="rId51"/>
+              <a:stretch>
+                <a:fillRect/>
+              </a:stretch>
+            </p:blipFill>
+            <p:spPr>
+              <a:xfrm>
+                <a:off x="7457525" y="4491797"/>
+                <a:ext cx="73440" cy="194760"/>
+              </a:xfrm>
+              <a:prstGeom prst="rect">
+                <a:avLst/>
+              </a:prstGeom>
+            </p:spPr>
+          </p:pic>
+        </mc:Fallback>
+      </mc:AlternateContent>
+      <mc:AlternateContent xmlns:mc="http://schemas.openxmlformats.org/markup-compatibility/2006" xmlns:p14="http://schemas.microsoft.com/office/powerpoint/2010/main">
+        <mc:Choice Requires="p14">
+          <p:contentPart p14:bwMode="auto" r:id="rId52">
+            <p14:nvContentPartPr>
+              <p14:cNvPr id="95" name="Ink 94">
+                <a:extLst>
+                  <a:ext uri="{FF2B5EF4-FFF2-40B4-BE49-F238E27FC236}">
+                    <a16:creationId xmlns:a16="http://schemas.microsoft.com/office/drawing/2014/main" id="{70FC1E0A-158E-4E6E-A5B5-4241BBA664E3}"/>
+                  </a:ext>
+                </a:extLst>
+              </p14:cNvPr>
+              <p14:cNvContentPartPr/>
+              <p14:nvPr/>
+            </p14:nvContentPartPr>
+            <p14:xfrm>
+              <a:off x="7898165" y="4523117"/>
+              <a:ext cx="314280" cy="118440"/>
+            </p14:xfrm>
+          </p:contentPart>
+        </mc:Choice>
+        <mc:Fallback xmlns="">
+          <p:pic>
+            <p:nvPicPr>
+              <p:cNvPr id="95" name="Ink 94">
+                <a:extLst>
+                  <a:ext uri="{FF2B5EF4-FFF2-40B4-BE49-F238E27FC236}">
+                    <a16:creationId xmlns:a16="http://schemas.microsoft.com/office/drawing/2014/main" id="{70FC1E0A-158E-4E6E-A5B5-4241BBA664E3}"/>
+                  </a:ext>
+                </a:extLst>
+              </p:cNvPr>
+              <p:cNvPicPr/>
+              <p:nvPr/>
+            </p:nvPicPr>
+            <p:blipFill>
+              <a:blip r:embed="rId53"/>
+              <a:stretch>
+                <a:fillRect/>
+              </a:stretch>
+            </p:blipFill>
+            <p:spPr>
+              <a:xfrm>
+                <a:off x="7889165" y="4514117"/>
+                <a:ext cx="331920" cy="136080"/>
+              </a:xfrm>
+              <a:prstGeom prst="rect">
+                <a:avLst/>
+              </a:prstGeom>
+            </p:spPr>
+          </p:pic>
+        </mc:Fallback>
+      </mc:AlternateContent>
+      <mc:AlternateContent xmlns:mc="http://schemas.openxmlformats.org/markup-compatibility/2006" xmlns:p14="http://schemas.microsoft.com/office/powerpoint/2010/main">
+        <mc:Choice Requires="p14">
+          <p:contentPart p14:bwMode="auto" r:id="rId54">
+            <p14:nvContentPartPr>
+              <p14:cNvPr id="96" name="Ink 95">
+                <a:extLst>
+                  <a:ext uri="{FF2B5EF4-FFF2-40B4-BE49-F238E27FC236}">
+                    <a16:creationId xmlns:a16="http://schemas.microsoft.com/office/drawing/2014/main" id="{6137B254-23E9-49D1-A23C-49EB3674A891}"/>
+                  </a:ext>
+                </a:extLst>
+              </p14:cNvPr>
+              <p14:cNvContentPartPr/>
+              <p14:nvPr/>
+            </p14:nvContentPartPr>
+            <p14:xfrm>
+              <a:off x="8257805" y="4518797"/>
+              <a:ext cx="52200" cy="166320"/>
+            </p14:xfrm>
+          </p:contentPart>
+        </mc:Choice>
+        <mc:Fallback xmlns="">
+          <p:pic>
+            <p:nvPicPr>
+              <p:cNvPr id="96" name="Ink 95">
+                <a:extLst>
+                  <a:ext uri="{FF2B5EF4-FFF2-40B4-BE49-F238E27FC236}">
+                    <a16:creationId xmlns:a16="http://schemas.microsoft.com/office/drawing/2014/main" id="{6137B254-23E9-49D1-A23C-49EB3674A891}"/>
+                  </a:ext>
+                </a:extLst>
+              </p:cNvPr>
+              <p:cNvPicPr/>
+              <p:nvPr/>
+            </p:nvPicPr>
+            <p:blipFill>
+              <a:blip r:embed="rId55"/>
+              <a:stretch>
+                <a:fillRect/>
+              </a:stretch>
+            </p:blipFill>
+            <p:spPr>
+              <a:xfrm>
+                <a:off x="8248805" y="4509797"/>
+                <a:ext cx="69840" cy="183960"/>
+              </a:xfrm>
+              <a:prstGeom prst="rect">
+                <a:avLst/>
+              </a:prstGeom>
+            </p:spPr>
+          </p:pic>
+        </mc:Fallback>
+      </mc:AlternateContent>
+      <mc:AlternateContent xmlns:mc="http://schemas.openxmlformats.org/markup-compatibility/2006" xmlns:p14="http://schemas.microsoft.com/office/powerpoint/2010/main">
+        <mc:Choice Requires="p14">
+          <p:contentPart p14:bwMode="auto" r:id="rId56">
+            <p14:nvContentPartPr>
+              <p14:cNvPr id="101" name="Ink 100">
+                <a:extLst>
+                  <a:ext uri="{FF2B5EF4-FFF2-40B4-BE49-F238E27FC236}">
+                    <a16:creationId xmlns:a16="http://schemas.microsoft.com/office/drawing/2014/main" id="{FE4724EA-76E3-403F-86CB-E8CCD8F7A8E6}"/>
+                  </a:ext>
+                </a:extLst>
+              </p14:cNvPr>
+              <p14:cNvContentPartPr/>
+              <p14:nvPr/>
+            </p14:nvContentPartPr>
+            <p14:xfrm>
+              <a:off x="8244125" y="4933517"/>
+              <a:ext cx="247680" cy="114480"/>
+            </p14:xfrm>
+          </p:contentPart>
+        </mc:Choice>
+        <mc:Fallback xmlns="">
+          <p:pic>
+            <p:nvPicPr>
+              <p:cNvPr id="101" name="Ink 100">
+                <a:extLst>
+                  <a:ext uri="{FF2B5EF4-FFF2-40B4-BE49-F238E27FC236}">
+                    <a16:creationId xmlns:a16="http://schemas.microsoft.com/office/drawing/2014/main" id="{FE4724EA-76E3-403F-86CB-E8CCD8F7A8E6}"/>
+                  </a:ext>
+                </a:extLst>
+              </p:cNvPr>
+              <p:cNvPicPr/>
+              <p:nvPr/>
+            </p:nvPicPr>
+            <p:blipFill>
+              <a:blip r:embed="rId57"/>
+              <a:stretch>
+                <a:fillRect/>
+              </a:stretch>
+            </p:blipFill>
+            <p:spPr>
+              <a:xfrm>
+                <a:off x="8235125" y="4924877"/>
+                <a:ext cx="265320" cy="132120"/>
+              </a:xfrm>
+              <a:prstGeom prst="rect">
+                <a:avLst/>
+              </a:prstGeom>
+            </p:spPr>
+          </p:pic>
+        </mc:Fallback>
+      </mc:AlternateContent>
+    </p:spTree>
+    <p:extLst>
+      <p:ext uri="{BB962C8B-B14F-4D97-AF65-F5344CB8AC3E}">
+        <p14:creationId xmlns:p14="http://schemas.microsoft.com/office/powerpoint/2010/main" val="2167586369"/>
       </p:ext>
     </p:extLst>
   </p:cSld>

</xml_diff>